<commit_message>
Status before Allison feedback. Minor changes to diagrams, intro, and related work
</commit_message>
<xml_diff>
--- a/papers/diagrams.pptx
+++ b/papers/diagrams.pptx
@@ -296,6 +296,7 @@
           <a:p>
             <a:fld id="{4D48661F-B396-4702-B33E-1E9FB6086F60}" type="datetimeFigureOut">
               <a:rPr lang="en-US" smtClean="0"/>
+              <a:pPr/>
               <a:t>9/17/2008</a:t>
             </a:fld>
             <a:endParaRPr lang="en-US"/>
@@ -338,6 +339,7 @@
           <a:p>
             <a:fld id="{0A5C5384-95B9-484D-9214-ADEFCB4C31F7}" type="slidenum">
               <a:rPr lang="en-US" smtClean="0"/>
+              <a:pPr/>
               <a:t>‹#›</a:t>
             </a:fld>
             <a:endParaRPr lang="en-US"/>
@@ -461,6 +463,7 @@
           <a:p>
             <a:fld id="{4D48661F-B396-4702-B33E-1E9FB6086F60}" type="datetimeFigureOut">
               <a:rPr lang="en-US" smtClean="0"/>
+              <a:pPr/>
               <a:t>9/17/2008</a:t>
             </a:fld>
             <a:endParaRPr lang="en-US"/>
@@ -503,6 +506,7 @@
           <a:p>
             <a:fld id="{0A5C5384-95B9-484D-9214-ADEFCB4C31F7}" type="slidenum">
               <a:rPr lang="en-US" smtClean="0"/>
+              <a:pPr/>
               <a:t>‹#›</a:t>
             </a:fld>
             <a:endParaRPr lang="en-US"/>
@@ -636,6 +640,7 @@
           <a:p>
             <a:fld id="{4D48661F-B396-4702-B33E-1E9FB6086F60}" type="datetimeFigureOut">
               <a:rPr lang="en-US" smtClean="0"/>
+              <a:pPr/>
               <a:t>9/17/2008</a:t>
             </a:fld>
             <a:endParaRPr lang="en-US"/>
@@ -678,6 +683,7 @@
           <a:p>
             <a:fld id="{0A5C5384-95B9-484D-9214-ADEFCB4C31F7}" type="slidenum">
               <a:rPr lang="en-US" smtClean="0"/>
+              <a:pPr/>
               <a:t>‹#›</a:t>
             </a:fld>
             <a:endParaRPr lang="en-US"/>
@@ -801,6 +807,7 @@
           <a:p>
             <a:fld id="{4D48661F-B396-4702-B33E-1E9FB6086F60}" type="datetimeFigureOut">
               <a:rPr lang="en-US" smtClean="0"/>
+              <a:pPr/>
               <a:t>9/17/2008</a:t>
             </a:fld>
             <a:endParaRPr lang="en-US"/>
@@ -843,6 +850,7 @@
           <a:p>
             <a:fld id="{0A5C5384-95B9-484D-9214-ADEFCB4C31F7}" type="slidenum">
               <a:rPr lang="en-US" smtClean="0"/>
+              <a:pPr/>
               <a:t>‹#›</a:t>
             </a:fld>
             <a:endParaRPr lang="en-US"/>
@@ -1042,6 +1050,7 @@
           <a:p>
             <a:fld id="{4D48661F-B396-4702-B33E-1E9FB6086F60}" type="datetimeFigureOut">
               <a:rPr lang="en-US" smtClean="0"/>
+              <a:pPr/>
               <a:t>9/17/2008</a:t>
             </a:fld>
             <a:endParaRPr lang="en-US"/>
@@ -1084,6 +1093,7 @@
           <a:p>
             <a:fld id="{0A5C5384-95B9-484D-9214-ADEFCB4C31F7}" type="slidenum">
               <a:rPr lang="en-US" smtClean="0"/>
+              <a:pPr/>
               <a:t>‹#›</a:t>
             </a:fld>
             <a:endParaRPr lang="en-US"/>
@@ -1325,6 +1335,7 @@
           <a:p>
             <a:fld id="{4D48661F-B396-4702-B33E-1E9FB6086F60}" type="datetimeFigureOut">
               <a:rPr lang="en-US" smtClean="0"/>
+              <a:pPr/>
               <a:t>9/17/2008</a:t>
             </a:fld>
             <a:endParaRPr lang="en-US"/>
@@ -1367,6 +1378,7 @@
           <a:p>
             <a:fld id="{0A5C5384-95B9-484D-9214-ADEFCB4C31F7}" type="slidenum">
               <a:rPr lang="en-US" smtClean="0"/>
+              <a:pPr/>
               <a:t>‹#›</a:t>
             </a:fld>
             <a:endParaRPr lang="en-US"/>
@@ -1742,6 +1754,7 @@
           <a:p>
             <a:fld id="{4D48661F-B396-4702-B33E-1E9FB6086F60}" type="datetimeFigureOut">
               <a:rPr lang="en-US" smtClean="0"/>
+              <a:pPr/>
               <a:t>9/17/2008</a:t>
             </a:fld>
             <a:endParaRPr lang="en-US"/>
@@ -1784,6 +1797,7 @@
           <a:p>
             <a:fld id="{0A5C5384-95B9-484D-9214-ADEFCB4C31F7}" type="slidenum">
               <a:rPr lang="en-US" smtClean="0"/>
+              <a:pPr/>
               <a:t>‹#›</a:t>
             </a:fld>
             <a:endParaRPr lang="en-US"/>
@@ -1855,6 +1869,7 @@
           <a:p>
             <a:fld id="{4D48661F-B396-4702-B33E-1E9FB6086F60}" type="datetimeFigureOut">
               <a:rPr lang="en-US" smtClean="0"/>
+              <a:pPr/>
               <a:t>9/17/2008</a:t>
             </a:fld>
             <a:endParaRPr lang="en-US"/>
@@ -1897,6 +1912,7 @@
           <a:p>
             <a:fld id="{0A5C5384-95B9-484D-9214-ADEFCB4C31F7}" type="slidenum">
               <a:rPr lang="en-US" smtClean="0"/>
+              <a:pPr/>
               <a:t>‹#›</a:t>
             </a:fld>
             <a:endParaRPr lang="en-US"/>
@@ -1945,6 +1961,7 @@
           <a:p>
             <a:fld id="{4D48661F-B396-4702-B33E-1E9FB6086F60}" type="datetimeFigureOut">
               <a:rPr lang="en-US" smtClean="0"/>
+              <a:pPr/>
               <a:t>9/17/2008</a:t>
             </a:fld>
             <a:endParaRPr lang="en-US"/>
@@ -1987,6 +2004,7 @@
           <a:p>
             <a:fld id="{0A5C5384-95B9-484D-9214-ADEFCB4C31F7}" type="slidenum">
               <a:rPr lang="en-US" smtClean="0"/>
+              <a:pPr/>
               <a:t>‹#›</a:t>
             </a:fld>
             <a:endParaRPr lang="en-US"/>
@@ -2217,6 +2235,7 @@
           <a:p>
             <a:fld id="{4D48661F-B396-4702-B33E-1E9FB6086F60}" type="datetimeFigureOut">
               <a:rPr lang="en-US" smtClean="0"/>
+              <a:pPr/>
               <a:t>9/17/2008</a:t>
             </a:fld>
             <a:endParaRPr lang="en-US"/>
@@ -2259,6 +2278,7 @@
           <a:p>
             <a:fld id="{0A5C5384-95B9-484D-9214-ADEFCB4C31F7}" type="slidenum">
               <a:rPr lang="en-US" smtClean="0"/>
+              <a:pPr/>
               <a:t>‹#›</a:t>
             </a:fld>
             <a:endParaRPr lang="en-US"/>
@@ -2465,6 +2485,7 @@
           <a:p>
             <a:fld id="{4D48661F-B396-4702-B33E-1E9FB6086F60}" type="datetimeFigureOut">
               <a:rPr lang="en-US" smtClean="0"/>
+              <a:pPr/>
               <a:t>9/17/2008</a:t>
             </a:fld>
             <a:endParaRPr lang="en-US"/>
@@ -2507,6 +2528,7 @@
           <a:p>
             <a:fld id="{0A5C5384-95B9-484D-9214-ADEFCB4C31F7}" type="slidenum">
               <a:rPr lang="en-US" smtClean="0"/>
+              <a:pPr/>
               <a:t>‹#›</a:t>
             </a:fld>
             <a:endParaRPr lang="en-US"/>
@@ -2673,6 +2695,7 @@
           <a:p>
             <a:fld id="{4D48661F-B396-4702-B33E-1E9FB6086F60}" type="datetimeFigureOut">
               <a:rPr lang="en-US" smtClean="0"/>
+              <a:pPr/>
               <a:t>9/17/2008</a:t>
             </a:fld>
             <a:endParaRPr lang="en-US"/>
@@ -2751,6 +2774,7 @@
           <a:p>
             <a:fld id="{0A5C5384-95B9-484D-9214-ADEFCB4C31F7}" type="slidenum">
               <a:rPr lang="en-US" smtClean="0"/>
+              <a:pPr/>
               <a:t>‹#›</a:t>
             </a:fld>
             <a:endParaRPr lang="en-US"/>
@@ -3098,11 +3122,6 @@
               </a:rPr>
               <a:t>Selected Claim</a:t>
             </a:r>
-            <a:endParaRPr lang="en-US" sz="2000" b="1" dirty="0" smtClean="0">
-              <a:solidFill>
-                <a:srgbClr val="000000"/>
-              </a:solidFill>
-            </a:endParaRPr>
           </a:p>
         </p:txBody>
       </p:sp>
@@ -3137,11 +3156,6 @@
               </a:rPr>
               <a:t>Claims that support it</a:t>
             </a:r>
-            <a:endParaRPr lang="en-US" sz="1600" b="1" dirty="0" smtClean="0">
-              <a:solidFill>
-                <a:srgbClr val="000000"/>
-              </a:solidFill>
-            </a:endParaRPr>
           </a:p>
         </p:txBody>
       </p:sp>
@@ -3176,11 +3190,6 @@
               </a:rPr>
               <a:t>Claims that oppose it</a:t>
             </a:r>
-            <a:endParaRPr lang="en-US" sz="1600" b="1" dirty="0" smtClean="0">
-              <a:solidFill>
-                <a:srgbClr val="000000"/>
-              </a:solidFill>
-            </a:endParaRPr>
           </a:p>
         </p:txBody>
       </p:sp>
@@ -3215,11 +3224,6 @@
               </a:rPr>
               <a:t>Web snippets that state it</a:t>
             </a:r>
-            <a:endParaRPr lang="en-US" sz="1600" b="1" dirty="0" smtClean="0">
-              <a:solidFill>
-                <a:srgbClr val="000000"/>
-              </a:solidFill>
-            </a:endParaRPr>
           </a:p>
         </p:txBody>
       </p:sp>
@@ -3254,11 +3258,6 @@
               </a:rPr>
               <a:t>Topics it is about</a:t>
             </a:r>
-            <a:endParaRPr lang="en-US" sz="1600" b="1" dirty="0" smtClean="0">
-              <a:solidFill>
-                <a:srgbClr val="000000"/>
-              </a:solidFill>
-            </a:endParaRPr>
           </a:p>
         </p:txBody>
       </p:sp>
@@ -3592,11 +3591,6 @@
               </a:rPr>
               <a:t>Selected Claim</a:t>
             </a:r>
-            <a:endParaRPr lang="en-US" sz="2000" b="1" dirty="0" smtClean="0">
-              <a:solidFill>
-                <a:srgbClr val="000000"/>
-              </a:solidFill>
-            </a:endParaRPr>
           </a:p>
         </p:txBody>
       </p:sp>
@@ -3631,11 +3625,6 @@
               </a:rPr>
               <a:t>Claims that support it</a:t>
             </a:r>
-            <a:endParaRPr lang="en-US" sz="1600" dirty="0" smtClean="0">
-              <a:solidFill>
-                <a:srgbClr val="000000"/>
-              </a:solidFill>
-            </a:endParaRPr>
           </a:p>
         </p:txBody>
       </p:sp>
@@ -3670,11 +3659,6 @@
               </a:rPr>
               <a:t>Claims that oppose it</a:t>
             </a:r>
-            <a:endParaRPr lang="en-US" sz="1600" dirty="0" smtClean="0">
-              <a:solidFill>
-                <a:srgbClr val="000000"/>
-              </a:solidFill>
-            </a:endParaRPr>
           </a:p>
         </p:txBody>
       </p:sp>
@@ -3709,11 +3693,6 @@
               </a:rPr>
               <a:t>Web snippets that state it</a:t>
             </a:r>
-            <a:endParaRPr lang="en-US" sz="1600" dirty="0" smtClean="0">
-              <a:solidFill>
-                <a:srgbClr val="000000"/>
-              </a:solidFill>
-            </a:endParaRPr>
           </a:p>
         </p:txBody>
       </p:sp>
@@ -3748,11 +3727,6 @@
               </a:rPr>
               <a:t>Topics it is about</a:t>
             </a:r>
-            <a:endParaRPr lang="en-US" sz="1600" dirty="0" smtClean="0">
-              <a:solidFill>
-                <a:srgbClr val="000000"/>
-              </a:solidFill>
-            </a:endParaRPr>
           </a:p>
         </p:txBody>
       </p:sp>
@@ -4048,21 +4022,8 @@
                   <a:srgbClr val="000000"/>
                 </a:solidFill>
               </a:rPr>
-              <a:t>Claims </a:t>
-            </a:r>
-            <a:r>
-              <a:rPr lang="en-US" sz="1600" dirty="0" smtClean="0">
-                <a:solidFill>
-                  <a:srgbClr val="000000"/>
-                </a:solidFill>
-              </a:rPr>
-              <a:t>it opposes</a:t>
-            </a:r>
-            <a:endParaRPr lang="en-US" sz="1600" dirty="0" smtClean="0">
-              <a:solidFill>
-                <a:srgbClr val="000000"/>
-              </a:solidFill>
-            </a:endParaRPr>
+              <a:t>Claims it opposes</a:t>
+            </a:r>
           </a:p>
         </p:txBody>
       </p:sp>
@@ -4205,11 +4166,6 @@
               </a:rPr>
               <a:t>Status Icons</a:t>
             </a:r>
-            <a:endParaRPr lang="en-US" sz="2000" b="1" dirty="0" smtClean="0">
-              <a:solidFill>
-                <a:srgbClr val="000000"/>
-              </a:solidFill>
-            </a:endParaRPr>
           </a:p>
         </p:txBody>
       </p:sp>
@@ -4244,11 +4200,6 @@
               </a:rPr>
               <a:t>Add new supporting claim</a:t>
             </a:r>
-            <a:endParaRPr lang="en-US" sz="2000" b="1" dirty="0" smtClean="0">
-              <a:solidFill>
-                <a:srgbClr val="000000"/>
-              </a:solidFill>
-            </a:endParaRPr>
           </a:p>
         </p:txBody>
       </p:sp>
@@ -4799,21 +4750,8 @@
                   <a:srgbClr val="000000"/>
                 </a:solidFill>
               </a:rPr>
-              <a:t>1.) </a:t>
-            </a:r>
-            <a:r>
-              <a:rPr lang="en-US" sz="1200" dirty="0" smtClean="0">
-                <a:solidFill>
-                  <a:srgbClr val="000000"/>
-                </a:solidFill>
-              </a:rPr>
-              <a:t>Select Text</a:t>
-            </a:r>
-            <a:endParaRPr lang="en-US" sz="1200" dirty="0" smtClean="0">
-              <a:solidFill>
-                <a:srgbClr val="000000"/>
-              </a:solidFill>
-            </a:endParaRPr>
+              <a:t>1.) Select Text</a:t>
+            </a:r>
           </a:p>
         </p:txBody>
       </p:sp>
@@ -4848,11 +4786,6 @@
               </a:rPr>
               <a:t>2.) Click button or  context menu</a:t>
             </a:r>
-            <a:endParaRPr lang="en-US" sz="1200" dirty="0" smtClean="0">
-              <a:solidFill>
-                <a:srgbClr val="000000"/>
-              </a:solidFill>
-            </a:endParaRPr>
           </a:p>
         </p:txBody>
       </p:sp>
@@ -4887,11 +4820,6 @@
               </a:rPr>
               <a:t>3.) Select claim</a:t>
             </a:r>
-            <a:endParaRPr lang="en-US" sz="1200" dirty="0" smtClean="0">
-              <a:solidFill>
-                <a:srgbClr val="000000"/>
-              </a:solidFill>
-            </a:endParaRPr>
           </a:p>
         </p:txBody>
       </p:sp>
@@ -4926,11 +4854,6 @@
               </a:rPr>
               <a:t>4.) Snippet is now highlighted</a:t>
             </a:r>
-            <a:endParaRPr lang="en-US" sz="1200" dirty="0" smtClean="0">
-              <a:solidFill>
-                <a:srgbClr val="000000"/>
-              </a:solidFill>
-            </a:endParaRPr>
           </a:p>
         </p:txBody>
       </p:sp>
@@ -4991,8 +4914,8 @@
         </p:nvSpPr>
         <p:spPr>
           <a:xfrm>
-            <a:off x="1066800" y="2819400"/>
-            <a:ext cx="1432329" cy="338554"/>
+            <a:off x="1143000" y="2590800"/>
+            <a:ext cx="1432329" cy="584775"/>
           </a:xfrm>
           <a:prstGeom prst="rect">
             <a:avLst/>
@@ -5012,13 +4935,16 @@
                   <a:srgbClr val="000000"/>
                 </a:solidFill>
               </a:rPr>
-              <a:t>Claim Browser</a:t>
-            </a:r>
-            <a:endParaRPr lang="en-US" sz="1600" dirty="0" smtClean="0">
-              <a:solidFill>
-                <a:srgbClr val="000000"/>
-              </a:solidFill>
-            </a:endParaRPr>
+              <a:t>Enhanced Claim </a:t>
+            </a:r>
+            <a:r>
+              <a:rPr lang="en-US" sz="1600" dirty="0" smtClean="0">
+                <a:solidFill>
+                  <a:srgbClr val="000000"/>
+                </a:solidFill>
+              </a:rPr>
+              <a:t>Browser</a:t>
+            </a:r>
           </a:p>
         </p:txBody>
       </p:sp>
@@ -5030,7 +4956,7 @@
         </p:nvSpPr>
         <p:spPr>
           <a:xfrm>
-            <a:off x="1066800" y="4267200"/>
+            <a:off x="1143000" y="4267200"/>
             <a:ext cx="1432329" cy="584775"/>
           </a:xfrm>
           <a:prstGeom prst="rect">
@@ -5053,11 +4979,6 @@
               </a:rPr>
               <a:t>Text of new snippet</a:t>
             </a:r>
-            <a:endParaRPr lang="en-US" sz="1600" dirty="0" smtClean="0">
-              <a:solidFill>
-                <a:srgbClr val="000000"/>
-              </a:solidFill>
-            </a:endParaRPr>
           </a:p>
         </p:txBody>
       </p:sp>
@@ -5092,11 +5013,6 @@
               </a:rPr>
               <a:t>Selected Claim</a:t>
             </a:r>
-            <a:endParaRPr lang="en-US" sz="1600" dirty="0" smtClean="0">
-              <a:solidFill>
-                <a:srgbClr val="000000"/>
-              </a:solidFill>
-            </a:endParaRPr>
           </a:p>
         </p:txBody>
       </p:sp>
@@ -5195,8 +5111,8 @@
         </p:nvCxnSpPr>
         <p:spPr bwMode="auto">
           <a:xfrm rot="5400000">
-            <a:off x="2019697" y="3238103"/>
-            <a:ext cx="1600200" cy="794"/>
+            <a:off x="1600597" y="2819003"/>
+            <a:ext cx="2438400" cy="794"/>
           </a:xfrm>
           <a:prstGeom prst="line">
             <a:avLst/>
@@ -5224,7 +5140,7 @@
         </p:nvCxnSpPr>
         <p:spPr bwMode="auto">
           <a:xfrm>
-            <a:off x="2438400" y="2399507"/>
+            <a:off x="2590800" y="2895600"/>
             <a:ext cx="228600" cy="1588"/>
           </a:xfrm>
           <a:prstGeom prst="line">
@@ -5301,11 +5217,6 @@
               </a:rPr>
               <a:t>Claims supporting or opposing the selected claim</a:t>
             </a:r>
-            <a:endParaRPr lang="en-US" sz="1400" dirty="0" smtClean="0">
-              <a:solidFill>
-                <a:srgbClr val="000000"/>
-              </a:solidFill>
-            </a:endParaRPr>
           </a:p>
         </p:txBody>
       </p:sp>
@@ -5340,11 +5251,6 @@
               </a:rPr>
               <a:t>Search for claims to connect to the selected claim</a:t>
             </a:r>
-            <a:endParaRPr lang="en-US" sz="1400" dirty="0" smtClean="0">
-              <a:solidFill>
-                <a:srgbClr val="000000"/>
-              </a:solidFill>
-            </a:endParaRPr>
           </a:p>
         </p:txBody>
       </p:sp>
@@ -5379,11 +5285,6 @@
               </a:rPr>
               <a:t>Selected Claim</a:t>
             </a:r>
-            <a:endParaRPr lang="en-US" sz="1400" dirty="0" smtClean="0">
-              <a:solidFill>
-                <a:srgbClr val="000000"/>
-              </a:solidFill>
-            </a:endParaRPr>
           </a:p>
         </p:txBody>
       </p:sp>
@@ -5587,11 +5488,6 @@
               </a:rPr>
               <a:t>Claims that this claim supports or opposes</a:t>
             </a:r>
-            <a:endParaRPr lang="en-US" sz="1400" dirty="0" smtClean="0">
-              <a:solidFill>
-                <a:srgbClr val="000000"/>
-              </a:solidFill>
-            </a:endParaRPr>
           </a:p>
         </p:txBody>
       </p:sp>
@@ -5654,11 +5550,6 @@
               </a:rPr>
               <a:t>Snippets that make this claim</a:t>
             </a:r>
-            <a:endParaRPr lang="en-US" sz="1400" dirty="0" smtClean="0">
-              <a:solidFill>
-                <a:srgbClr val="000000"/>
-              </a:solidFill>
-            </a:endParaRPr>
           </a:p>
         </p:txBody>
       </p:sp>
@@ -5779,11 +5670,6 @@
               </a:rPr>
               <a:t>Topics that this claim is about</a:t>
             </a:r>
-            <a:endParaRPr lang="en-US" sz="1400" dirty="0" smtClean="0">
-              <a:solidFill>
-                <a:srgbClr val="000000"/>
-              </a:solidFill>
-            </a:endParaRPr>
           </a:p>
         </p:txBody>
       </p:sp>
@@ -5872,11 +5758,6 @@
               </a:rPr>
               <a:t>Claims supporting or opposing the selected claim</a:t>
             </a:r>
-            <a:endParaRPr lang="en-US" sz="1400" dirty="0" smtClean="0">
-              <a:solidFill>
-                <a:srgbClr val="000000"/>
-              </a:solidFill>
-            </a:endParaRPr>
           </a:p>
         </p:txBody>
       </p:sp>
@@ -5911,11 +5792,6 @@
               </a:rPr>
               <a:t>Search for claims to connect to the selected claim</a:t>
             </a:r>
-            <a:endParaRPr lang="en-US" sz="1400" dirty="0" smtClean="0">
-              <a:solidFill>
-                <a:srgbClr val="000000"/>
-              </a:solidFill>
-            </a:endParaRPr>
           </a:p>
         </p:txBody>
       </p:sp>
@@ -5950,11 +5826,6 @@
               </a:rPr>
               <a:t>Selected Claim</a:t>
             </a:r>
-            <a:endParaRPr lang="en-US" sz="1400" dirty="0" smtClean="0">
-              <a:solidFill>
-                <a:srgbClr val="000000"/>
-              </a:solidFill>
-            </a:endParaRPr>
           </a:p>
         </p:txBody>
       </p:sp>
@@ -6158,11 +6029,6 @@
               </a:rPr>
               <a:t>Claims that this claim supports or opposes</a:t>
             </a:r>
-            <a:endParaRPr lang="en-US" sz="1400" dirty="0" smtClean="0">
-              <a:solidFill>
-                <a:srgbClr val="000000"/>
-              </a:solidFill>
-            </a:endParaRPr>
           </a:p>
         </p:txBody>
       </p:sp>
@@ -6226,11 +6092,6 @@
               </a:rPr>
               <a:t>Snippets that make this claim</a:t>
             </a:r>
-            <a:endParaRPr lang="en-US" sz="1400" dirty="0" smtClean="0">
-              <a:solidFill>
-                <a:srgbClr val="000000"/>
-              </a:solidFill>
-            </a:endParaRPr>
           </a:p>
         </p:txBody>
       </p:sp>
@@ -6351,11 +6212,6 @@
               </a:rPr>
               <a:t>Topics that this claim is about</a:t>
             </a:r>
-            <a:endParaRPr lang="en-US" sz="1400" dirty="0" smtClean="0">
-              <a:solidFill>
-                <a:srgbClr val="000000"/>
-              </a:solidFill>
-            </a:endParaRPr>
           </a:p>
         </p:txBody>
       </p:sp>
@@ -6440,11 +6296,6 @@
               </a:rPr>
               <a:t>Claim Browser</a:t>
             </a:r>
-            <a:endParaRPr lang="en-US" sz="1600" dirty="0" smtClean="0">
-              <a:solidFill>
-                <a:srgbClr val="000000"/>
-              </a:solidFill>
-            </a:endParaRPr>
           </a:p>
         </p:txBody>
       </p:sp>
@@ -6537,11 +6388,6 @@
               </a:rPr>
               <a:t>Rename  or delete the selected claim</a:t>
             </a:r>
-            <a:endParaRPr lang="en-US" sz="1600" dirty="0" smtClean="0">
-              <a:solidFill>
-                <a:srgbClr val="000000"/>
-              </a:solidFill>
-            </a:endParaRPr>
           </a:p>
         </p:txBody>
       </p:sp>
@@ -6634,11 +6480,6 @@
               </a:rPr>
               <a:t>Quick Lists</a:t>
             </a:r>
-            <a:endParaRPr lang="en-US" sz="1600" dirty="0" smtClean="0">
-              <a:solidFill>
-                <a:srgbClr val="000000"/>
-              </a:solidFill>
-            </a:endParaRPr>
           </a:p>
         </p:txBody>
       </p:sp>
@@ -6900,11 +6741,6 @@
               </a:rPr>
               <a:t>Claim</a:t>
             </a:r>
-            <a:endParaRPr lang="en-US" sz="1200" dirty="0" smtClean="0">
-              <a:solidFill>
-                <a:srgbClr val="000000"/>
-              </a:solidFill>
-            </a:endParaRPr>
           </a:p>
         </p:txBody>
       </p:sp>
@@ -6939,11 +6775,6 @@
               </a:rPr>
               <a:t>Topic</a:t>
             </a:r>
-            <a:endParaRPr lang="en-US" sz="1200" dirty="0" smtClean="0">
-              <a:solidFill>
-                <a:srgbClr val="000000"/>
-              </a:solidFill>
-            </a:endParaRPr>
           </a:p>
         </p:txBody>
       </p:sp>
@@ -6978,11 +6809,6 @@
               </a:rPr>
               <a:t>Snippet</a:t>
             </a:r>
-            <a:endParaRPr lang="en-US" sz="1200" dirty="0" smtClean="0">
-              <a:solidFill>
-                <a:srgbClr val="000000"/>
-              </a:solidFill>
-            </a:endParaRPr>
           </a:p>
         </p:txBody>
       </p:sp>
@@ -7106,11 +6932,6 @@
               </a:rPr>
               <a:t>Bookmarked</a:t>
             </a:r>
-            <a:endParaRPr lang="en-US" sz="1200" dirty="0" smtClean="0">
-              <a:solidFill>
-                <a:srgbClr val="000000"/>
-              </a:solidFill>
-            </a:endParaRPr>
           </a:p>
         </p:txBody>
       </p:sp>
@@ -7144,11 +6965,6 @@
               </a:rPr>
               <a:t>Normal</a:t>
             </a:r>
-            <a:endParaRPr lang="en-US" sz="1200" dirty="0" smtClean="0">
-              <a:solidFill>
-                <a:srgbClr val="000000"/>
-              </a:solidFill>
-            </a:endParaRPr>
           </a:p>
         </p:txBody>
       </p:sp>
@@ -7327,11 +7143,6 @@
               </a:rPr>
               <a:t>Supported</a:t>
             </a:r>
-            <a:endParaRPr lang="en-US" sz="1200" dirty="0" smtClean="0">
-              <a:solidFill>
-                <a:srgbClr val="000000"/>
-              </a:solidFill>
-            </a:endParaRPr>
           </a:p>
         </p:txBody>
       </p:sp>
@@ -7366,11 +7177,6 @@
               </a:rPr>
               <a:t>Neither</a:t>
             </a:r>
-            <a:endParaRPr lang="en-US" sz="1200" dirty="0" smtClean="0">
-              <a:solidFill>
-                <a:srgbClr val="000000"/>
-              </a:solidFill>
-            </a:endParaRPr>
           </a:p>
         </p:txBody>
       </p:sp>
@@ -7405,11 +7211,6 @@
               </a:rPr>
               <a:t>Opposed</a:t>
             </a:r>
-            <a:endParaRPr lang="en-US" sz="1200" dirty="0" smtClean="0">
-              <a:solidFill>
-                <a:srgbClr val="000000"/>
-              </a:solidFill>
-            </a:endParaRPr>
           </a:p>
         </p:txBody>
       </p:sp>
@@ -7533,11 +7334,6 @@
               </a:rPr>
               <a:t>Bookmarked</a:t>
             </a:r>
-            <a:endParaRPr lang="en-US" sz="1200" dirty="0" smtClean="0">
-              <a:solidFill>
-                <a:srgbClr val="000000"/>
-              </a:solidFill>
-            </a:endParaRPr>
           </a:p>
         </p:txBody>
       </p:sp>
@@ -7571,11 +7367,6 @@
               </a:rPr>
               <a:t>Normal</a:t>
             </a:r>
-            <a:endParaRPr lang="en-US" sz="1200" dirty="0" smtClean="0">
-              <a:solidFill>
-                <a:srgbClr val="000000"/>
-              </a:solidFill>
-            </a:endParaRPr>
           </a:p>
         </p:txBody>
       </p:sp>

</xml_diff>

<commit_message>
Re-did the user study findings. Improved some figures.
</commit_message>
<xml_diff>
--- a/papers/diagrams.pptx
+++ b/papers/diagrams.pptx
@@ -13,7 +13,8 @@
     <p:sldId id="263" r:id="rId7"/>
     <p:sldId id="264" r:id="rId8"/>
     <p:sldId id="261" r:id="rId9"/>
-    <p:sldId id="262" r:id="rId10"/>
+    <p:sldId id="265" r:id="rId10"/>
+    <p:sldId id="262" r:id="rId11"/>
   </p:sldIdLst>
   <p:sldSz cx="9144000" cy="6858000" type="screen4x3"/>
   <p:notesSz cx="6858000" cy="9144000"/>
@@ -297,7 +298,7 @@
             <a:fld id="{4D48661F-B396-4702-B33E-1E9FB6086F60}" type="datetimeFigureOut">
               <a:rPr lang="en-US" smtClean="0"/>
               <a:pPr/>
-              <a:t>9/17/2008</a:t>
+              <a:t>9/18/2008</a:t>
             </a:fld>
             <a:endParaRPr lang="en-US"/>
           </a:p>
@@ -464,7 +465,7 @@
             <a:fld id="{4D48661F-B396-4702-B33E-1E9FB6086F60}" type="datetimeFigureOut">
               <a:rPr lang="en-US" smtClean="0"/>
               <a:pPr/>
-              <a:t>9/17/2008</a:t>
+              <a:t>9/18/2008</a:t>
             </a:fld>
             <a:endParaRPr lang="en-US"/>
           </a:p>
@@ -641,7 +642,7 @@
             <a:fld id="{4D48661F-B396-4702-B33E-1E9FB6086F60}" type="datetimeFigureOut">
               <a:rPr lang="en-US" smtClean="0"/>
               <a:pPr/>
-              <a:t>9/17/2008</a:t>
+              <a:t>9/18/2008</a:t>
             </a:fld>
             <a:endParaRPr lang="en-US"/>
           </a:p>
@@ -808,7 +809,7 @@
             <a:fld id="{4D48661F-B396-4702-B33E-1E9FB6086F60}" type="datetimeFigureOut">
               <a:rPr lang="en-US" smtClean="0"/>
               <a:pPr/>
-              <a:t>9/17/2008</a:t>
+              <a:t>9/18/2008</a:t>
             </a:fld>
             <a:endParaRPr lang="en-US"/>
           </a:p>
@@ -1051,7 +1052,7 @@
             <a:fld id="{4D48661F-B396-4702-B33E-1E9FB6086F60}" type="datetimeFigureOut">
               <a:rPr lang="en-US" smtClean="0"/>
               <a:pPr/>
-              <a:t>9/17/2008</a:t>
+              <a:t>9/18/2008</a:t>
             </a:fld>
             <a:endParaRPr lang="en-US"/>
           </a:p>
@@ -1336,7 +1337,7 @@
             <a:fld id="{4D48661F-B396-4702-B33E-1E9FB6086F60}" type="datetimeFigureOut">
               <a:rPr lang="en-US" smtClean="0"/>
               <a:pPr/>
-              <a:t>9/17/2008</a:t>
+              <a:t>9/18/2008</a:t>
             </a:fld>
             <a:endParaRPr lang="en-US"/>
           </a:p>
@@ -1755,7 +1756,7 @@
             <a:fld id="{4D48661F-B396-4702-B33E-1E9FB6086F60}" type="datetimeFigureOut">
               <a:rPr lang="en-US" smtClean="0"/>
               <a:pPr/>
-              <a:t>9/17/2008</a:t>
+              <a:t>9/18/2008</a:t>
             </a:fld>
             <a:endParaRPr lang="en-US"/>
           </a:p>
@@ -1870,7 +1871,7 @@
             <a:fld id="{4D48661F-B396-4702-B33E-1E9FB6086F60}" type="datetimeFigureOut">
               <a:rPr lang="en-US" smtClean="0"/>
               <a:pPr/>
-              <a:t>9/17/2008</a:t>
+              <a:t>9/18/2008</a:t>
             </a:fld>
             <a:endParaRPr lang="en-US"/>
           </a:p>
@@ -1962,7 +1963,7 @@
             <a:fld id="{4D48661F-B396-4702-B33E-1E9FB6086F60}" type="datetimeFigureOut">
               <a:rPr lang="en-US" smtClean="0"/>
               <a:pPr/>
-              <a:t>9/17/2008</a:t>
+              <a:t>9/18/2008</a:t>
             </a:fld>
             <a:endParaRPr lang="en-US"/>
           </a:p>
@@ -2236,7 +2237,7 @@
             <a:fld id="{4D48661F-B396-4702-B33E-1E9FB6086F60}" type="datetimeFigureOut">
               <a:rPr lang="en-US" smtClean="0"/>
               <a:pPr/>
-              <a:t>9/17/2008</a:t>
+              <a:t>9/18/2008</a:t>
             </a:fld>
             <a:endParaRPr lang="en-US"/>
           </a:p>
@@ -2486,7 +2487,7 @@
             <a:fld id="{4D48661F-B396-4702-B33E-1E9FB6086F60}" type="datetimeFigureOut">
               <a:rPr lang="en-US" smtClean="0"/>
               <a:pPr/>
-              <a:t>9/17/2008</a:t>
+              <a:t>9/18/2008</a:t>
             </a:fld>
             <a:endParaRPr lang="en-US"/>
           </a:p>
@@ -2696,7 +2697,7 @@
             <a:fld id="{4D48661F-B396-4702-B33E-1E9FB6086F60}" type="datetimeFigureOut">
               <a:rPr lang="en-US" smtClean="0"/>
               <a:pPr/>
-              <a:t>9/17/2008</a:t>
+              <a:t>9/18/2008</a:t>
             </a:fld>
             <a:endParaRPr lang="en-US"/>
           </a:p>
@@ -3519,6 +3520,835 @@
 </p:sld>
 </file>
 
+<file path=ppt/slides/slide10.xml><?xml version="1.0" encoding="utf-8"?>
+<p:sld xmlns:a="http://schemas.openxmlformats.org/drawingml/2006/main" xmlns:r="http://schemas.openxmlformats.org/officeDocument/2006/relationships" xmlns:p="http://schemas.openxmlformats.org/presentationml/2006/main">
+  <p:cSld>
+    <p:spTree>
+      <p:nvGrpSpPr>
+        <p:cNvPr id="1" name=""/>
+        <p:cNvGrpSpPr/>
+        <p:nvPr/>
+      </p:nvGrpSpPr>
+      <p:grpSpPr>
+        <a:xfrm>
+          <a:off x="0" y="0"/>
+          <a:ext cx="0" cy="0"/>
+          <a:chOff x="0" y="0"/>
+          <a:chExt cx="0" cy="0"/>
+        </a:xfrm>
+      </p:grpSpPr>
+      <p:pic>
+        <p:nvPicPr>
+          <p:cNvPr id="4" name="Picture 3" descr="comment.png"/>
+          <p:cNvPicPr>
+            <a:picLocks noChangeAspect="1"/>
+          </p:cNvPicPr>
+          <p:nvPr/>
+        </p:nvPicPr>
+        <p:blipFill>
+          <a:blip r:embed="rId2"/>
+          <a:stretch>
+            <a:fillRect/>
+          </a:stretch>
+        </p:blipFill>
+        <p:spPr>
+          <a:xfrm>
+            <a:off x="1927629" y="1195000"/>
+            <a:ext cx="304800" cy="304800"/>
+          </a:xfrm>
+          <a:prstGeom prst="rect">
+            <a:avLst/>
+          </a:prstGeom>
+        </p:spPr>
+      </p:pic>
+      <p:pic>
+        <p:nvPicPr>
+          <p:cNvPr id="5" name="Picture 4" descr="comment_yellow.png"/>
+          <p:cNvPicPr>
+            <a:picLocks noChangeAspect="1"/>
+          </p:cNvPicPr>
+          <p:nvPr/>
+        </p:nvPicPr>
+        <p:blipFill>
+          <a:blip r:embed="rId3"/>
+          <a:stretch>
+            <a:fillRect/>
+          </a:stretch>
+        </p:blipFill>
+        <p:spPr>
+          <a:xfrm>
+            <a:off x="2461048" y="1195019"/>
+            <a:ext cx="304763" cy="304763"/>
+          </a:xfrm>
+          <a:prstGeom prst="rect">
+            <a:avLst/>
+          </a:prstGeom>
+        </p:spPr>
+      </p:pic>
+      <p:pic>
+        <p:nvPicPr>
+          <p:cNvPr id="6" name="Picture 5" descr="folder.png"/>
+          <p:cNvPicPr>
+            <a:picLocks noChangeAspect="1"/>
+          </p:cNvPicPr>
+          <p:nvPr/>
+        </p:nvPicPr>
+        <p:blipFill>
+          <a:blip r:embed="rId4"/>
+          <a:stretch>
+            <a:fillRect/>
+          </a:stretch>
+        </p:blipFill>
+        <p:spPr>
+          <a:xfrm>
+            <a:off x="2499129" y="1576009"/>
+            <a:ext cx="228600" cy="228600"/>
+          </a:xfrm>
+          <a:prstGeom prst="rect">
+            <a:avLst/>
+          </a:prstGeom>
+        </p:spPr>
+      </p:pic>
+      <p:pic>
+        <p:nvPicPr>
+          <p:cNvPr id="7" name="Picture 6" descr="folder_grey.png"/>
+          <p:cNvPicPr>
+            <a:picLocks noChangeAspect="1"/>
+          </p:cNvPicPr>
+          <p:nvPr/>
+        </p:nvPicPr>
+        <p:blipFill>
+          <a:blip r:embed="rId5"/>
+          <a:stretch>
+            <a:fillRect/>
+          </a:stretch>
+        </p:blipFill>
+        <p:spPr>
+          <a:xfrm>
+            <a:off x="1965729" y="1576009"/>
+            <a:ext cx="228600" cy="228600"/>
+          </a:xfrm>
+          <a:prstGeom prst="rect">
+            <a:avLst/>
+          </a:prstGeom>
+        </p:spPr>
+      </p:pic>
+      <p:pic>
+        <p:nvPicPr>
+          <p:cNvPr id="8" name="Picture 7" descr="lightbulb.png"/>
+          <p:cNvPicPr>
+            <a:picLocks noChangeAspect="1"/>
+          </p:cNvPicPr>
+          <p:nvPr/>
+        </p:nvPicPr>
+        <p:blipFill>
+          <a:blip r:embed="rId6"/>
+          <a:stretch>
+            <a:fillRect/>
+          </a:stretch>
+        </p:blipFill>
+        <p:spPr>
+          <a:xfrm>
+            <a:off x="2499129" y="814000"/>
+            <a:ext cx="228600" cy="228600"/>
+          </a:xfrm>
+          <a:prstGeom prst="rect">
+            <a:avLst/>
+          </a:prstGeom>
+        </p:spPr>
+      </p:pic>
+      <p:pic>
+        <p:nvPicPr>
+          <p:cNvPr id="9" name="Picture 8" descr="lightbulb_off.png"/>
+          <p:cNvPicPr>
+            <a:picLocks noChangeAspect="1"/>
+          </p:cNvPicPr>
+          <p:nvPr/>
+        </p:nvPicPr>
+        <p:blipFill>
+          <a:blip r:embed="rId7"/>
+          <a:stretch>
+            <a:fillRect/>
+          </a:stretch>
+        </p:blipFill>
+        <p:spPr>
+          <a:xfrm>
+            <a:off x="1965729" y="814000"/>
+            <a:ext cx="228600" cy="228600"/>
+          </a:xfrm>
+          <a:prstGeom prst="rect">
+            <a:avLst/>
+          </a:prstGeom>
+        </p:spPr>
+      </p:pic>
+      <p:sp>
+        <p:nvSpPr>
+          <p:cNvPr id="10" name="TextBox 9"/>
+          <p:cNvSpPr txBox="1"/>
+          <p:nvPr/>
+        </p:nvSpPr>
+        <p:spPr>
+          <a:xfrm>
+            <a:off x="1219200" y="789801"/>
+            <a:ext cx="594129" cy="276999"/>
+          </a:xfrm>
+          <a:prstGeom prst="rect">
+            <a:avLst/>
+          </a:prstGeom>
+          <a:noFill/>
+        </p:spPr>
+        <p:txBody>
+          <a:bodyPr wrap="square" rtlCol="0">
+            <a:spAutoFit/>
+          </a:bodyPr>
+          <a:lstStyle/>
+          <a:p>
+            <a:pPr algn="r"/>
+            <a:r>
+              <a:rPr lang="en-US" sz="1200" dirty="0" smtClean="0">
+                <a:solidFill>
+                  <a:srgbClr val="000000"/>
+                </a:solidFill>
+              </a:rPr>
+              <a:t>Claim</a:t>
+            </a:r>
+          </a:p>
+        </p:txBody>
+      </p:sp>
+      <p:sp>
+        <p:nvSpPr>
+          <p:cNvPr id="11" name="TextBox 10"/>
+          <p:cNvSpPr txBox="1"/>
+          <p:nvPr/>
+        </p:nvSpPr>
+        <p:spPr>
+          <a:xfrm>
+            <a:off x="1219200" y="1551810"/>
+            <a:ext cx="594129" cy="276999"/>
+          </a:xfrm>
+          <a:prstGeom prst="rect">
+            <a:avLst/>
+          </a:prstGeom>
+          <a:noFill/>
+        </p:spPr>
+        <p:txBody>
+          <a:bodyPr wrap="square" rtlCol="0">
+            <a:spAutoFit/>
+          </a:bodyPr>
+          <a:lstStyle/>
+          <a:p>
+            <a:pPr algn="r"/>
+            <a:r>
+              <a:rPr lang="en-US" sz="1200" dirty="0" smtClean="0">
+                <a:solidFill>
+                  <a:srgbClr val="000000"/>
+                </a:solidFill>
+              </a:rPr>
+              <a:t>Topic</a:t>
+            </a:r>
+          </a:p>
+        </p:txBody>
+      </p:sp>
+      <p:sp>
+        <p:nvSpPr>
+          <p:cNvPr id="12" name="TextBox 11"/>
+          <p:cNvSpPr txBox="1"/>
+          <p:nvPr/>
+        </p:nvSpPr>
+        <p:spPr>
+          <a:xfrm>
+            <a:off x="1066800" y="1189851"/>
+            <a:ext cx="746529" cy="276999"/>
+          </a:xfrm>
+          <a:prstGeom prst="rect">
+            <a:avLst/>
+          </a:prstGeom>
+          <a:noFill/>
+        </p:spPr>
+        <p:txBody>
+          <a:bodyPr wrap="square" rtlCol="0">
+            <a:spAutoFit/>
+          </a:bodyPr>
+          <a:lstStyle/>
+          <a:p>
+            <a:pPr algn="r"/>
+            <a:r>
+              <a:rPr lang="en-US" sz="1200" dirty="0" smtClean="0">
+                <a:solidFill>
+                  <a:srgbClr val="000000"/>
+                </a:solidFill>
+              </a:rPr>
+              <a:t>Snippet</a:t>
+            </a:r>
+          </a:p>
+        </p:txBody>
+      </p:sp>
+      <p:cxnSp>
+        <p:nvCxnSpPr>
+          <p:cNvPr id="14" name="Straight Connector 13"/>
+          <p:cNvCxnSpPr/>
+          <p:nvPr/>
+        </p:nvCxnSpPr>
+        <p:spPr>
+          <a:xfrm>
+            <a:off x="1279929" y="1143000"/>
+            <a:ext cx="1676400" cy="1588"/>
+          </a:xfrm>
+          <a:prstGeom prst="line">
+            <a:avLst/>
+          </a:prstGeom>
+        </p:spPr>
+        <p:style>
+          <a:lnRef idx="1">
+            <a:schemeClr val="accent1"/>
+          </a:lnRef>
+          <a:fillRef idx="0">
+            <a:schemeClr val="accent1"/>
+          </a:fillRef>
+          <a:effectRef idx="0">
+            <a:schemeClr val="accent1"/>
+          </a:effectRef>
+          <a:fontRef idx="minor">
+            <a:schemeClr val="tx1"/>
+          </a:fontRef>
+        </p:style>
+      </p:cxnSp>
+      <p:cxnSp>
+        <p:nvCxnSpPr>
+          <p:cNvPr id="15" name="Straight Connector 14"/>
+          <p:cNvCxnSpPr/>
+          <p:nvPr/>
+        </p:nvCxnSpPr>
+        <p:spPr>
+          <a:xfrm>
+            <a:off x="1279929" y="1524000"/>
+            <a:ext cx="1676400" cy="1588"/>
+          </a:xfrm>
+          <a:prstGeom prst="line">
+            <a:avLst/>
+          </a:prstGeom>
+        </p:spPr>
+        <p:style>
+          <a:lnRef idx="1">
+            <a:schemeClr val="accent1"/>
+          </a:lnRef>
+          <a:fillRef idx="0">
+            <a:schemeClr val="accent1"/>
+          </a:fillRef>
+          <a:effectRef idx="0">
+            <a:schemeClr val="accent1"/>
+          </a:effectRef>
+          <a:fontRef idx="minor">
+            <a:schemeClr val="tx1"/>
+          </a:fontRef>
+        </p:style>
+      </p:cxnSp>
+      <p:cxnSp>
+        <p:nvCxnSpPr>
+          <p:cNvPr id="16" name="Straight Connector 15"/>
+          <p:cNvCxnSpPr/>
+          <p:nvPr/>
+        </p:nvCxnSpPr>
+        <p:spPr>
+          <a:xfrm rot="5400000">
+            <a:off x="1775229" y="1333500"/>
+            <a:ext cx="1143000" cy="1588"/>
+          </a:xfrm>
+          <a:prstGeom prst="line">
+            <a:avLst/>
+          </a:prstGeom>
+        </p:spPr>
+        <p:style>
+          <a:lnRef idx="1">
+            <a:schemeClr val="accent1"/>
+          </a:lnRef>
+          <a:fillRef idx="0">
+            <a:schemeClr val="accent1"/>
+          </a:fillRef>
+          <a:effectRef idx="0">
+            <a:schemeClr val="accent1"/>
+          </a:effectRef>
+          <a:fontRef idx="minor">
+            <a:schemeClr val="tx1"/>
+          </a:fontRef>
+        </p:style>
+      </p:cxnSp>
+      <p:sp>
+        <p:nvSpPr>
+          <p:cNvPr id="21" name="TextBox 20"/>
+          <p:cNvSpPr txBox="1"/>
+          <p:nvPr/>
+        </p:nvSpPr>
+        <p:spPr>
+          <a:xfrm rot="18851434">
+            <a:off x="2349100" y="193379"/>
+            <a:ext cx="1143000" cy="276999"/>
+          </a:xfrm>
+          <a:prstGeom prst="rect">
+            <a:avLst/>
+          </a:prstGeom>
+          <a:noFill/>
+        </p:spPr>
+        <p:txBody>
+          <a:bodyPr wrap="square" rtlCol="0">
+            <a:spAutoFit/>
+          </a:bodyPr>
+          <a:lstStyle/>
+          <a:p>
+            <a:r>
+              <a:rPr lang="en-US" sz="1200" dirty="0" smtClean="0">
+                <a:solidFill>
+                  <a:srgbClr val="000000"/>
+                </a:solidFill>
+              </a:rPr>
+              <a:t>Bookmarked</a:t>
+            </a:r>
+          </a:p>
+        </p:txBody>
+      </p:sp>
+      <p:sp>
+        <p:nvSpPr>
+          <p:cNvPr id="22" name="TextBox 21"/>
+          <p:cNvSpPr txBox="1"/>
+          <p:nvPr/>
+        </p:nvSpPr>
+        <p:spPr>
+          <a:xfrm rot="18851434">
+            <a:off x="1815700" y="193379"/>
+            <a:ext cx="1143000" cy="276999"/>
+          </a:xfrm>
+          <a:prstGeom prst="rect">
+            <a:avLst/>
+          </a:prstGeom>
+          <a:noFill/>
+        </p:spPr>
+        <p:txBody>
+          <a:bodyPr wrap="square" rtlCol="0">
+            <a:spAutoFit/>
+          </a:bodyPr>
+          <a:lstStyle/>
+          <a:p>
+            <a:r>
+              <a:rPr lang="en-US" sz="1200" dirty="0" smtClean="0">
+                <a:solidFill>
+                  <a:srgbClr val="000000"/>
+                </a:solidFill>
+              </a:rPr>
+              <a:t>Normal</a:t>
+            </a:r>
+          </a:p>
+        </p:txBody>
+      </p:sp>
+      <p:pic>
+        <p:nvPicPr>
+          <p:cNvPr id="23" name="Picture 22" descr="lightbulb_green.png"/>
+          <p:cNvPicPr>
+            <a:picLocks noChangeAspect="1"/>
+          </p:cNvPicPr>
+          <p:nvPr/>
+        </p:nvPicPr>
+        <p:blipFill>
+          <a:blip r:embed="rId8"/>
+          <a:stretch>
+            <a:fillRect/>
+          </a:stretch>
+        </p:blipFill>
+        <p:spPr>
+          <a:xfrm>
+            <a:off x="4262458" y="837406"/>
+            <a:ext cx="203175" cy="203175"/>
+          </a:xfrm>
+          <a:prstGeom prst="rect">
+            <a:avLst/>
+          </a:prstGeom>
+        </p:spPr>
+      </p:pic>
+      <p:pic>
+        <p:nvPicPr>
+          <p:cNvPr id="24" name="Picture 23" descr="lightbulb_greenyellow.png"/>
+          <p:cNvPicPr>
+            <a:picLocks noChangeAspect="1"/>
+          </p:cNvPicPr>
+          <p:nvPr/>
+        </p:nvPicPr>
+        <p:blipFill>
+          <a:blip r:embed="rId9"/>
+          <a:stretch>
+            <a:fillRect/>
+          </a:stretch>
+        </p:blipFill>
+        <p:spPr>
+          <a:xfrm>
+            <a:off x="4719658" y="837406"/>
+            <a:ext cx="203175" cy="203175"/>
+          </a:xfrm>
+          <a:prstGeom prst="rect">
+            <a:avLst/>
+          </a:prstGeom>
+        </p:spPr>
+      </p:pic>
+      <p:pic>
+        <p:nvPicPr>
+          <p:cNvPr id="25" name="Picture 24" descr="lightbulb_red.png"/>
+          <p:cNvPicPr>
+            <a:picLocks noChangeAspect="1"/>
+          </p:cNvPicPr>
+          <p:nvPr/>
+        </p:nvPicPr>
+        <p:blipFill>
+          <a:blip r:embed="rId10"/>
+          <a:stretch>
+            <a:fillRect/>
+          </a:stretch>
+        </p:blipFill>
+        <p:spPr>
+          <a:xfrm>
+            <a:off x="4262458" y="1218406"/>
+            <a:ext cx="203175" cy="203175"/>
+          </a:xfrm>
+          <a:prstGeom prst="rect">
+            <a:avLst/>
+          </a:prstGeom>
+        </p:spPr>
+      </p:pic>
+      <p:pic>
+        <p:nvPicPr>
+          <p:cNvPr id="26" name="Picture 25" descr="lightbulb_redyellow.png"/>
+          <p:cNvPicPr>
+            <a:picLocks noChangeAspect="1"/>
+          </p:cNvPicPr>
+          <p:nvPr/>
+        </p:nvPicPr>
+        <p:blipFill>
+          <a:blip r:embed="rId11"/>
+          <a:stretch>
+            <a:fillRect/>
+          </a:stretch>
+        </p:blipFill>
+        <p:spPr>
+          <a:xfrm>
+            <a:off x="4719658" y="1218406"/>
+            <a:ext cx="203175" cy="203175"/>
+          </a:xfrm>
+          <a:prstGeom prst="rect">
+            <a:avLst/>
+          </a:prstGeom>
+        </p:spPr>
+      </p:pic>
+      <p:pic>
+        <p:nvPicPr>
+          <p:cNvPr id="27" name="Picture 26" descr="lightbulb.png"/>
+          <p:cNvPicPr>
+            <a:picLocks noChangeAspect="1"/>
+          </p:cNvPicPr>
+          <p:nvPr/>
+        </p:nvPicPr>
+        <p:blipFill>
+          <a:blip r:embed="rId6"/>
+          <a:stretch>
+            <a:fillRect/>
+          </a:stretch>
+        </p:blipFill>
+        <p:spPr>
+          <a:xfrm>
+            <a:off x="4719658" y="1599406"/>
+            <a:ext cx="201168" cy="201168"/>
+          </a:xfrm>
+          <a:prstGeom prst="rect">
+            <a:avLst/>
+          </a:prstGeom>
+        </p:spPr>
+      </p:pic>
+      <p:pic>
+        <p:nvPicPr>
+          <p:cNvPr id="28" name="Picture 27" descr="lightbulb_off.png"/>
+          <p:cNvPicPr>
+            <a:picLocks noChangeAspect="1"/>
+          </p:cNvPicPr>
+          <p:nvPr/>
+        </p:nvPicPr>
+        <p:blipFill>
+          <a:blip r:embed="rId7"/>
+          <a:stretch>
+            <a:fillRect/>
+          </a:stretch>
+        </p:blipFill>
+        <p:spPr>
+          <a:xfrm>
+            <a:off x="4262458" y="1599406"/>
+            <a:ext cx="201168" cy="201168"/>
+          </a:xfrm>
+          <a:prstGeom prst="rect">
+            <a:avLst/>
+          </a:prstGeom>
+        </p:spPr>
+      </p:pic>
+      <p:sp>
+        <p:nvSpPr>
+          <p:cNvPr id="32" name="TextBox 31"/>
+          <p:cNvSpPr txBox="1"/>
+          <p:nvPr/>
+        </p:nvSpPr>
+        <p:spPr>
+          <a:xfrm>
+            <a:off x="3195658" y="789007"/>
+            <a:ext cx="838201" cy="276999"/>
+          </a:xfrm>
+          <a:prstGeom prst="rect">
+            <a:avLst/>
+          </a:prstGeom>
+          <a:noFill/>
+        </p:spPr>
+        <p:txBody>
+          <a:bodyPr wrap="square" rtlCol="0">
+            <a:spAutoFit/>
+          </a:bodyPr>
+          <a:lstStyle/>
+          <a:p>
+            <a:pPr algn="r"/>
+            <a:r>
+              <a:rPr lang="en-US" sz="1200" dirty="0" smtClean="0">
+                <a:solidFill>
+                  <a:srgbClr val="000000"/>
+                </a:solidFill>
+              </a:rPr>
+              <a:t>Supported</a:t>
+            </a:r>
+          </a:p>
+        </p:txBody>
+      </p:sp>
+      <p:sp>
+        <p:nvSpPr>
+          <p:cNvPr id="33" name="TextBox 32"/>
+          <p:cNvSpPr txBox="1"/>
+          <p:nvPr/>
+        </p:nvSpPr>
+        <p:spPr>
+          <a:xfrm>
+            <a:off x="3348059" y="1551016"/>
+            <a:ext cx="685800" cy="276999"/>
+          </a:xfrm>
+          <a:prstGeom prst="rect">
+            <a:avLst/>
+          </a:prstGeom>
+          <a:noFill/>
+        </p:spPr>
+        <p:txBody>
+          <a:bodyPr wrap="square" rtlCol="0">
+            <a:spAutoFit/>
+          </a:bodyPr>
+          <a:lstStyle/>
+          <a:p>
+            <a:pPr algn="r"/>
+            <a:r>
+              <a:rPr lang="en-US" sz="1200" dirty="0" smtClean="0">
+                <a:solidFill>
+                  <a:srgbClr val="000000"/>
+                </a:solidFill>
+              </a:rPr>
+              <a:t>Neither</a:t>
+            </a:r>
+          </a:p>
+        </p:txBody>
+      </p:sp>
+      <p:sp>
+        <p:nvSpPr>
+          <p:cNvPr id="34" name="TextBox 33"/>
+          <p:cNvSpPr txBox="1"/>
+          <p:nvPr/>
+        </p:nvSpPr>
+        <p:spPr>
+          <a:xfrm>
+            <a:off x="3287329" y="1189057"/>
+            <a:ext cx="746529" cy="276999"/>
+          </a:xfrm>
+          <a:prstGeom prst="rect">
+            <a:avLst/>
+          </a:prstGeom>
+          <a:noFill/>
+        </p:spPr>
+        <p:txBody>
+          <a:bodyPr wrap="square" rtlCol="0">
+            <a:spAutoFit/>
+          </a:bodyPr>
+          <a:lstStyle/>
+          <a:p>
+            <a:pPr algn="r"/>
+            <a:r>
+              <a:rPr lang="en-US" sz="1200" dirty="0" smtClean="0">
+                <a:solidFill>
+                  <a:srgbClr val="000000"/>
+                </a:solidFill>
+              </a:rPr>
+              <a:t>Opposed</a:t>
+            </a:r>
+          </a:p>
+        </p:txBody>
+      </p:sp>
+      <p:cxnSp>
+        <p:nvCxnSpPr>
+          <p:cNvPr id="35" name="Straight Connector 34"/>
+          <p:cNvCxnSpPr/>
+          <p:nvPr/>
+        </p:nvCxnSpPr>
+        <p:spPr>
+          <a:xfrm>
+            <a:off x="3500458" y="1142206"/>
+            <a:ext cx="1676400" cy="1588"/>
+          </a:xfrm>
+          <a:prstGeom prst="line">
+            <a:avLst/>
+          </a:prstGeom>
+        </p:spPr>
+        <p:style>
+          <a:lnRef idx="1">
+            <a:schemeClr val="accent1"/>
+          </a:lnRef>
+          <a:fillRef idx="0">
+            <a:schemeClr val="accent1"/>
+          </a:fillRef>
+          <a:effectRef idx="0">
+            <a:schemeClr val="accent1"/>
+          </a:effectRef>
+          <a:fontRef idx="minor">
+            <a:schemeClr val="tx1"/>
+          </a:fontRef>
+        </p:style>
+      </p:cxnSp>
+      <p:cxnSp>
+        <p:nvCxnSpPr>
+          <p:cNvPr id="36" name="Straight Connector 35"/>
+          <p:cNvCxnSpPr/>
+          <p:nvPr/>
+        </p:nvCxnSpPr>
+        <p:spPr>
+          <a:xfrm>
+            <a:off x="3500458" y="1523206"/>
+            <a:ext cx="1676400" cy="1588"/>
+          </a:xfrm>
+          <a:prstGeom prst="line">
+            <a:avLst/>
+          </a:prstGeom>
+        </p:spPr>
+        <p:style>
+          <a:lnRef idx="1">
+            <a:schemeClr val="accent1"/>
+          </a:lnRef>
+          <a:fillRef idx="0">
+            <a:schemeClr val="accent1"/>
+          </a:fillRef>
+          <a:effectRef idx="0">
+            <a:schemeClr val="accent1"/>
+          </a:effectRef>
+          <a:fontRef idx="minor">
+            <a:schemeClr val="tx1"/>
+          </a:fontRef>
+        </p:style>
+      </p:cxnSp>
+      <p:cxnSp>
+        <p:nvCxnSpPr>
+          <p:cNvPr id="37" name="Straight Connector 36"/>
+          <p:cNvCxnSpPr/>
+          <p:nvPr/>
+        </p:nvCxnSpPr>
+        <p:spPr>
+          <a:xfrm rot="5400000">
+            <a:off x="3995758" y="1332706"/>
+            <a:ext cx="1143000" cy="1588"/>
+          </a:xfrm>
+          <a:prstGeom prst="line">
+            <a:avLst/>
+          </a:prstGeom>
+        </p:spPr>
+        <p:style>
+          <a:lnRef idx="1">
+            <a:schemeClr val="accent1"/>
+          </a:lnRef>
+          <a:fillRef idx="0">
+            <a:schemeClr val="accent1"/>
+          </a:fillRef>
+          <a:effectRef idx="0">
+            <a:schemeClr val="accent1"/>
+          </a:effectRef>
+          <a:fontRef idx="minor">
+            <a:schemeClr val="tx1"/>
+          </a:fontRef>
+        </p:style>
+      </p:cxnSp>
+      <p:sp>
+        <p:nvSpPr>
+          <p:cNvPr id="38" name="TextBox 37"/>
+          <p:cNvSpPr txBox="1"/>
+          <p:nvPr/>
+        </p:nvSpPr>
+        <p:spPr>
+          <a:xfrm rot="18851434">
+            <a:off x="4569629" y="193379"/>
+            <a:ext cx="1143000" cy="276999"/>
+          </a:xfrm>
+          <a:prstGeom prst="rect">
+            <a:avLst/>
+          </a:prstGeom>
+          <a:noFill/>
+        </p:spPr>
+        <p:txBody>
+          <a:bodyPr wrap="square" rtlCol="0">
+            <a:spAutoFit/>
+          </a:bodyPr>
+          <a:lstStyle/>
+          <a:p>
+            <a:r>
+              <a:rPr lang="en-US" sz="1200" dirty="0" smtClean="0">
+                <a:solidFill>
+                  <a:srgbClr val="000000"/>
+                </a:solidFill>
+              </a:rPr>
+              <a:t>Bookmarked</a:t>
+            </a:r>
+          </a:p>
+        </p:txBody>
+      </p:sp>
+      <p:sp>
+        <p:nvSpPr>
+          <p:cNvPr id="39" name="TextBox 38"/>
+          <p:cNvSpPr txBox="1"/>
+          <p:nvPr/>
+        </p:nvSpPr>
+        <p:spPr>
+          <a:xfrm rot="18851434">
+            <a:off x="4036229" y="193379"/>
+            <a:ext cx="1143000" cy="276999"/>
+          </a:xfrm>
+          <a:prstGeom prst="rect">
+            <a:avLst/>
+          </a:prstGeom>
+          <a:noFill/>
+        </p:spPr>
+        <p:txBody>
+          <a:bodyPr wrap="square" rtlCol="0">
+            <a:spAutoFit/>
+          </a:bodyPr>
+          <a:lstStyle/>
+          <a:p>
+            <a:r>
+              <a:rPr lang="en-US" sz="1200" dirty="0" smtClean="0">
+                <a:solidFill>
+                  <a:srgbClr val="000000"/>
+                </a:solidFill>
+              </a:rPr>
+              <a:t>Normal</a:t>
+            </a:r>
+          </a:p>
+        </p:txBody>
+      </p:sp>
+    </p:spTree>
+  </p:cSld>
+  <p:clrMapOvr>
+    <a:masterClrMapping/>
+  </p:clrMapOvr>
+</p:sld>
+</file>
+
 <file path=ppt/slides/slide2.xml><?xml version="1.0" encoding="utf-8"?>
 <p:sld xmlns:a="http://schemas.openxmlformats.org/drawingml/2006/main" xmlns:r="http://schemas.openxmlformats.org/officeDocument/2006/relationships" xmlns:p="http://schemas.openxmlformats.org/presentationml/2006/main">
   <p:cSld>
@@ -4144,7 +4974,7 @@
         <p:spPr>
           <a:xfrm>
             <a:off x="914400" y="3276600"/>
-            <a:ext cx="1432329" cy="707886"/>
+            <a:ext cx="1432329" cy="400110"/>
           </a:xfrm>
           <a:prstGeom prst="rect">
             <a:avLst/>
@@ -4159,7 +4989,7 @@
           <a:p>
             <a:pPr algn="r"/>
             <a:r>
-              <a:rPr lang="en-US" sz="2000" b="1" dirty="0" smtClean="0">
+              <a:rPr lang="en-US" sz="2000" dirty="0" smtClean="0">
                 <a:solidFill>
                   <a:srgbClr val="000000"/>
                 </a:solidFill>
@@ -4177,8 +5007,8 @@
         </p:nvSpPr>
         <p:spPr>
           <a:xfrm>
-            <a:off x="3276600" y="1752600"/>
-            <a:ext cx="3200400" cy="400110"/>
+            <a:off x="3276600" y="1905000"/>
+            <a:ext cx="3429000" cy="400110"/>
           </a:xfrm>
           <a:prstGeom prst="rect">
             <a:avLst/>
@@ -4193,12 +5023,20 @@
           <a:p>
             <a:pPr algn="r"/>
             <a:r>
-              <a:rPr lang="en-US" sz="2000" b="1" dirty="0" smtClean="0">
+              <a:rPr lang="en-US" sz="2000" dirty="0" smtClean="0">
                 <a:solidFill>
                   <a:srgbClr val="000000"/>
                 </a:solidFill>
               </a:rPr>
-              <a:t>Add new supporting claim</a:t>
+              <a:t>Create new </a:t>
+            </a:r>
+            <a:r>
+              <a:rPr lang="en-US" sz="2000" dirty="0" smtClean="0">
+                <a:solidFill>
+                  <a:srgbClr val="000000"/>
+                </a:solidFill>
+              </a:rPr>
+              <a:t>supporting claim</a:t>
             </a:r>
           </a:p>
         </p:txBody>
@@ -4211,8 +5049,37 @@
         </p:nvCxnSpPr>
         <p:spPr bwMode="auto">
           <a:xfrm flipV="1">
-            <a:off x="2438400" y="3124200"/>
-            <a:ext cx="609600" cy="495301"/>
+            <a:off x="2438400" y="3124201"/>
+            <a:ext cx="609600" cy="457199"/>
+          </a:xfrm>
+          <a:prstGeom prst="line">
+            <a:avLst/>
+          </a:prstGeom>
+          <a:solidFill>
+            <a:schemeClr val="accent1"/>
+          </a:solidFill>
+          <a:ln w="50800" cap="rnd" cmpd="sng" algn="ctr">
+            <a:solidFill>
+              <a:schemeClr val="tx1"/>
+            </a:solidFill>
+            <a:prstDash val="solid"/>
+            <a:round/>
+            <a:headEnd type="none" w="med" len="med"/>
+            <a:tailEnd type="none" w="med" len="med"/>
+          </a:ln>
+          <a:effectLst/>
+        </p:spPr>
+      </p:cxnSp>
+      <p:cxnSp>
+        <p:nvCxnSpPr>
+          <p:cNvPr id="28" name="Straight Connector 27"/>
+          <p:cNvCxnSpPr/>
+          <p:nvPr/>
+        </p:nvCxnSpPr>
+        <p:spPr bwMode="auto">
+          <a:xfrm rot="5400000">
+            <a:off x="4838700" y="2400300"/>
+            <a:ext cx="228600" cy="1588"/>
           </a:xfrm>
           <a:prstGeom prst="line">
             <a:avLst/>
@@ -4234,14 +5101,14 @@
       </p:cxnSp>
       <p:cxnSp>
         <p:nvCxnSpPr>
-          <p:cNvPr id="28" name="Straight Connector 27"/>
+          <p:cNvPr id="26" name="Straight Connector 25"/>
           <p:cNvCxnSpPr/>
           <p:nvPr/>
         </p:nvCxnSpPr>
         <p:spPr bwMode="auto">
-          <a:xfrm rot="5400000">
-            <a:off x="4762897" y="2323703"/>
-            <a:ext cx="381000" cy="794"/>
+          <a:xfrm flipV="1">
+            <a:off x="2438400" y="3429002"/>
+            <a:ext cx="609600" cy="152398"/>
           </a:xfrm>
           <a:prstGeom prst="line">
             <a:avLst/>
@@ -4249,7 +5116,7 @@
           <a:solidFill>
             <a:schemeClr val="accent1"/>
           </a:solidFill>
-          <a:ln w="50800" cap="flat" cmpd="sng" algn="ctr">
+          <a:ln w="50800" cap="rnd" cmpd="sng" algn="ctr">
             <a:solidFill>
               <a:schemeClr val="tx1"/>
             </a:solidFill>
@@ -4263,14 +5130,14 @@
       </p:cxnSp>
       <p:cxnSp>
         <p:nvCxnSpPr>
-          <p:cNvPr id="26" name="Straight Connector 25"/>
+          <p:cNvPr id="31" name="Straight Connector 30"/>
           <p:cNvCxnSpPr/>
           <p:nvPr/>
         </p:nvCxnSpPr>
         <p:spPr bwMode="auto">
-          <a:xfrm flipV="1">
-            <a:off x="2438400" y="3429000"/>
-            <a:ext cx="609600" cy="152401"/>
+          <a:xfrm>
+            <a:off x="2438400" y="3581400"/>
+            <a:ext cx="609600" cy="457200"/>
           </a:xfrm>
           <a:prstGeom prst="line">
             <a:avLst/>
@@ -4278,7 +5145,7 @@
           <a:solidFill>
             <a:schemeClr val="accent1"/>
           </a:solidFill>
-          <a:ln w="50800" cap="flat" cmpd="sng" algn="ctr">
+          <a:ln w="50800" cap="rnd" cmpd="sng" algn="ctr">
             <a:solidFill>
               <a:schemeClr val="tx1"/>
             </a:solidFill>
@@ -4292,35 +5159,6 @@
       </p:cxnSp>
       <p:cxnSp>
         <p:nvCxnSpPr>
-          <p:cNvPr id="31" name="Straight Connector 30"/>
-          <p:cNvCxnSpPr/>
-          <p:nvPr/>
-        </p:nvCxnSpPr>
-        <p:spPr bwMode="auto">
-          <a:xfrm>
-            <a:off x="2438400" y="3581400"/>
-            <a:ext cx="609600" cy="457200"/>
-          </a:xfrm>
-          <a:prstGeom prst="line">
-            <a:avLst/>
-          </a:prstGeom>
-          <a:solidFill>
-            <a:schemeClr val="accent1"/>
-          </a:solidFill>
-          <a:ln w="50800" cap="flat" cmpd="sng" algn="ctr">
-            <a:solidFill>
-              <a:schemeClr val="tx1"/>
-            </a:solidFill>
-            <a:prstDash val="solid"/>
-            <a:round/>
-            <a:headEnd type="none" w="med" len="med"/>
-            <a:tailEnd type="none" w="med" len="med"/>
-          </a:ln>
-          <a:effectLst/>
-        </p:spPr>
-      </p:cxnSp>
-      <p:cxnSp>
-        <p:nvCxnSpPr>
           <p:cNvPr id="36" name="Straight Connector 35"/>
           <p:cNvCxnSpPr/>
           <p:nvPr/>
@@ -4336,7 +5174,7 @@
           <a:solidFill>
             <a:schemeClr val="accent1"/>
           </a:solidFill>
-          <a:ln w="50800" cap="flat" cmpd="sng" algn="ctr">
+          <a:ln w="50800" cap="rnd" cmpd="sng" algn="ctr">
             <a:solidFill>
               <a:schemeClr val="tx1"/>
             </a:solidFill>
@@ -4935,15 +5773,7 @@
                   <a:srgbClr val="000000"/>
                 </a:solidFill>
               </a:rPr>
-              <a:t>Enhanced Claim </a:t>
-            </a:r>
-            <a:r>
-              <a:rPr lang="en-US" sz="1600" dirty="0" smtClean="0">
-                <a:solidFill>
-                  <a:srgbClr val="000000"/>
-                </a:solidFill>
-              </a:rPr>
-              <a:t>Browser</a:t>
+              <a:t>Enhanced Claim Browser</a:t>
             </a:r>
           </a:p>
         </p:txBody>
@@ -6568,7 +7398,7 @@
       </p:grpSpPr>
       <p:pic>
         <p:nvPicPr>
-          <p:cNvPr id="4" name="Picture 3" descr="comment.png"/>
+          <p:cNvPr id="20" name="Picture 19" descr="newsnippet_browser.png"/>
           <p:cNvPicPr>
             <a:picLocks noChangeAspect="1"/>
           </p:cNvPicPr>
@@ -6582,144 +7412,53 @@
         </p:blipFill>
         <p:spPr>
           <a:xfrm>
-            <a:off x="1927629" y="1195000"/>
-            <a:ext cx="304800" cy="304800"/>
+            <a:off x="2270529" y="1676400"/>
+            <a:ext cx="4865298" cy="2131984"/>
           </a:xfrm>
           <a:prstGeom prst="rect">
             <a:avLst/>
           </a:prstGeom>
         </p:spPr>
       </p:pic>
-      <p:pic>
-        <p:nvPicPr>
-          <p:cNvPr id="5" name="Picture 4" descr="comment_yellow.png"/>
-          <p:cNvPicPr>
-            <a:picLocks noChangeAspect="1"/>
-          </p:cNvPicPr>
-          <p:nvPr/>
-        </p:nvPicPr>
-        <p:blipFill>
-          <a:blip r:embed="rId3"/>
-          <a:stretch>
-            <a:fillRect/>
-          </a:stretch>
-        </p:blipFill>
-        <p:spPr>
-          <a:xfrm>
-            <a:off x="2461048" y="1195019"/>
-            <a:ext cx="304763" cy="304763"/>
-          </a:xfrm>
-          <a:prstGeom prst="rect">
-            <a:avLst/>
-          </a:prstGeom>
-        </p:spPr>
-      </p:pic>
-      <p:pic>
-        <p:nvPicPr>
-          <p:cNvPr id="6" name="Picture 5" descr="folder.png"/>
-          <p:cNvPicPr>
-            <a:picLocks noChangeAspect="1"/>
-          </p:cNvPicPr>
-          <p:nvPr/>
-        </p:nvPicPr>
-        <p:blipFill>
-          <a:blip r:embed="rId4"/>
-          <a:stretch>
-            <a:fillRect/>
-          </a:stretch>
-        </p:blipFill>
-        <p:spPr>
-          <a:xfrm>
-            <a:off x="2499129" y="1576009"/>
-            <a:ext cx="228600" cy="228600"/>
-          </a:xfrm>
-          <a:prstGeom prst="rect">
-            <a:avLst/>
-          </a:prstGeom>
-        </p:spPr>
-      </p:pic>
-      <p:pic>
-        <p:nvPicPr>
-          <p:cNvPr id="7" name="Picture 6" descr="folder_grey.png"/>
-          <p:cNvPicPr>
-            <a:picLocks noChangeAspect="1"/>
-          </p:cNvPicPr>
-          <p:nvPr/>
-        </p:nvPicPr>
-        <p:blipFill>
-          <a:blip r:embed="rId5"/>
-          <a:stretch>
-            <a:fillRect/>
-          </a:stretch>
-        </p:blipFill>
-        <p:spPr>
-          <a:xfrm>
-            <a:off x="1965729" y="1576009"/>
-            <a:ext cx="228600" cy="228600"/>
-          </a:xfrm>
-          <a:prstGeom prst="rect">
-            <a:avLst/>
-          </a:prstGeom>
-        </p:spPr>
-      </p:pic>
-      <p:pic>
-        <p:nvPicPr>
-          <p:cNvPr id="8" name="Picture 7" descr="lightbulb.png"/>
-          <p:cNvPicPr>
-            <a:picLocks noChangeAspect="1"/>
-          </p:cNvPicPr>
-          <p:nvPr/>
-        </p:nvPicPr>
-        <p:blipFill>
-          <a:blip r:embed="rId6"/>
-          <a:stretch>
-            <a:fillRect/>
-          </a:stretch>
-        </p:blipFill>
-        <p:spPr>
-          <a:xfrm>
-            <a:off x="2499129" y="814000"/>
-            <a:ext cx="228600" cy="228600"/>
-          </a:xfrm>
-          <a:prstGeom prst="rect">
-            <a:avLst/>
-          </a:prstGeom>
-        </p:spPr>
-      </p:pic>
-      <p:pic>
-        <p:nvPicPr>
-          <p:cNvPr id="9" name="Picture 8" descr="lightbulb_off.png"/>
-          <p:cNvPicPr>
-            <a:picLocks noChangeAspect="1"/>
-          </p:cNvPicPr>
-          <p:nvPr/>
-        </p:nvPicPr>
-        <p:blipFill>
-          <a:blip r:embed="rId7"/>
-          <a:stretch>
-            <a:fillRect/>
-          </a:stretch>
-        </p:blipFill>
-        <p:spPr>
-          <a:xfrm>
-            <a:off x="1965729" y="814000"/>
-            <a:ext cx="228600" cy="228600"/>
-          </a:xfrm>
-          <a:prstGeom prst="rect">
-            <a:avLst/>
-          </a:prstGeom>
-        </p:spPr>
-      </p:pic>
-      <p:sp>
-        <p:nvSpPr>
-          <p:cNvPr id="10" name="TextBox 9"/>
+      <p:cxnSp>
+        <p:nvCxnSpPr>
+          <p:cNvPr id="13" name="Straight Connector 12"/>
+          <p:cNvCxnSpPr/>
+          <p:nvPr/>
+        </p:nvCxnSpPr>
+        <p:spPr bwMode="auto">
+          <a:xfrm rot="10800000">
+            <a:off x="1965729" y="2450018"/>
+            <a:ext cx="304800" cy="1588"/>
+          </a:xfrm>
+          <a:prstGeom prst="line">
+            <a:avLst/>
+          </a:prstGeom>
+          <a:solidFill>
+            <a:schemeClr val="accent1"/>
+          </a:solidFill>
+          <a:ln w="50800" cap="flat" cmpd="sng" algn="ctr">
+            <a:solidFill>
+              <a:schemeClr val="tx1"/>
+            </a:solidFill>
+            <a:prstDash val="solid"/>
+            <a:round/>
+            <a:headEnd type="none" w="med" len="med"/>
+            <a:tailEnd type="none" w="med" len="med"/>
+          </a:ln>
+          <a:effectLst/>
+        </p:spPr>
+      </p:cxnSp>
+      <p:sp>
+        <p:nvSpPr>
+          <p:cNvPr id="32" name="TextBox 31"/>
           <p:cNvSpPr txBox="1"/>
           <p:nvPr/>
         </p:nvSpPr>
         <p:spPr>
           <a:xfrm>
-            <a:off x="1219200" y="789801"/>
-            <a:ext cx="594129" cy="276999"/>
+            <a:off x="533400" y="2158425"/>
+            <a:ext cx="1432329" cy="584775"/>
           </a:xfrm>
           <a:prstGeom prst="rect">
             <a:avLst/>
@@ -6734,26 +7473,143 @@
           <a:p>
             <a:pPr algn="r"/>
             <a:r>
-              <a:rPr lang="en-US" sz="1200" dirty="0" smtClean="0">
+              <a:rPr lang="en-US" sz="1600" dirty="0" smtClean="0">
+                <a:solidFill>
+                  <a:srgbClr val="000000"/>
+                </a:solidFill>
+              </a:rPr>
+              <a:t>Snippet </a:t>
+            </a:r>
+            <a:br>
+              <a:rPr lang="en-US" sz="1600" dirty="0" smtClean="0">
+                <a:solidFill>
+                  <a:srgbClr val="000000"/>
+                </a:solidFill>
+              </a:rPr>
+            </a:br>
+            <a:r>
+              <a:rPr lang="en-US" sz="1600" dirty="0" smtClean="0">
+                <a:solidFill>
+                  <a:srgbClr val="000000"/>
+                </a:solidFill>
+              </a:rPr>
+              <a:t>Text</a:t>
+            </a:r>
+            <a:endParaRPr lang="en-US" sz="1600" dirty="0" smtClean="0">
+              <a:solidFill>
+                <a:srgbClr val="000000"/>
+              </a:solidFill>
+            </a:endParaRPr>
+          </a:p>
+        </p:txBody>
+      </p:sp>
+      <p:cxnSp>
+        <p:nvCxnSpPr>
+          <p:cNvPr id="34" name="Straight Connector 33"/>
+          <p:cNvCxnSpPr/>
+          <p:nvPr/>
+        </p:nvCxnSpPr>
+        <p:spPr bwMode="auto">
+          <a:xfrm rot="5400000">
+            <a:off x="1987133" y="2450018"/>
+            <a:ext cx="533400" cy="1588"/>
+          </a:xfrm>
+          <a:prstGeom prst="line">
+            <a:avLst/>
+          </a:prstGeom>
+          <a:solidFill>
+            <a:schemeClr val="accent1"/>
+          </a:solidFill>
+          <a:ln w="50800" cap="flat" cmpd="sng" algn="ctr">
+            <a:solidFill>
+              <a:schemeClr val="tx1"/>
+            </a:solidFill>
+            <a:prstDash val="solid"/>
+            <a:round/>
+            <a:headEnd type="none" w="med" len="med"/>
+            <a:tailEnd type="none" w="med" len="med"/>
+          </a:ln>
+          <a:effectLst/>
+        </p:spPr>
+      </p:cxnSp>
+      <p:sp>
+        <p:nvSpPr>
+          <p:cNvPr id="12" name="TextBox 11"/>
+          <p:cNvSpPr txBox="1"/>
+          <p:nvPr/>
+        </p:nvSpPr>
+        <p:spPr>
+          <a:xfrm>
+            <a:off x="533400" y="3319046"/>
+            <a:ext cx="1432329" cy="338554"/>
+          </a:xfrm>
+          <a:prstGeom prst="rect">
+            <a:avLst/>
+          </a:prstGeom>
+          <a:noFill/>
+        </p:spPr>
+        <p:txBody>
+          <a:bodyPr wrap="square" rtlCol="0">
+            <a:spAutoFit/>
+          </a:bodyPr>
+          <a:lstStyle/>
+          <a:p>
+            <a:pPr algn="r"/>
+            <a:r>
+              <a:rPr lang="en-US" sz="1600" dirty="0" smtClean="0">
                 <a:solidFill>
                   <a:srgbClr val="000000"/>
                 </a:solidFill>
               </a:rPr>
               <a:t>Claim</a:t>
             </a:r>
-          </a:p>
-        </p:txBody>
-      </p:sp>
-      <p:sp>
-        <p:nvSpPr>
-          <p:cNvPr id="11" name="TextBox 10"/>
+            <a:endParaRPr lang="en-US" sz="1600" dirty="0" smtClean="0">
+              <a:solidFill>
+                <a:srgbClr val="000000"/>
+              </a:solidFill>
+            </a:endParaRPr>
+          </a:p>
+        </p:txBody>
+      </p:sp>
+      <p:cxnSp>
+        <p:nvCxnSpPr>
+          <p:cNvPr id="14" name="Straight Connector 13"/>
+          <p:cNvCxnSpPr/>
+          <p:nvPr/>
+        </p:nvCxnSpPr>
+        <p:spPr bwMode="auto">
+          <a:xfrm rot="10800000">
+            <a:off x="1965729" y="3487529"/>
+            <a:ext cx="304800" cy="1588"/>
+          </a:xfrm>
+          <a:prstGeom prst="line">
+            <a:avLst/>
+          </a:prstGeom>
+          <a:solidFill>
+            <a:schemeClr val="accent1"/>
+          </a:solidFill>
+          <a:ln w="50800" cap="flat" cmpd="sng" algn="ctr">
+            <a:solidFill>
+              <a:schemeClr val="tx1"/>
+            </a:solidFill>
+            <a:prstDash val="solid"/>
+            <a:round/>
+            <a:headEnd type="none" w="med" len="med"/>
+            <a:tailEnd type="none" w="med" len="med"/>
+          </a:ln>
+          <a:effectLst/>
+        </p:spPr>
+      </p:cxnSp>
+      <p:sp>
+        <p:nvSpPr>
+          <p:cNvPr id="19" name="TextBox 18"/>
           <p:cNvSpPr txBox="1"/>
           <p:nvPr/>
         </p:nvSpPr>
         <p:spPr>
           <a:xfrm>
-            <a:off x="1219200" y="1551810"/>
-            <a:ext cx="594129" cy="276999"/>
+            <a:off x="533400" y="2889013"/>
+            <a:ext cx="1432329" cy="338554"/>
           </a:xfrm>
           <a:prstGeom prst="rect">
             <a:avLst/>
@@ -6768,26 +7624,89 @@
           <a:p>
             <a:pPr algn="r"/>
             <a:r>
-              <a:rPr lang="en-US" sz="1200" dirty="0" smtClean="0">
+              <a:rPr lang="en-US" sz="1600" dirty="0" smtClean="0">
                 <a:solidFill>
                   <a:srgbClr val="000000"/>
                 </a:solidFill>
               </a:rPr>
               <a:t>Topic</a:t>
             </a:r>
-          </a:p>
-        </p:txBody>
-      </p:sp>
-      <p:sp>
-        <p:nvSpPr>
-          <p:cNvPr id="12" name="TextBox 11"/>
+            <a:endParaRPr lang="en-US" sz="1600" dirty="0" smtClean="0">
+              <a:solidFill>
+                <a:srgbClr val="000000"/>
+              </a:solidFill>
+            </a:endParaRPr>
+          </a:p>
+        </p:txBody>
+      </p:sp>
+      <p:cxnSp>
+        <p:nvCxnSpPr>
+          <p:cNvPr id="21" name="Straight Connector 20"/>
+          <p:cNvCxnSpPr/>
+          <p:nvPr/>
+        </p:nvCxnSpPr>
+        <p:spPr bwMode="auto">
+          <a:xfrm rot="10800000">
+            <a:off x="1965729" y="2450811"/>
+            <a:ext cx="304800" cy="1"/>
+          </a:xfrm>
+          <a:prstGeom prst="line">
+            <a:avLst/>
+          </a:prstGeom>
+          <a:solidFill>
+            <a:schemeClr val="accent1"/>
+          </a:solidFill>
+          <a:ln w="50800" cap="flat" cmpd="sng" algn="ctr">
+            <a:solidFill>
+              <a:schemeClr val="tx1"/>
+            </a:solidFill>
+            <a:prstDash val="solid"/>
+            <a:round/>
+            <a:headEnd type="none" w="med" len="med"/>
+            <a:tailEnd type="none" w="med" len="med"/>
+          </a:ln>
+          <a:effectLst/>
+        </p:spPr>
+      </p:cxnSp>
+      <p:cxnSp>
+        <p:nvCxnSpPr>
+          <p:cNvPr id="27" name="Straight Connector 26"/>
+          <p:cNvCxnSpPr/>
+          <p:nvPr/>
+        </p:nvCxnSpPr>
+        <p:spPr bwMode="auto">
+          <a:xfrm rot="10800000">
+            <a:off x="1965729" y="3057496"/>
+            <a:ext cx="304800" cy="1588"/>
+          </a:xfrm>
+          <a:prstGeom prst="line">
+            <a:avLst/>
+          </a:prstGeom>
+          <a:solidFill>
+            <a:schemeClr val="accent1"/>
+          </a:solidFill>
+          <a:ln w="50800" cap="flat" cmpd="sng" algn="ctr">
+            <a:solidFill>
+              <a:schemeClr val="tx1"/>
+            </a:solidFill>
+            <a:prstDash val="solid"/>
+            <a:round/>
+            <a:headEnd type="none" w="med" len="med"/>
+            <a:tailEnd type="none" w="med" len="med"/>
+          </a:ln>
+          <a:effectLst/>
+        </p:spPr>
+      </p:cxnSp>
+      <p:sp>
+        <p:nvSpPr>
+          <p:cNvPr id="28" name="TextBox 27"/>
           <p:cNvSpPr txBox="1"/>
           <p:nvPr/>
         </p:nvSpPr>
         <p:spPr>
           <a:xfrm>
-            <a:off x="1066800" y="1189851"/>
-            <a:ext cx="746529" cy="276999"/>
+            <a:off x="7391400" y="2895600"/>
+            <a:ext cx="1432329" cy="584775"/>
           </a:xfrm>
           <a:prstGeom prst="rect">
             <a:avLst/>
@@ -6800,576 +7719,138 @@
           </a:bodyPr>
           <a:lstStyle/>
           <a:p>
-            <a:pPr algn="r"/>
-            <a:r>
-              <a:rPr lang="en-US" sz="1200" dirty="0" smtClean="0">
+            <a:r>
+              <a:rPr lang="en-US" sz="1600" dirty="0" smtClean="0">
                 <a:solidFill>
                   <a:srgbClr val="000000"/>
                 </a:solidFill>
               </a:rPr>
-              <a:t>Snippet</a:t>
-            </a:r>
+              <a:t>Show Suggestions</a:t>
+            </a:r>
+            <a:endParaRPr lang="en-US" sz="1600" dirty="0" smtClean="0">
+              <a:solidFill>
+                <a:srgbClr val="000000"/>
+              </a:solidFill>
+            </a:endParaRPr>
           </a:p>
         </p:txBody>
       </p:sp>
       <p:cxnSp>
         <p:nvCxnSpPr>
-          <p:cNvPr id="14" name="Straight Connector 13"/>
+          <p:cNvPr id="29" name="Straight Connector 28"/>
           <p:cNvCxnSpPr/>
           <p:nvPr/>
         </p:nvCxnSpPr>
-        <p:spPr>
-          <a:xfrm>
-            <a:off x="1279929" y="1143000"/>
-            <a:ext cx="1676400" cy="1588"/>
+        <p:spPr bwMode="auto">
+          <a:xfrm rot="10800000">
+            <a:off x="7086600" y="2971800"/>
+            <a:ext cx="152400" cy="1588"/>
           </a:xfrm>
           <a:prstGeom prst="line">
             <a:avLst/>
           </a:prstGeom>
-        </p:spPr>
-        <p:style>
-          <a:lnRef idx="1">
-            <a:schemeClr val="accent1"/>
-          </a:lnRef>
-          <a:fillRef idx="0">
-            <a:schemeClr val="accent1"/>
-          </a:fillRef>
-          <a:effectRef idx="0">
-            <a:schemeClr val="accent1"/>
-          </a:effectRef>
-          <a:fontRef idx="minor">
-            <a:schemeClr val="tx1"/>
-          </a:fontRef>
-        </p:style>
+          <a:solidFill>
+            <a:schemeClr val="accent1"/>
+          </a:solidFill>
+          <a:ln w="50800" cap="rnd" cmpd="sng" algn="ctr">
+            <a:solidFill>
+              <a:schemeClr val="tx1"/>
+            </a:solidFill>
+            <a:prstDash val="solid"/>
+            <a:round/>
+            <a:headEnd type="none" w="med" len="med"/>
+            <a:tailEnd type="none" w="med" len="med"/>
+          </a:ln>
+          <a:effectLst/>
+        </p:spPr>
       </p:cxnSp>
       <p:cxnSp>
         <p:nvCxnSpPr>
-          <p:cNvPr id="15" name="Straight Connector 14"/>
+          <p:cNvPr id="30" name="Straight Connector 29"/>
           <p:cNvCxnSpPr/>
           <p:nvPr/>
         </p:nvCxnSpPr>
-        <p:spPr>
-          <a:xfrm>
-            <a:off x="1279929" y="1524000"/>
-            <a:ext cx="1676400" cy="1588"/>
+        <p:spPr bwMode="auto">
+          <a:xfrm rot="10800000">
+            <a:off x="7086600" y="3429000"/>
+            <a:ext cx="152400" cy="1588"/>
           </a:xfrm>
           <a:prstGeom prst="line">
             <a:avLst/>
           </a:prstGeom>
-        </p:spPr>
-        <p:style>
-          <a:lnRef idx="1">
-            <a:schemeClr val="accent1"/>
-          </a:lnRef>
-          <a:fillRef idx="0">
-            <a:schemeClr val="accent1"/>
-          </a:fillRef>
-          <a:effectRef idx="0">
-            <a:schemeClr val="accent1"/>
-          </a:effectRef>
-          <a:fontRef idx="minor">
-            <a:schemeClr val="tx1"/>
-          </a:fontRef>
-        </p:style>
+          <a:solidFill>
+            <a:schemeClr val="accent1"/>
+          </a:solidFill>
+          <a:ln w="50800" cap="rnd" cmpd="sng" algn="ctr">
+            <a:solidFill>
+              <a:schemeClr val="tx1"/>
+            </a:solidFill>
+            <a:prstDash val="solid"/>
+            <a:round/>
+            <a:headEnd type="none" w="med" len="med"/>
+            <a:tailEnd type="none" w="med" len="med"/>
+          </a:ln>
+          <a:effectLst/>
+        </p:spPr>
       </p:cxnSp>
       <p:cxnSp>
         <p:nvCxnSpPr>
-          <p:cNvPr id="16" name="Straight Connector 15"/>
+          <p:cNvPr id="31" name="Straight Connector 30"/>
           <p:cNvCxnSpPr/>
           <p:nvPr/>
         </p:nvCxnSpPr>
-        <p:spPr>
-          <a:xfrm rot="5400000">
-            <a:off x="1775229" y="1333500"/>
-            <a:ext cx="1143000" cy="1588"/>
+        <p:spPr bwMode="auto">
+          <a:xfrm rot="10800000">
+            <a:off x="7239000" y="3200400"/>
+            <a:ext cx="152400" cy="1588"/>
           </a:xfrm>
           <a:prstGeom prst="line">
             <a:avLst/>
           </a:prstGeom>
-        </p:spPr>
-        <p:style>
-          <a:lnRef idx="1">
-            <a:schemeClr val="accent1"/>
-          </a:lnRef>
-          <a:fillRef idx="0">
-            <a:schemeClr val="accent1"/>
-          </a:fillRef>
-          <a:effectRef idx="0">
-            <a:schemeClr val="accent1"/>
-          </a:effectRef>
-          <a:fontRef idx="minor">
-            <a:schemeClr val="tx1"/>
-          </a:fontRef>
-        </p:style>
-      </p:cxnSp>
-      <p:sp>
-        <p:nvSpPr>
-          <p:cNvPr id="21" name="TextBox 20"/>
-          <p:cNvSpPr txBox="1"/>
-          <p:nvPr/>
-        </p:nvSpPr>
-        <p:spPr>
-          <a:xfrm rot="18851434">
-            <a:off x="2349100" y="193379"/>
-            <a:ext cx="1143000" cy="276999"/>
-          </a:xfrm>
-          <a:prstGeom prst="rect">
-            <a:avLst/>
-          </a:prstGeom>
-          <a:noFill/>
-        </p:spPr>
-        <p:txBody>
-          <a:bodyPr wrap="square" rtlCol="0">
-            <a:spAutoFit/>
-          </a:bodyPr>
-          <a:lstStyle/>
-          <a:p>
-            <a:r>
-              <a:rPr lang="en-US" sz="1200" dirty="0" smtClean="0">
-                <a:solidFill>
-                  <a:srgbClr val="000000"/>
-                </a:solidFill>
-              </a:rPr>
-              <a:t>Bookmarked</a:t>
-            </a:r>
-          </a:p>
-        </p:txBody>
-      </p:sp>
-      <p:sp>
-        <p:nvSpPr>
-          <p:cNvPr id="22" name="TextBox 21"/>
-          <p:cNvSpPr txBox="1"/>
-          <p:nvPr/>
-        </p:nvSpPr>
-        <p:spPr>
-          <a:xfrm rot="18851434">
-            <a:off x="1815700" y="193379"/>
-            <a:ext cx="1143000" cy="276999"/>
-          </a:xfrm>
-          <a:prstGeom prst="rect">
-            <a:avLst/>
-          </a:prstGeom>
-          <a:noFill/>
-        </p:spPr>
-        <p:txBody>
-          <a:bodyPr wrap="square" rtlCol="0">
-            <a:spAutoFit/>
-          </a:bodyPr>
-          <a:lstStyle/>
-          <a:p>
-            <a:r>
-              <a:rPr lang="en-US" sz="1200" dirty="0" smtClean="0">
-                <a:solidFill>
-                  <a:srgbClr val="000000"/>
-                </a:solidFill>
-              </a:rPr>
-              <a:t>Normal</a:t>
-            </a:r>
-          </a:p>
-        </p:txBody>
-      </p:sp>
-      <p:pic>
-        <p:nvPicPr>
-          <p:cNvPr id="23" name="Picture 22" descr="lightbulb_green.png"/>
-          <p:cNvPicPr>
-            <a:picLocks noChangeAspect="1"/>
-          </p:cNvPicPr>
-          <p:nvPr/>
-        </p:nvPicPr>
-        <p:blipFill>
-          <a:blip r:embed="rId8"/>
-          <a:stretch>
-            <a:fillRect/>
-          </a:stretch>
-        </p:blipFill>
-        <p:spPr>
-          <a:xfrm>
-            <a:off x="4262458" y="837406"/>
-            <a:ext cx="203175" cy="203175"/>
-          </a:xfrm>
-          <a:prstGeom prst="rect">
-            <a:avLst/>
-          </a:prstGeom>
-        </p:spPr>
-      </p:pic>
-      <p:pic>
-        <p:nvPicPr>
-          <p:cNvPr id="24" name="Picture 23" descr="lightbulb_greenyellow.png"/>
-          <p:cNvPicPr>
-            <a:picLocks noChangeAspect="1"/>
-          </p:cNvPicPr>
-          <p:nvPr/>
-        </p:nvPicPr>
-        <p:blipFill>
-          <a:blip r:embed="rId9"/>
-          <a:stretch>
-            <a:fillRect/>
-          </a:stretch>
-        </p:blipFill>
-        <p:spPr>
-          <a:xfrm>
-            <a:off x="4719658" y="837406"/>
-            <a:ext cx="203175" cy="203175"/>
-          </a:xfrm>
-          <a:prstGeom prst="rect">
-            <a:avLst/>
-          </a:prstGeom>
-        </p:spPr>
-      </p:pic>
-      <p:pic>
-        <p:nvPicPr>
-          <p:cNvPr id="25" name="Picture 24" descr="lightbulb_red.png"/>
-          <p:cNvPicPr>
-            <a:picLocks noChangeAspect="1"/>
-          </p:cNvPicPr>
-          <p:nvPr/>
-        </p:nvPicPr>
-        <p:blipFill>
-          <a:blip r:embed="rId10"/>
-          <a:stretch>
-            <a:fillRect/>
-          </a:stretch>
-        </p:blipFill>
-        <p:spPr>
-          <a:xfrm>
-            <a:off x="4262458" y="1218406"/>
-            <a:ext cx="203175" cy="203175"/>
-          </a:xfrm>
-          <a:prstGeom prst="rect">
-            <a:avLst/>
-          </a:prstGeom>
-        </p:spPr>
-      </p:pic>
-      <p:pic>
-        <p:nvPicPr>
-          <p:cNvPr id="26" name="Picture 25" descr="lightbulb_redyellow.png"/>
-          <p:cNvPicPr>
-            <a:picLocks noChangeAspect="1"/>
-          </p:cNvPicPr>
-          <p:nvPr/>
-        </p:nvPicPr>
-        <p:blipFill>
-          <a:blip r:embed="rId11"/>
-          <a:stretch>
-            <a:fillRect/>
-          </a:stretch>
-        </p:blipFill>
-        <p:spPr>
-          <a:xfrm>
-            <a:off x="4719658" y="1218406"/>
-            <a:ext cx="203175" cy="203175"/>
-          </a:xfrm>
-          <a:prstGeom prst="rect">
-            <a:avLst/>
-          </a:prstGeom>
-        </p:spPr>
-      </p:pic>
-      <p:pic>
-        <p:nvPicPr>
-          <p:cNvPr id="27" name="Picture 26" descr="lightbulb.png"/>
-          <p:cNvPicPr>
-            <a:picLocks noChangeAspect="1"/>
-          </p:cNvPicPr>
-          <p:nvPr/>
-        </p:nvPicPr>
-        <p:blipFill>
-          <a:blip r:embed="rId6"/>
-          <a:stretch>
-            <a:fillRect/>
-          </a:stretch>
-        </p:blipFill>
-        <p:spPr>
-          <a:xfrm>
-            <a:off x="4719658" y="1599406"/>
-            <a:ext cx="201168" cy="201168"/>
-          </a:xfrm>
-          <a:prstGeom prst="rect">
-            <a:avLst/>
-          </a:prstGeom>
-        </p:spPr>
-      </p:pic>
-      <p:pic>
-        <p:nvPicPr>
-          <p:cNvPr id="28" name="Picture 27" descr="lightbulb_off.png"/>
-          <p:cNvPicPr>
-            <a:picLocks noChangeAspect="1"/>
-          </p:cNvPicPr>
-          <p:nvPr/>
-        </p:nvPicPr>
-        <p:blipFill>
-          <a:blip r:embed="rId7"/>
-          <a:stretch>
-            <a:fillRect/>
-          </a:stretch>
-        </p:blipFill>
-        <p:spPr>
-          <a:xfrm>
-            <a:off x="4262458" y="1599406"/>
-            <a:ext cx="201168" cy="201168"/>
-          </a:xfrm>
-          <a:prstGeom prst="rect">
-            <a:avLst/>
-          </a:prstGeom>
-        </p:spPr>
-      </p:pic>
-      <p:sp>
-        <p:nvSpPr>
-          <p:cNvPr id="32" name="TextBox 31"/>
-          <p:cNvSpPr txBox="1"/>
-          <p:nvPr/>
-        </p:nvSpPr>
-        <p:spPr>
-          <a:xfrm>
-            <a:off x="3195658" y="789007"/>
-            <a:ext cx="838201" cy="276999"/>
-          </a:xfrm>
-          <a:prstGeom prst="rect">
-            <a:avLst/>
-          </a:prstGeom>
-          <a:noFill/>
-        </p:spPr>
-        <p:txBody>
-          <a:bodyPr wrap="square" rtlCol="0">
-            <a:spAutoFit/>
-          </a:bodyPr>
-          <a:lstStyle/>
-          <a:p>
-            <a:pPr algn="r"/>
-            <a:r>
-              <a:rPr lang="en-US" sz="1200" dirty="0" smtClean="0">
-                <a:solidFill>
-                  <a:srgbClr val="000000"/>
-                </a:solidFill>
-              </a:rPr>
-              <a:t>Supported</a:t>
-            </a:r>
-          </a:p>
-        </p:txBody>
-      </p:sp>
-      <p:sp>
-        <p:nvSpPr>
-          <p:cNvPr id="33" name="TextBox 32"/>
-          <p:cNvSpPr txBox="1"/>
-          <p:nvPr/>
-        </p:nvSpPr>
-        <p:spPr>
-          <a:xfrm>
-            <a:off x="3348059" y="1551016"/>
-            <a:ext cx="685800" cy="276999"/>
-          </a:xfrm>
-          <a:prstGeom prst="rect">
-            <a:avLst/>
-          </a:prstGeom>
-          <a:noFill/>
-        </p:spPr>
-        <p:txBody>
-          <a:bodyPr wrap="square" rtlCol="0">
-            <a:spAutoFit/>
-          </a:bodyPr>
-          <a:lstStyle/>
-          <a:p>
-            <a:pPr algn="r"/>
-            <a:r>
-              <a:rPr lang="en-US" sz="1200" dirty="0" smtClean="0">
-                <a:solidFill>
-                  <a:srgbClr val="000000"/>
-                </a:solidFill>
-              </a:rPr>
-              <a:t>Neither</a:t>
-            </a:r>
-          </a:p>
-        </p:txBody>
-      </p:sp>
-      <p:sp>
-        <p:nvSpPr>
-          <p:cNvPr id="34" name="TextBox 33"/>
-          <p:cNvSpPr txBox="1"/>
-          <p:nvPr/>
-        </p:nvSpPr>
-        <p:spPr>
-          <a:xfrm>
-            <a:off x="3287329" y="1189057"/>
-            <a:ext cx="746529" cy="276999"/>
-          </a:xfrm>
-          <a:prstGeom prst="rect">
-            <a:avLst/>
-          </a:prstGeom>
-          <a:noFill/>
-        </p:spPr>
-        <p:txBody>
-          <a:bodyPr wrap="square" rtlCol="0">
-            <a:spAutoFit/>
-          </a:bodyPr>
-          <a:lstStyle/>
-          <a:p>
-            <a:pPr algn="r"/>
-            <a:r>
-              <a:rPr lang="en-US" sz="1200" dirty="0" smtClean="0">
-                <a:solidFill>
-                  <a:srgbClr val="000000"/>
-                </a:solidFill>
-              </a:rPr>
-              <a:t>Opposed</a:t>
-            </a:r>
-          </a:p>
-        </p:txBody>
-      </p:sp>
-      <p:cxnSp>
-        <p:nvCxnSpPr>
-          <p:cNvPr id="35" name="Straight Connector 34"/>
-          <p:cNvCxnSpPr/>
-          <p:nvPr/>
-        </p:nvCxnSpPr>
-        <p:spPr>
-          <a:xfrm>
-            <a:off x="3500458" y="1142206"/>
-            <a:ext cx="1676400" cy="1588"/>
-          </a:xfrm>
-          <a:prstGeom prst="line">
-            <a:avLst/>
-          </a:prstGeom>
-        </p:spPr>
-        <p:style>
-          <a:lnRef idx="1">
-            <a:schemeClr val="accent1"/>
-          </a:lnRef>
-          <a:fillRef idx="0">
-            <a:schemeClr val="accent1"/>
-          </a:fillRef>
-          <a:effectRef idx="0">
-            <a:schemeClr val="accent1"/>
-          </a:effectRef>
-          <a:fontRef idx="minor">
-            <a:schemeClr val="tx1"/>
-          </a:fontRef>
-        </p:style>
+          <a:solidFill>
+            <a:schemeClr val="accent1"/>
+          </a:solidFill>
+          <a:ln w="50800" cap="rnd" cmpd="sng" algn="ctr">
+            <a:solidFill>
+              <a:schemeClr val="tx1"/>
+            </a:solidFill>
+            <a:prstDash val="solid"/>
+            <a:round/>
+            <a:headEnd type="none" w="med" len="med"/>
+            <a:tailEnd type="none" w="med" len="med"/>
+          </a:ln>
+          <a:effectLst/>
+        </p:spPr>
       </p:cxnSp>
       <p:cxnSp>
         <p:nvCxnSpPr>
-          <p:cNvPr id="36" name="Straight Connector 35"/>
+          <p:cNvPr id="33" name="Straight Connector 32"/>
           <p:cNvCxnSpPr/>
           <p:nvPr/>
         </p:nvCxnSpPr>
-        <p:spPr>
-          <a:xfrm>
-            <a:off x="3500458" y="1523206"/>
-            <a:ext cx="1676400" cy="1588"/>
+        <p:spPr bwMode="auto">
+          <a:xfrm rot="5400000" flipH="1" flipV="1">
+            <a:off x="7010400" y="3200400"/>
+            <a:ext cx="457200" cy="1588"/>
           </a:xfrm>
           <a:prstGeom prst="line">
             <a:avLst/>
           </a:prstGeom>
-        </p:spPr>
-        <p:style>
-          <a:lnRef idx="1">
-            <a:schemeClr val="accent1"/>
-          </a:lnRef>
-          <a:fillRef idx="0">
-            <a:schemeClr val="accent1"/>
-          </a:fillRef>
-          <a:effectRef idx="0">
-            <a:schemeClr val="accent1"/>
-          </a:effectRef>
-          <a:fontRef idx="minor">
-            <a:schemeClr val="tx1"/>
-          </a:fontRef>
-        </p:style>
+          <a:solidFill>
+            <a:schemeClr val="accent1"/>
+          </a:solidFill>
+          <a:ln w="50800" cap="rnd" cmpd="sng" algn="ctr">
+            <a:solidFill>
+              <a:schemeClr val="tx1"/>
+            </a:solidFill>
+            <a:prstDash val="solid"/>
+            <a:round/>
+            <a:headEnd type="none" w="med" len="med"/>
+            <a:tailEnd type="none" w="med" len="med"/>
+          </a:ln>
+          <a:effectLst/>
+        </p:spPr>
       </p:cxnSp>
-      <p:cxnSp>
-        <p:nvCxnSpPr>
-          <p:cNvPr id="37" name="Straight Connector 36"/>
-          <p:cNvCxnSpPr/>
-          <p:nvPr/>
-        </p:nvCxnSpPr>
-        <p:spPr>
-          <a:xfrm rot="5400000">
-            <a:off x="3995758" y="1332706"/>
-            <a:ext cx="1143000" cy="1588"/>
-          </a:xfrm>
-          <a:prstGeom prst="line">
-            <a:avLst/>
-          </a:prstGeom>
-        </p:spPr>
-        <p:style>
-          <a:lnRef idx="1">
-            <a:schemeClr val="accent1"/>
-          </a:lnRef>
-          <a:fillRef idx="0">
-            <a:schemeClr val="accent1"/>
-          </a:fillRef>
-          <a:effectRef idx="0">
-            <a:schemeClr val="accent1"/>
-          </a:effectRef>
-          <a:fontRef idx="minor">
-            <a:schemeClr val="tx1"/>
-          </a:fontRef>
-        </p:style>
-      </p:cxnSp>
-      <p:sp>
-        <p:nvSpPr>
-          <p:cNvPr id="38" name="TextBox 37"/>
-          <p:cNvSpPr txBox="1"/>
-          <p:nvPr/>
-        </p:nvSpPr>
-        <p:spPr>
-          <a:xfrm rot="18851434">
-            <a:off x="4569629" y="193379"/>
-            <a:ext cx="1143000" cy="276999"/>
-          </a:xfrm>
-          <a:prstGeom prst="rect">
-            <a:avLst/>
-          </a:prstGeom>
-          <a:noFill/>
-        </p:spPr>
-        <p:txBody>
-          <a:bodyPr wrap="square" rtlCol="0">
-            <a:spAutoFit/>
-          </a:bodyPr>
-          <a:lstStyle/>
-          <a:p>
-            <a:r>
-              <a:rPr lang="en-US" sz="1200" dirty="0" smtClean="0">
-                <a:solidFill>
-                  <a:srgbClr val="000000"/>
-                </a:solidFill>
-              </a:rPr>
-              <a:t>Bookmarked</a:t>
-            </a:r>
-          </a:p>
-        </p:txBody>
-      </p:sp>
-      <p:sp>
-        <p:nvSpPr>
-          <p:cNvPr id="39" name="TextBox 38"/>
-          <p:cNvSpPr txBox="1"/>
-          <p:nvPr/>
-        </p:nvSpPr>
-        <p:spPr>
-          <a:xfrm rot="18851434">
-            <a:off x="4036229" y="193379"/>
-            <a:ext cx="1143000" cy="276999"/>
-          </a:xfrm>
-          <a:prstGeom prst="rect">
-            <a:avLst/>
-          </a:prstGeom>
-          <a:noFill/>
-        </p:spPr>
-        <p:txBody>
-          <a:bodyPr wrap="square" rtlCol="0">
-            <a:spAutoFit/>
-          </a:bodyPr>
-          <a:lstStyle/>
-          <a:p>
-            <a:r>
-              <a:rPr lang="en-US" sz="1200" dirty="0" smtClean="0">
-                <a:solidFill>
-                  <a:srgbClr val="000000"/>
-                </a:solidFill>
-              </a:rPr>
-              <a:t>Normal</a:t>
-            </a:r>
-          </a:p>
-        </p:txBody>
-      </p:sp>
     </p:spTree>
   </p:cSld>
   <p:clrMapOvr>

</xml_diff>

<commit_message>
Made changes suggested by Tye
</commit_message>
<xml_diff>
--- a/papers/diagrams.pptx
+++ b/papers/diagrams.pptx
@@ -10,11 +10,15 @@
     <p:sldId id="258" r:id="rId4"/>
     <p:sldId id="259" r:id="rId5"/>
     <p:sldId id="260" r:id="rId6"/>
-    <p:sldId id="263" r:id="rId7"/>
-    <p:sldId id="264" r:id="rId8"/>
-    <p:sldId id="261" r:id="rId9"/>
-    <p:sldId id="265" r:id="rId10"/>
-    <p:sldId id="262" r:id="rId11"/>
+    <p:sldId id="269" r:id="rId7"/>
+    <p:sldId id="263" r:id="rId8"/>
+    <p:sldId id="264" r:id="rId9"/>
+    <p:sldId id="261" r:id="rId10"/>
+    <p:sldId id="265" r:id="rId11"/>
+    <p:sldId id="262" r:id="rId12"/>
+    <p:sldId id="268" r:id="rId13"/>
+    <p:sldId id="266" r:id="rId14"/>
+    <p:sldId id="267" r:id="rId15"/>
   </p:sldIdLst>
   <p:sldSz cx="9144000" cy="6858000" type="screen4x3"/>
   <p:notesSz cx="6858000" cy="9144000"/>
@@ -3539,6 +3543,466 @@
       </p:grpSpPr>
       <p:pic>
         <p:nvPicPr>
+          <p:cNvPr id="20" name="Picture 19" descr="newsnippet_browser.png"/>
+          <p:cNvPicPr>
+            <a:picLocks noChangeAspect="1"/>
+          </p:cNvPicPr>
+          <p:nvPr/>
+        </p:nvPicPr>
+        <p:blipFill>
+          <a:blip r:embed="rId2"/>
+          <a:stretch>
+            <a:fillRect/>
+          </a:stretch>
+        </p:blipFill>
+        <p:spPr>
+          <a:xfrm>
+            <a:off x="2270529" y="1676400"/>
+            <a:ext cx="4865298" cy="2131984"/>
+          </a:xfrm>
+          <a:prstGeom prst="rect">
+            <a:avLst/>
+          </a:prstGeom>
+        </p:spPr>
+      </p:pic>
+      <p:cxnSp>
+        <p:nvCxnSpPr>
+          <p:cNvPr id="13" name="Straight Connector 12"/>
+          <p:cNvCxnSpPr/>
+          <p:nvPr/>
+        </p:nvCxnSpPr>
+        <p:spPr bwMode="auto">
+          <a:xfrm rot="10800000">
+            <a:off x="1965729" y="2450018"/>
+            <a:ext cx="304800" cy="1588"/>
+          </a:xfrm>
+          <a:prstGeom prst="line">
+            <a:avLst/>
+          </a:prstGeom>
+          <a:solidFill>
+            <a:schemeClr val="accent1"/>
+          </a:solidFill>
+          <a:ln w="50800" cap="flat" cmpd="sng" algn="ctr">
+            <a:solidFill>
+              <a:schemeClr val="tx1"/>
+            </a:solidFill>
+            <a:prstDash val="solid"/>
+            <a:round/>
+            <a:headEnd type="none" w="med" len="med"/>
+            <a:tailEnd type="none" w="med" len="med"/>
+          </a:ln>
+          <a:effectLst/>
+        </p:spPr>
+      </p:cxnSp>
+      <p:sp>
+        <p:nvSpPr>
+          <p:cNvPr id="32" name="TextBox 31"/>
+          <p:cNvSpPr txBox="1"/>
+          <p:nvPr/>
+        </p:nvSpPr>
+        <p:spPr>
+          <a:xfrm>
+            <a:off x="533400" y="2158425"/>
+            <a:ext cx="1432329" cy="584775"/>
+          </a:xfrm>
+          <a:prstGeom prst="rect">
+            <a:avLst/>
+          </a:prstGeom>
+          <a:noFill/>
+        </p:spPr>
+        <p:txBody>
+          <a:bodyPr wrap="square" rtlCol="0">
+            <a:spAutoFit/>
+          </a:bodyPr>
+          <a:lstStyle/>
+          <a:p>
+            <a:pPr algn="r"/>
+            <a:r>
+              <a:rPr lang="en-US" sz="1600" dirty="0" smtClean="0">
+                <a:solidFill>
+                  <a:srgbClr val="000000"/>
+                </a:solidFill>
+              </a:rPr>
+              <a:t>Snippet </a:t>
+            </a:r>
+            <a:br>
+              <a:rPr lang="en-US" sz="1600" dirty="0" smtClean="0">
+                <a:solidFill>
+                  <a:srgbClr val="000000"/>
+                </a:solidFill>
+              </a:rPr>
+            </a:br>
+            <a:r>
+              <a:rPr lang="en-US" sz="1600" dirty="0" smtClean="0">
+                <a:solidFill>
+                  <a:srgbClr val="000000"/>
+                </a:solidFill>
+              </a:rPr>
+              <a:t>Text</a:t>
+            </a:r>
+          </a:p>
+        </p:txBody>
+      </p:sp>
+      <p:cxnSp>
+        <p:nvCxnSpPr>
+          <p:cNvPr id="34" name="Straight Connector 33"/>
+          <p:cNvCxnSpPr/>
+          <p:nvPr/>
+        </p:nvCxnSpPr>
+        <p:spPr bwMode="auto">
+          <a:xfrm rot="5400000">
+            <a:off x="1987133" y="2450018"/>
+            <a:ext cx="533400" cy="1588"/>
+          </a:xfrm>
+          <a:prstGeom prst="line">
+            <a:avLst/>
+          </a:prstGeom>
+          <a:solidFill>
+            <a:schemeClr val="accent1"/>
+          </a:solidFill>
+          <a:ln w="50800" cap="flat" cmpd="sng" algn="ctr">
+            <a:solidFill>
+              <a:schemeClr val="tx1"/>
+            </a:solidFill>
+            <a:prstDash val="solid"/>
+            <a:round/>
+            <a:headEnd type="none" w="med" len="med"/>
+            <a:tailEnd type="none" w="med" len="med"/>
+          </a:ln>
+          <a:effectLst/>
+        </p:spPr>
+      </p:cxnSp>
+      <p:sp>
+        <p:nvSpPr>
+          <p:cNvPr id="12" name="TextBox 11"/>
+          <p:cNvSpPr txBox="1"/>
+          <p:nvPr/>
+        </p:nvSpPr>
+        <p:spPr>
+          <a:xfrm>
+            <a:off x="533400" y="3319046"/>
+            <a:ext cx="1432329" cy="338554"/>
+          </a:xfrm>
+          <a:prstGeom prst="rect">
+            <a:avLst/>
+          </a:prstGeom>
+          <a:noFill/>
+        </p:spPr>
+        <p:txBody>
+          <a:bodyPr wrap="square" rtlCol="0">
+            <a:spAutoFit/>
+          </a:bodyPr>
+          <a:lstStyle/>
+          <a:p>
+            <a:pPr algn="r"/>
+            <a:r>
+              <a:rPr lang="en-US" sz="1600" dirty="0" smtClean="0">
+                <a:solidFill>
+                  <a:srgbClr val="000000"/>
+                </a:solidFill>
+              </a:rPr>
+              <a:t>Claim</a:t>
+            </a:r>
+          </a:p>
+        </p:txBody>
+      </p:sp>
+      <p:cxnSp>
+        <p:nvCxnSpPr>
+          <p:cNvPr id="14" name="Straight Connector 13"/>
+          <p:cNvCxnSpPr/>
+          <p:nvPr/>
+        </p:nvCxnSpPr>
+        <p:spPr bwMode="auto">
+          <a:xfrm rot="10800000">
+            <a:off x="1965729" y="3487529"/>
+            <a:ext cx="304800" cy="1588"/>
+          </a:xfrm>
+          <a:prstGeom prst="line">
+            <a:avLst/>
+          </a:prstGeom>
+          <a:solidFill>
+            <a:schemeClr val="accent1"/>
+          </a:solidFill>
+          <a:ln w="50800" cap="flat" cmpd="sng" algn="ctr">
+            <a:solidFill>
+              <a:schemeClr val="tx1"/>
+            </a:solidFill>
+            <a:prstDash val="solid"/>
+            <a:round/>
+            <a:headEnd type="none" w="med" len="med"/>
+            <a:tailEnd type="none" w="med" len="med"/>
+          </a:ln>
+          <a:effectLst/>
+        </p:spPr>
+      </p:cxnSp>
+      <p:sp>
+        <p:nvSpPr>
+          <p:cNvPr id="19" name="TextBox 18"/>
+          <p:cNvSpPr txBox="1"/>
+          <p:nvPr/>
+        </p:nvSpPr>
+        <p:spPr>
+          <a:xfrm>
+            <a:off x="533400" y="2889013"/>
+            <a:ext cx="1432329" cy="338554"/>
+          </a:xfrm>
+          <a:prstGeom prst="rect">
+            <a:avLst/>
+          </a:prstGeom>
+          <a:noFill/>
+        </p:spPr>
+        <p:txBody>
+          <a:bodyPr wrap="square" rtlCol="0">
+            <a:spAutoFit/>
+          </a:bodyPr>
+          <a:lstStyle/>
+          <a:p>
+            <a:pPr algn="r"/>
+            <a:r>
+              <a:rPr lang="en-US" sz="1600" dirty="0" smtClean="0">
+                <a:solidFill>
+                  <a:srgbClr val="000000"/>
+                </a:solidFill>
+              </a:rPr>
+              <a:t>Topic</a:t>
+            </a:r>
+          </a:p>
+        </p:txBody>
+      </p:sp>
+      <p:cxnSp>
+        <p:nvCxnSpPr>
+          <p:cNvPr id="21" name="Straight Connector 20"/>
+          <p:cNvCxnSpPr/>
+          <p:nvPr/>
+        </p:nvCxnSpPr>
+        <p:spPr bwMode="auto">
+          <a:xfrm rot="10800000">
+            <a:off x="1965729" y="2450811"/>
+            <a:ext cx="304800" cy="1"/>
+          </a:xfrm>
+          <a:prstGeom prst="line">
+            <a:avLst/>
+          </a:prstGeom>
+          <a:solidFill>
+            <a:schemeClr val="accent1"/>
+          </a:solidFill>
+          <a:ln w="50800" cap="flat" cmpd="sng" algn="ctr">
+            <a:solidFill>
+              <a:schemeClr val="tx1"/>
+            </a:solidFill>
+            <a:prstDash val="solid"/>
+            <a:round/>
+            <a:headEnd type="none" w="med" len="med"/>
+            <a:tailEnd type="none" w="med" len="med"/>
+          </a:ln>
+          <a:effectLst/>
+        </p:spPr>
+      </p:cxnSp>
+      <p:cxnSp>
+        <p:nvCxnSpPr>
+          <p:cNvPr id="27" name="Straight Connector 26"/>
+          <p:cNvCxnSpPr/>
+          <p:nvPr/>
+        </p:nvCxnSpPr>
+        <p:spPr bwMode="auto">
+          <a:xfrm rot="10800000">
+            <a:off x="1965729" y="3057496"/>
+            <a:ext cx="304800" cy="1588"/>
+          </a:xfrm>
+          <a:prstGeom prst="line">
+            <a:avLst/>
+          </a:prstGeom>
+          <a:solidFill>
+            <a:schemeClr val="accent1"/>
+          </a:solidFill>
+          <a:ln w="50800" cap="flat" cmpd="sng" algn="ctr">
+            <a:solidFill>
+              <a:schemeClr val="tx1"/>
+            </a:solidFill>
+            <a:prstDash val="solid"/>
+            <a:round/>
+            <a:headEnd type="none" w="med" len="med"/>
+            <a:tailEnd type="none" w="med" len="med"/>
+          </a:ln>
+          <a:effectLst/>
+        </p:spPr>
+      </p:cxnSp>
+      <p:sp>
+        <p:nvSpPr>
+          <p:cNvPr id="28" name="TextBox 27"/>
+          <p:cNvSpPr txBox="1"/>
+          <p:nvPr/>
+        </p:nvSpPr>
+        <p:spPr>
+          <a:xfrm>
+            <a:off x="7391400" y="2895600"/>
+            <a:ext cx="1432329" cy="584775"/>
+          </a:xfrm>
+          <a:prstGeom prst="rect">
+            <a:avLst/>
+          </a:prstGeom>
+          <a:noFill/>
+        </p:spPr>
+        <p:txBody>
+          <a:bodyPr wrap="square" rtlCol="0">
+            <a:spAutoFit/>
+          </a:bodyPr>
+          <a:lstStyle/>
+          <a:p>
+            <a:r>
+              <a:rPr lang="en-US" sz="1600" dirty="0" smtClean="0">
+                <a:solidFill>
+                  <a:srgbClr val="000000"/>
+                </a:solidFill>
+              </a:rPr>
+              <a:t>Show Suggestions</a:t>
+            </a:r>
+          </a:p>
+        </p:txBody>
+      </p:sp>
+      <p:cxnSp>
+        <p:nvCxnSpPr>
+          <p:cNvPr id="29" name="Straight Connector 28"/>
+          <p:cNvCxnSpPr/>
+          <p:nvPr/>
+        </p:nvCxnSpPr>
+        <p:spPr bwMode="auto">
+          <a:xfrm rot="10800000">
+            <a:off x="7086600" y="2971800"/>
+            <a:ext cx="152400" cy="1588"/>
+          </a:xfrm>
+          <a:prstGeom prst="line">
+            <a:avLst/>
+          </a:prstGeom>
+          <a:solidFill>
+            <a:schemeClr val="accent1"/>
+          </a:solidFill>
+          <a:ln w="50800" cap="rnd" cmpd="sng" algn="ctr">
+            <a:solidFill>
+              <a:schemeClr val="tx1"/>
+            </a:solidFill>
+            <a:prstDash val="solid"/>
+            <a:round/>
+            <a:headEnd type="none" w="med" len="med"/>
+            <a:tailEnd type="none" w="med" len="med"/>
+          </a:ln>
+          <a:effectLst/>
+        </p:spPr>
+      </p:cxnSp>
+      <p:cxnSp>
+        <p:nvCxnSpPr>
+          <p:cNvPr id="30" name="Straight Connector 29"/>
+          <p:cNvCxnSpPr/>
+          <p:nvPr/>
+        </p:nvCxnSpPr>
+        <p:spPr bwMode="auto">
+          <a:xfrm rot="10800000">
+            <a:off x="7086600" y="3429000"/>
+            <a:ext cx="152400" cy="1588"/>
+          </a:xfrm>
+          <a:prstGeom prst="line">
+            <a:avLst/>
+          </a:prstGeom>
+          <a:solidFill>
+            <a:schemeClr val="accent1"/>
+          </a:solidFill>
+          <a:ln w="50800" cap="rnd" cmpd="sng" algn="ctr">
+            <a:solidFill>
+              <a:schemeClr val="tx1"/>
+            </a:solidFill>
+            <a:prstDash val="solid"/>
+            <a:round/>
+            <a:headEnd type="none" w="med" len="med"/>
+            <a:tailEnd type="none" w="med" len="med"/>
+          </a:ln>
+          <a:effectLst/>
+        </p:spPr>
+      </p:cxnSp>
+      <p:cxnSp>
+        <p:nvCxnSpPr>
+          <p:cNvPr id="31" name="Straight Connector 30"/>
+          <p:cNvCxnSpPr/>
+          <p:nvPr/>
+        </p:nvCxnSpPr>
+        <p:spPr bwMode="auto">
+          <a:xfrm rot="10800000">
+            <a:off x="7239000" y="3200400"/>
+            <a:ext cx="152400" cy="1588"/>
+          </a:xfrm>
+          <a:prstGeom prst="line">
+            <a:avLst/>
+          </a:prstGeom>
+          <a:solidFill>
+            <a:schemeClr val="accent1"/>
+          </a:solidFill>
+          <a:ln w="50800" cap="rnd" cmpd="sng" algn="ctr">
+            <a:solidFill>
+              <a:schemeClr val="tx1"/>
+            </a:solidFill>
+            <a:prstDash val="solid"/>
+            <a:round/>
+            <a:headEnd type="none" w="med" len="med"/>
+            <a:tailEnd type="none" w="med" len="med"/>
+          </a:ln>
+          <a:effectLst/>
+        </p:spPr>
+      </p:cxnSp>
+      <p:cxnSp>
+        <p:nvCxnSpPr>
+          <p:cNvPr id="33" name="Straight Connector 32"/>
+          <p:cNvCxnSpPr/>
+          <p:nvPr/>
+        </p:nvCxnSpPr>
+        <p:spPr bwMode="auto">
+          <a:xfrm rot="5400000" flipH="1" flipV="1">
+            <a:off x="7010400" y="3200400"/>
+            <a:ext cx="457200" cy="1588"/>
+          </a:xfrm>
+          <a:prstGeom prst="line">
+            <a:avLst/>
+          </a:prstGeom>
+          <a:solidFill>
+            <a:schemeClr val="accent1"/>
+          </a:solidFill>
+          <a:ln w="50800" cap="rnd" cmpd="sng" algn="ctr">
+            <a:solidFill>
+              <a:schemeClr val="tx1"/>
+            </a:solidFill>
+            <a:prstDash val="solid"/>
+            <a:round/>
+            <a:headEnd type="none" w="med" len="med"/>
+            <a:tailEnd type="none" w="med" len="med"/>
+          </a:ln>
+          <a:effectLst/>
+        </p:spPr>
+      </p:cxnSp>
+    </p:spTree>
+  </p:cSld>
+  <p:clrMapOvr>
+    <a:masterClrMapping/>
+  </p:clrMapOvr>
+</p:sld>
+</file>
+
+<file path=ppt/slides/slide11.xml><?xml version="1.0" encoding="utf-8"?>
+<p:sld xmlns:a="http://schemas.openxmlformats.org/drawingml/2006/main" xmlns:r="http://schemas.openxmlformats.org/officeDocument/2006/relationships" xmlns:p="http://schemas.openxmlformats.org/presentationml/2006/main">
+  <p:cSld>
+    <p:spTree>
+      <p:nvGrpSpPr>
+        <p:cNvPr id="1" name=""/>
+        <p:cNvGrpSpPr/>
+        <p:nvPr/>
+      </p:nvGrpSpPr>
+      <p:grpSpPr>
+        <a:xfrm>
+          <a:off x="0" y="0"/>
+          <a:ext cx="0" cy="0"/>
+          <a:chOff x="0" y="0"/>
+          <a:chExt cx="0" cy="0"/>
+        </a:xfrm>
+      </p:grpSpPr>
+      <p:pic>
+        <p:nvPicPr>
           <p:cNvPr id="4" name="Picture 3" descr="comment.png"/>
           <p:cNvPicPr>
             <a:picLocks noChangeAspect="1"/>
@@ -4341,6 +4805,1989 @@
           </a:p>
         </p:txBody>
       </p:sp>
+    </p:spTree>
+  </p:cSld>
+  <p:clrMapOvr>
+    <a:masterClrMapping/>
+  </p:clrMapOvr>
+</p:sld>
+</file>
+
+<file path=ppt/slides/slide12.xml><?xml version="1.0" encoding="utf-8"?>
+<p:sld xmlns:a="http://schemas.openxmlformats.org/drawingml/2006/main" xmlns:r="http://schemas.openxmlformats.org/officeDocument/2006/relationships" xmlns:p="http://schemas.openxmlformats.org/presentationml/2006/main">
+  <p:cSld>
+    <p:spTree>
+      <p:nvGrpSpPr>
+        <p:cNvPr id="1" name=""/>
+        <p:cNvGrpSpPr/>
+        <p:nvPr/>
+      </p:nvGrpSpPr>
+      <p:grpSpPr>
+        <a:xfrm>
+          <a:off x="0" y="0"/>
+          <a:ext cx="0" cy="0"/>
+          <a:chOff x="0" y="0"/>
+          <a:chExt cx="0" cy="0"/>
+        </a:xfrm>
+      </p:grpSpPr>
+      <p:pic>
+        <p:nvPicPr>
+          <p:cNvPr id="4" name="Picture 3" descr="comment.png"/>
+          <p:cNvPicPr>
+            <a:picLocks noChangeAspect="1"/>
+          </p:cNvPicPr>
+          <p:nvPr/>
+        </p:nvPicPr>
+        <p:blipFill>
+          <a:blip r:embed="rId2"/>
+          <a:stretch>
+            <a:fillRect/>
+          </a:stretch>
+        </p:blipFill>
+        <p:spPr>
+          <a:xfrm>
+            <a:off x="1927629" y="1195000"/>
+            <a:ext cx="304800" cy="304800"/>
+          </a:xfrm>
+          <a:prstGeom prst="rect">
+            <a:avLst/>
+          </a:prstGeom>
+        </p:spPr>
+      </p:pic>
+      <p:pic>
+        <p:nvPicPr>
+          <p:cNvPr id="5" name="Picture 4" descr="comment_yellow.png"/>
+          <p:cNvPicPr>
+            <a:picLocks noChangeAspect="1"/>
+          </p:cNvPicPr>
+          <p:nvPr/>
+        </p:nvPicPr>
+        <p:blipFill>
+          <a:blip r:embed="rId3"/>
+          <a:stretch>
+            <a:fillRect/>
+          </a:stretch>
+        </p:blipFill>
+        <p:spPr>
+          <a:xfrm>
+            <a:off x="2461048" y="1195019"/>
+            <a:ext cx="304763" cy="304763"/>
+          </a:xfrm>
+          <a:prstGeom prst="rect">
+            <a:avLst/>
+          </a:prstGeom>
+        </p:spPr>
+      </p:pic>
+      <p:pic>
+        <p:nvPicPr>
+          <p:cNvPr id="6" name="Picture 5" descr="folder.png"/>
+          <p:cNvPicPr>
+            <a:picLocks noChangeAspect="1"/>
+          </p:cNvPicPr>
+          <p:nvPr/>
+        </p:nvPicPr>
+        <p:blipFill>
+          <a:blip r:embed="rId4"/>
+          <a:stretch>
+            <a:fillRect/>
+          </a:stretch>
+        </p:blipFill>
+        <p:spPr>
+          <a:xfrm>
+            <a:off x="2499129" y="1576009"/>
+            <a:ext cx="228600" cy="228600"/>
+          </a:xfrm>
+          <a:prstGeom prst="rect">
+            <a:avLst/>
+          </a:prstGeom>
+        </p:spPr>
+      </p:pic>
+      <p:pic>
+        <p:nvPicPr>
+          <p:cNvPr id="7" name="Picture 6" descr="folder_grey.png"/>
+          <p:cNvPicPr>
+            <a:picLocks noChangeAspect="1"/>
+          </p:cNvPicPr>
+          <p:nvPr/>
+        </p:nvPicPr>
+        <p:blipFill>
+          <a:blip r:embed="rId5"/>
+          <a:stretch>
+            <a:fillRect/>
+          </a:stretch>
+        </p:blipFill>
+        <p:spPr>
+          <a:xfrm>
+            <a:off x="1965729" y="1576009"/>
+            <a:ext cx="228600" cy="228600"/>
+          </a:xfrm>
+          <a:prstGeom prst="rect">
+            <a:avLst/>
+          </a:prstGeom>
+        </p:spPr>
+      </p:pic>
+      <p:pic>
+        <p:nvPicPr>
+          <p:cNvPr id="8" name="Picture 7" descr="lightbulb.png"/>
+          <p:cNvPicPr>
+            <a:picLocks noChangeAspect="1"/>
+          </p:cNvPicPr>
+          <p:nvPr/>
+        </p:nvPicPr>
+        <p:blipFill>
+          <a:blip r:embed="rId6"/>
+          <a:stretch>
+            <a:fillRect/>
+          </a:stretch>
+        </p:blipFill>
+        <p:spPr>
+          <a:xfrm>
+            <a:off x="2499129" y="814000"/>
+            <a:ext cx="228600" cy="228600"/>
+          </a:xfrm>
+          <a:prstGeom prst="rect">
+            <a:avLst/>
+          </a:prstGeom>
+        </p:spPr>
+      </p:pic>
+      <p:pic>
+        <p:nvPicPr>
+          <p:cNvPr id="9" name="Picture 8" descr="lightbulb_off.png"/>
+          <p:cNvPicPr>
+            <a:picLocks noChangeAspect="1"/>
+          </p:cNvPicPr>
+          <p:nvPr/>
+        </p:nvPicPr>
+        <p:blipFill>
+          <a:blip r:embed="rId7"/>
+          <a:stretch>
+            <a:fillRect/>
+          </a:stretch>
+        </p:blipFill>
+        <p:spPr>
+          <a:xfrm>
+            <a:off x="1965729" y="814000"/>
+            <a:ext cx="228600" cy="228600"/>
+          </a:xfrm>
+          <a:prstGeom prst="rect">
+            <a:avLst/>
+          </a:prstGeom>
+        </p:spPr>
+      </p:pic>
+      <p:sp>
+        <p:nvSpPr>
+          <p:cNvPr id="10" name="TextBox 9"/>
+          <p:cNvSpPr txBox="1"/>
+          <p:nvPr/>
+        </p:nvSpPr>
+        <p:spPr>
+          <a:xfrm>
+            <a:off x="1219200" y="789801"/>
+            <a:ext cx="594129" cy="276999"/>
+          </a:xfrm>
+          <a:prstGeom prst="rect">
+            <a:avLst/>
+          </a:prstGeom>
+          <a:noFill/>
+        </p:spPr>
+        <p:txBody>
+          <a:bodyPr wrap="square" rtlCol="0">
+            <a:spAutoFit/>
+          </a:bodyPr>
+          <a:lstStyle/>
+          <a:p>
+            <a:pPr algn="r"/>
+            <a:r>
+              <a:rPr lang="en-US" sz="1200" dirty="0" smtClean="0">
+                <a:solidFill>
+                  <a:srgbClr val="000000"/>
+                </a:solidFill>
+              </a:rPr>
+              <a:t>Claim</a:t>
+            </a:r>
+          </a:p>
+        </p:txBody>
+      </p:sp>
+      <p:sp>
+        <p:nvSpPr>
+          <p:cNvPr id="11" name="TextBox 10"/>
+          <p:cNvSpPr txBox="1"/>
+          <p:nvPr/>
+        </p:nvSpPr>
+        <p:spPr>
+          <a:xfrm>
+            <a:off x="1219200" y="1551810"/>
+            <a:ext cx="594129" cy="276999"/>
+          </a:xfrm>
+          <a:prstGeom prst="rect">
+            <a:avLst/>
+          </a:prstGeom>
+          <a:noFill/>
+        </p:spPr>
+        <p:txBody>
+          <a:bodyPr wrap="square" rtlCol="0">
+            <a:spAutoFit/>
+          </a:bodyPr>
+          <a:lstStyle/>
+          <a:p>
+            <a:pPr algn="r"/>
+            <a:r>
+              <a:rPr lang="en-US" sz="1200" dirty="0" smtClean="0">
+                <a:solidFill>
+                  <a:srgbClr val="000000"/>
+                </a:solidFill>
+              </a:rPr>
+              <a:t>Topic</a:t>
+            </a:r>
+          </a:p>
+        </p:txBody>
+      </p:sp>
+      <p:sp>
+        <p:nvSpPr>
+          <p:cNvPr id="12" name="TextBox 11"/>
+          <p:cNvSpPr txBox="1"/>
+          <p:nvPr/>
+        </p:nvSpPr>
+        <p:spPr>
+          <a:xfrm>
+            <a:off x="1066800" y="1189851"/>
+            <a:ext cx="746529" cy="276999"/>
+          </a:xfrm>
+          <a:prstGeom prst="rect">
+            <a:avLst/>
+          </a:prstGeom>
+          <a:noFill/>
+        </p:spPr>
+        <p:txBody>
+          <a:bodyPr wrap="square" rtlCol="0">
+            <a:spAutoFit/>
+          </a:bodyPr>
+          <a:lstStyle/>
+          <a:p>
+            <a:pPr algn="r"/>
+            <a:r>
+              <a:rPr lang="en-US" sz="1200" dirty="0" smtClean="0">
+                <a:solidFill>
+                  <a:srgbClr val="000000"/>
+                </a:solidFill>
+              </a:rPr>
+              <a:t>Snippet</a:t>
+            </a:r>
+          </a:p>
+        </p:txBody>
+      </p:sp>
+      <p:cxnSp>
+        <p:nvCxnSpPr>
+          <p:cNvPr id="14" name="Straight Connector 13"/>
+          <p:cNvCxnSpPr/>
+          <p:nvPr/>
+        </p:nvCxnSpPr>
+        <p:spPr>
+          <a:xfrm>
+            <a:off x="1279929" y="1143000"/>
+            <a:ext cx="1676400" cy="1588"/>
+          </a:xfrm>
+          <a:prstGeom prst="line">
+            <a:avLst/>
+          </a:prstGeom>
+        </p:spPr>
+        <p:style>
+          <a:lnRef idx="1">
+            <a:schemeClr val="accent1"/>
+          </a:lnRef>
+          <a:fillRef idx="0">
+            <a:schemeClr val="accent1"/>
+          </a:fillRef>
+          <a:effectRef idx="0">
+            <a:schemeClr val="accent1"/>
+          </a:effectRef>
+          <a:fontRef idx="minor">
+            <a:schemeClr val="tx1"/>
+          </a:fontRef>
+        </p:style>
+      </p:cxnSp>
+      <p:cxnSp>
+        <p:nvCxnSpPr>
+          <p:cNvPr id="15" name="Straight Connector 14"/>
+          <p:cNvCxnSpPr/>
+          <p:nvPr/>
+        </p:nvCxnSpPr>
+        <p:spPr>
+          <a:xfrm>
+            <a:off x="1279929" y="1524000"/>
+            <a:ext cx="1676400" cy="1588"/>
+          </a:xfrm>
+          <a:prstGeom prst="line">
+            <a:avLst/>
+          </a:prstGeom>
+        </p:spPr>
+        <p:style>
+          <a:lnRef idx="1">
+            <a:schemeClr val="accent1"/>
+          </a:lnRef>
+          <a:fillRef idx="0">
+            <a:schemeClr val="accent1"/>
+          </a:fillRef>
+          <a:effectRef idx="0">
+            <a:schemeClr val="accent1"/>
+          </a:effectRef>
+          <a:fontRef idx="minor">
+            <a:schemeClr val="tx1"/>
+          </a:fontRef>
+        </p:style>
+      </p:cxnSp>
+      <p:cxnSp>
+        <p:nvCxnSpPr>
+          <p:cNvPr id="16" name="Straight Connector 15"/>
+          <p:cNvCxnSpPr/>
+          <p:nvPr/>
+        </p:nvCxnSpPr>
+        <p:spPr>
+          <a:xfrm rot="5400000">
+            <a:off x="1775229" y="1333500"/>
+            <a:ext cx="1143000" cy="1588"/>
+          </a:xfrm>
+          <a:prstGeom prst="line">
+            <a:avLst/>
+          </a:prstGeom>
+        </p:spPr>
+        <p:style>
+          <a:lnRef idx="1">
+            <a:schemeClr val="accent1"/>
+          </a:lnRef>
+          <a:fillRef idx="0">
+            <a:schemeClr val="accent1"/>
+          </a:fillRef>
+          <a:effectRef idx="0">
+            <a:schemeClr val="accent1"/>
+          </a:effectRef>
+          <a:fontRef idx="minor">
+            <a:schemeClr val="tx1"/>
+          </a:fontRef>
+        </p:style>
+      </p:cxnSp>
+      <p:sp>
+        <p:nvSpPr>
+          <p:cNvPr id="21" name="TextBox 20"/>
+          <p:cNvSpPr txBox="1"/>
+          <p:nvPr/>
+        </p:nvSpPr>
+        <p:spPr>
+          <a:xfrm rot="18851434">
+            <a:off x="2349100" y="193379"/>
+            <a:ext cx="1143000" cy="276999"/>
+          </a:xfrm>
+          <a:prstGeom prst="rect">
+            <a:avLst/>
+          </a:prstGeom>
+          <a:noFill/>
+        </p:spPr>
+        <p:txBody>
+          <a:bodyPr wrap="square" rtlCol="0">
+            <a:spAutoFit/>
+          </a:bodyPr>
+          <a:lstStyle/>
+          <a:p>
+            <a:r>
+              <a:rPr lang="en-US" sz="1200" dirty="0" smtClean="0">
+                <a:solidFill>
+                  <a:srgbClr val="000000"/>
+                </a:solidFill>
+              </a:rPr>
+              <a:t>Voted for</a:t>
+            </a:r>
+            <a:endParaRPr lang="en-US" sz="1200" dirty="0" smtClean="0">
+              <a:solidFill>
+                <a:srgbClr val="000000"/>
+              </a:solidFill>
+            </a:endParaRPr>
+          </a:p>
+        </p:txBody>
+      </p:sp>
+      <p:sp>
+        <p:nvSpPr>
+          <p:cNvPr id="22" name="TextBox 21"/>
+          <p:cNvSpPr txBox="1"/>
+          <p:nvPr/>
+        </p:nvSpPr>
+        <p:spPr>
+          <a:xfrm rot="18851434">
+            <a:off x="1815700" y="193379"/>
+            <a:ext cx="1143000" cy="276999"/>
+          </a:xfrm>
+          <a:prstGeom prst="rect">
+            <a:avLst/>
+          </a:prstGeom>
+          <a:noFill/>
+        </p:spPr>
+        <p:txBody>
+          <a:bodyPr wrap="square" rtlCol="0">
+            <a:spAutoFit/>
+          </a:bodyPr>
+          <a:lstStyle/>
+          <a:p>
+            <a:r>
+              <a:rPr lang="en-US" sz="1200" dirty="0" smtClean="0">
+                <a:solidFill>
+                  <a:srgbClr val="000000"/>
+                </a:solidFill>
+              </a:rPr>
+              <a:t>Normal</a:t>
+            </a:r>
+          </a:p>
+        </p:txBody>
+      </p:sp>
+      <p:pic>
+        <p:nvPicPr>
+          <p:cNvPr id="23" name="Picture 22" descr="lightbulb_green.png"/>
+          <p:cNvPicPr>
+            <a:picLocks noChangeAspect="1"/>
+          </p:cNvPicPr>
+          <p:nvPr/>
+        </p:nvPicPr>
+        <p:blipFill>
+          <a:blip r:embed="rId8"/>
+          <a:stretch>
+            <a:fillRect/>
+          </a:stretch>
+        </p:blipFill>
+        <p:spPr>
+          <a:xfrm>
+            <a:off x="4262458" y="837406"/>
+            <a:ext cx="203175" cy="203175"/>
+          </a:xfrm>
+          <a:prstGeom prst="rect">
+            <a:avLst/>
+          </a:prstGeom>
+        </p:spPr>
+      </p:pic>
+      <p:pic>
+        <p:nvPicPr>
+          <p:cNvPr id="24" name="Picture 23" descr="lightbulb_greenyellow.png"/>
+          <p:cNvPicPr>
+            <a:picLocks noChangeAspect="1"/>
+          </p:cNvPicPr>
+          <p:nvPr/>
+        </p:nvPicPr>
+        <p:blipFill>
+          <a:blip r:embed="rId9"/>
+          <a:stretch>
+            <a:fillRect/>
+          </a:stretch>
+        </p:blipFill>
+        <p:spPr>
+          <a:xfrm>
+            <a:off x="4719658" y="837406"/>
+            <a:ext cx="203175" cy="203175"/>
+          </a:xfrm>
+          <a:prstGeom prst="rect">
+            <a:avLst/>
+          </a:prstGeom>
+        </p:spPr>
+      </p:pic>
+      <p:pic>
+        <p:nvPicPr>
+          <p:cNvPr id="25" name="Picture 24" descr="lightbulb_red.png"/>
+          <p:cNvPicPr>
+            <a:picLocks noChangeAspect="1"/>
+          </p:cNvPicPr>
+          <p:nvPr/>
+        </p:nvPicPr>
+        <p:blipFill>
+          <a:blip r:embed="rId10"/>
+          <a:stretch>
+            <a:fillRect/>
+          </a:stretch>
+        </p:blipFill>
+        <p:spPr>
+          <a:xfrm>
+            <a:off x="4262458" y="1218406"/>
+            <a:ext cx="203175" cy="203175"/>
+          </a:xfrm>
+          <a:prstGeom prst="rect">
+            <a:avLst/>
+          </a:prstGeom>
+        </p:spPr>
+      </p:pic>
+      <p:pic>
+        <p:nvPicPr>
+          <p:cNvPr id="26" name="Picture 25" descr="lightbulb_redyellow.png"/>
+          <p:cNvPicPr>
+            <a:picLocks noChangeAspect="1"/>
+          </p:cNvPicPr>
+          <p:nvPr/>
+        </p:nvPicPr>
+        <p:blipFill>
+          <a:blip r:embed="rId11"/>
+          <a:stretch>
+            <a:fillRect/>
+          </a:stretch>
+        </p:blipFill>
+        <p:spPr>
+          <a:xfrm>
+            <a:off x="4719658" y="1218406"/>
+            <a:ext cx="203175" cy="203175"/>
+          </a:xfrm>
+          <a:prstGeom prst="rect">
+            <a:avLst/>
+          </a:prstGeom>
+        </p:spPr>
+      </p:pic>
+      <p:pic>
+        <p:nvPicPr>
+          <p:cNvPr id="27" name="Picture 26" descr="lightbulb.png"/>
+          <p:cNvPicPr>
+            <a:picLocks noChangeAspect="1"/>
+          </p:cNvPicPr>
+          <p:nvPr/>
+        </p:nvPicPr>
+        <p:blipFill>
+          <a:blip r:embed="rId6"/>
+          <a:stretch>
+            <a:fillRect/>
+          </a:stretch>
+        </p:blipFill>
+        <p:spPr>
+          <a:xfrm>
+            <a:off x="4719658" y="1599406"/>
+            <a:ext cx="201168" cy="201168"/>
+          </a:xfrm>
+          <a:prstGeom prst="rect">
+            <a:avLst/>
+          </a:prstGeom>
+        </p:spPr>
+      </p:pic>
+      <p:pic>
+        <p:nvPicPr>
+          <p:cNvPr id="28" name="Picture 27" descr="lightbulb_off.png"/>
+          <p:cNvPicPr>
+            <a:picLocks noChangeAspect="1"/>
+          </p:cNvPicPr>
+          <p:nvPr/>
+        </p:nvPicPr>
+        <p:blipFill>
+          <a:blip r:embed="rId7"/>
+          <a:stretch>
+            <a:fillRect/>
+          </a:stretch>
+        </p:blipFill>
+        <p:spPr>
+          <a:xfrm>
+            <a:off x="4262458" y="1599406"/>
+            <a:ext cx="201168" cy="201168"/>
+          </a:xfrm>
+          <a:prstGeom prst="rect">
+            <a:avLst/>
+          </a:prstGeom>
+        </p:spPr>
+      </p:pic>
+      <p:sp>
+        <p:nvSpPr>
+          <p:cNvPr id="32" name="TextBox 31"/>
+          <p:cNvSpPr txBox="1"/>
+          <p:nvPr/>
+        </p:nvSpPr>
+        <p:spPr>
+          <a:xfrm>
+            <a:off x="3195658" y="789007"/>
+            <a:ext cx="838201" cy="276999"/>
+          </a:xfrm>
+          <a:prstGeom prst="rect">
+            <a:avLst/>
+          </a:prstGeom>
+          <a:noFill/>
+        </p:spPr>
+        <p:txBody>
+          <a:bodyPr wrap="square" rtlCol="0">
+            <a:spAutoFit/>
+          </a:bodyPr>
+          <a:lstStyle/>
+          <a:p>
+            <a:pPr algn="r"/>
+            <a:r>
+              <a:rPr lang="en-US" sz="1200" dirty="0" smtClean="0">
+                <a:solidFill>
+                  <a:srgbClr val="000000"/>
+                </a:solidFill>
+              </a:rPr>
+              <a:t>Supported</a:t>
+            </a:r>
+          </a:p>
+        </p:txBody>
+      </p:sp>
+      <p:sp>
+        <p:nvSpPr>
+          <p:cNvPr id="33" name="TextBox 32"/>
+          <p:cNvSpPr txBox="1"/>
+          <p:nvPr/>
+        </p:nvSpPr>
+        <p:spPr>
+          <a:xfrm>
+            <a:off x="3348059" y="1551016"/>
+            <a:ext cx="685800" cy="276999"/>
+          </a:xfrm>
+          <a:prstGeom prst="rect">
+            <a:avLst/>
+          </a:prstGeom>
+          <a:noFill/>
+        </p:spPr>
+        <p:txBody>
+          <a:bodyPr wrap="square" rtlCol="0">
+            <a:spAutoFit/>
+          </a:bodyPr>
+          <a:lstStyle/>
+          <a:p>
+            <a:pPr algn="r"/>
+            <a:r>
+              <a:rPr lang="en-US" sz="1200" dirty="0" smtClean="0">
+                <a:solidFill>
+                  <a:srgbClr val="000000"/>
+                </a:solidFill>
+              </a:rPr>
+              <a:t>Neither</a:t>
+            </a:r>
+          </a:p>
+        </p:txBody>
+      </p:sp>
+      <p:sp>
+        <p:nvSpPr>
+          <p:cNvPr id="34" name="TextBox 33"/>
+          <p:cNvSpPr txBox="1"/>
+          <p:nvPr/>
+        </p:nvSpPr>
+        <p:spPr>
+          <a:xfrm>
+            <a:off x="3287329" y="1189057"/>
+            <a:ext cx="746529" cy="276999"/>
+          </a:xfrm>
+          <a:prstGeom prst="rect">
+            <a:avLst/>
+          </a:prstGeom>
+          <a:noFill/>
+        </p:spPr>
+        <p:txBody>
+          <a:bodyPr wrap="square" rtlCol="0">
+            <a:spAutoFit/>
+          </a:bodyPr>
+          <a:lstStyle/>
+          <a:p>
+            <a:pPr algn="r"/>
+            <a:r>
+              <a:rPr lang="en-US" sz="1200" dirty="0" smtClean="0">
+                <a:solidFill>
+                  <a:srgbClr val="000000"/>
+                </a:solidFill>
+              </a:rPr>
+              <a:t>Opposed</a:t>
+            </a:r>
+          </a:p>
+        </p:txBody>
+      </p:sp>
+      <p:cxnSp>
+        <p:nvCxnSpPr>
+          <p:cNvPr id="35" name="Straight Connector 34"/>
+          <p:cNvCxnSpPr/>
+          <p:nvPr/>
+        </p:nvCxnSpPr>
+        <p:spPr>
+          <a:xfrm>
+            <a:off x="3500458" y="1142206"/>
+            <a:ext cx="1676400" cy="1588"/>
+          </a:xfrm>
+          <a:prstGeom prst="line">
+            <a:avLst/>
+          </a:prstGeom>
+        </p:spPr>
+        <p:style>
+          <a:lnRef idx="1">
+            <a:schemeClr val="accent1"/>
+          </a:lnRef>
+          <a:fillRef idx="0">
+            <a:schemeClr val="accent1"/>
+          </a:fillRef>
+          <a:effectRef idx="0">
+            <a:schemeClr val="accent1"/>
+          </a:effectRef>
+          <a:fontRef idx="minor">
+            <a:schemeClr val="tx1"/>
+          </a:fontRef>
+        </p:style>
+      </p:cxnSp>
+      <p:cxnSp>
+        <p:nvCxnSpPr>
+          <p:cNvPr id="36" name="Straight Connector 35"/>
+          <p:cNvCxnSpPr/>
+          <p:nvPr/>
+        </p:nvCxnSpPr>
+        <p:spPr>
+          <a:xfrm>
+            <a:off x="3500458" y="1523206"/>
+            <a:ext cx="1676400" cy="1588"/>
+          </a:xfrm>
+          <a:prstGeom prst="line">
+            <a:avLst/>
+          </a:prstGeom>
+        </p:spPr>
+        <p:style>
+          <a:lnRef idx="1">
+            <a:schemeClr val="accent1"/>
+          </a:lnRef>
+          <a:fillRef idx="0">
+            <a:schemeClr val="accent1"/>
+          </a:fillRef>
+          <a:effectRef idx="0">
+            <a:schemeClr val="accent1"/>
+          </a:effectRef>
+          <a:fontRef idx="minor">
+            <a:schemeClr val="tx1"/>
+          </a:fontRef>
+        </p:style>
+      </p:cxnSp>
+      <p:cxnSp>
+        <p:nvCxnSpPr>
+          <p:cNvPr id="37" name="Straight Connector 36"/>
+          <p:cNvCxnSpPr/>
+          <p:nvPr/>
+        </p:nvCxnSpPr>
+        <p:spPr>
+          <a:xfrm rot="5400000">
+            <a:off x="3995758" y="1332706"/>
+            <a:ext cx="1143000" cy="1588"/>
+          </a:xfrm>
+          <a:prstGeom prst="line">
+            <a:avLst/>
+          </a:prstGeom>
+        </p:spPr>
+        <p:style>
+          <a:lnRef idx="1">
+            <a:schemeClr val="accent1"/>
+          </a:lnRef>
+          <a:fillRef idx="0">
+            <a:schemeClr val="accent1"/>
+          </a:fillRef>
+          <a:effectRef idx="0">
+            <a:schemeClr val="accent1"/>
+          </a:effectRef>
+          <a:fontRef idx="minor">
+            <a:schemeClr val="tx1"/>
+          </a:fontRef>
+        </p:style>
+      </p:cxnSp>
+      <p:sp>
+        <p:nvSpPr>
+          <p:cNvPr id="38" name="TextBox 37"/>
+          <p:cNvSpPr txBox="1"/>
+          <p:nvPr/>
+        </p:nvSpPr>
+        <p:spPr>
+          <a:xfrm rot="18851434">
+            <a:off x="4569629" y="193379"/>
+            <a:ext cx="1143000" cy="276999"/>
+          </a:xfrm>
+          <a:prstGeom prst="rect">
+            <a:avLst/>
+          </a:prstGeom>
+          <a:noFill/>
+        </p:spPr>
+        <p:txBody>
+          <a:bodyPr wrap="square" rtlCol="0">
+            <a:spAutoFit/>
+          </a:bodyPr>
+          <a:lstStyle/>
+          <a:p>
+            <a:r>
+              <a:rPr lang="en-US" sz="1200" dirty="0" smtClean="0">
+                <a:solidFill>
+                  <a:srgbClr val="000000"/>
+                </a:solidFill>
+              </a:rPr>
+              <a:t>Voted for</a:t>
+            </a:r>
+            <a:endParaRPr lang="en-US" sz="1200" dirty="0" smtClean="0">
+              <a:solidFill>
+                <a:srgbClr val="000000"/>
+              </a:solidFill>
+            </a:endParaRPr>
+          </a:p>
+        </p:txBody>
+      </p:sp>
+      <p:sp>
+        <p:nvSpPr>
+          <p:cNvPr id="39" name="TextBox 38"/>
+          <p:cNvSpPr txBox="1"/>
+          <p:nvPr/>
+        </p:nvSpPr>
+        <p:spPr>
+          <a:xfrm rot="18851434">
+            <a:off x="4036229" y="193379"/>
+            <a:ext cx="1143000" cy="276999"/>
+          </a:xfrm>
+          <a:prstGeom prst="rect">
+            <a:avLst/>
+          </a:prstGeom>
+          <a:noFill/>
+        </p:spPr>
+        <p:txBody>
+          <a:bodyPr wrap="square" rtlCol="0">
+            <a:spAutoFit/>
+          </a:bodyPr>
+          <a:lstStyle/>
+          <a:p>
+            <a:r>
+              <a:rPr lang="en-US" sz="1200" dirty="0" smtClean="0">
+                <a:solidFill>
+                  <a:srgbClr val="000000"/>
+                </a:solidFill>
+              </a:rPr>
+              <a:t>Normal</a:t>
+            </a:r>
+          </a:p>
+        </p:txBody>
+      </p:sp>
+    </p:spTree>
+  </p:cSld>
+  <p:clrMapOvr>
+    <a:masterClrMapping/>
+  </p:clrMapOvr>
+</p:sld>
+</file>
+
+<file path=ppt/slides/slide13.xml><?xml version="1.0" encoding="utf-8"?>
+<p:sld xmlns:a="http://schemas.openxmlformats.org/drawingml/2006/main" xmlns:r="http://schemas.openxmlformats.org/officeDocument/2006/relationships" xmlns:p="http://schemas.openxmlformats.org/presentationml/2006/main">
+  <p:cSld>
+    <p:spTree>
+      <p:nvGrpSpPr>
+        <p:cNvPr id="1" name=""/>
+        <p:cNvGrpSpPr/>
+        <p:nvPr/>
+      </p:nvGrpSpPr>
+      <p:grpSpPr>
+        <a:xfrm>
+          <a:off x="0" y="0"/>
+          <a:ext cx="0" cy="0"/>
+          <a:chOff x="0" y="0"/>
+          <a:chExt cx="0" cy="0"/>
+        </a:xfrm>
+      </p:grpSpPr>
+      <p:sp>
+        <p:nvSpPr>
+          <p:cNvPr id="26" name="Oval 25"/>
+          <p:cNvSpPr/>
+          <p:nvPr/>
+        </p:nvSpPr>
+        <p:spPr>
+          <a:xfrm>
+            <a:off x="1981200" y="1524000"/>
+            <a:ext cx="4191000" cy="2895600"/>
+          </a:xfrm>
+          <a:prstGeom prst="ellipse">
+            <a:avLst/>
+          </a:prstGeom>
+          <a:noFill/>
+          <a:effectLst/>
+        </p:spPr>
+        <p:style>
+          <a:lnRef idx="2">
+            <a:schemeClr val="dk1"/>
+          </a:lnRef>
+          <a:fillRef idx="1">
+            <a:schemeClr val="lt1"/>
+          </a:fillRef>
+          <a:effectRef idx="0">
+            <a:schemeClr val="dk1"/>
+          </a:effectRef>
+          <a:fontRef idx="minor">
+            <a:schemeClr val="dk1"/>
+          </a:fontRef>
+        </p:style>
+        <p:txBody>
+          <a:bodyPr rtlCol="0" anchor="ctr"/>
+          <a:lstStyle/>
+          <a:p>
+            <a:pPr algn="ctr"/>
+            <a:endParaRPr lang="en-US"/>
+          </a:p>
+        </p:txBody>
+      </p:sp>
+      <p:pic>
+        <p:nvPicPr>
+          <p:cNvPr id="5" name="Picture 4" descr="lightbulb_off.png"/>
+          <p:cNvPicPr>
+            <a:picLocks noChangeAspect="1"/>
+          </p:cNvPicPr>
+          <p:nvPr/>
+        </p:nvPicPr>
+        <p:blipFill>
+          <a:blip r:embed="rId2"/>
+          <a:stretch>
+            <a:fillRect/>
+          </a:stretch>
+        </p:blipFill>
+        <p:spPr>
+          <a:xfrm>
+            <a:off x="4267200" y="3236764"/>
+            <a:ext cx="201168" cy="201168"/>
+          </a:xfrm>
+          <a:prstGeom prst="rect">
+            <a:avLst/>
+          </a:prstGeom>
+        </p:spPr>
+      </p:pic>
+      <p:pic>
+        <p:nvPicPr>
+          <p:cNvPr id="6" name="Picture 5" descr="lightbulb_red.png"/>
+          <p:cNvPicPr>
+            <a:picLocks noChangeAspect="1"/>
+          </p:cNvPicPr>
+          <p:nvPr/>
+        </p:nvPicPr>
+        <p:blipFill>
+          <a:blip r:embed="rId3"/>
+          <a:stretch>
+            <a:fillRect/>
+          </a:stretch>
+        </p:blipFill>
+        <p:spPr>
+          <a:xfrm>
+            <a:off x="3429000" y="1943100"/>
+            <a:ext cx="203175" cy="203175"/>
+          </a:xfrm>
+          <a:prstGeom prst="rect">
+            <a:avLst/>
+          </a:prstGeom>
+        </p:spPr>
+      </p:pic>
+      <p:pic>
+        <p:nvPicPr>
+          <p:cNvPr id="7" name="Picture 6" descr="lightbulb_off.png"/>
+          <p:cNvPicPr>
+            <a:picLocks noChangeAspect="1"/>
+          </p:cNvPicPr>
+          <p:nvPr/>
+        </p:nvPicPr>
+        <p:blipFill>
+          <a:blip r:embed="rId2"/>
+          <a:stretch>
+            <a:fillRect/>
+          </a:stretch>
+        </p:blipFill>
+        <p:spPr>
+          <a:xfrm>
+            <a:off x="2362200" y="3380234"/>
+            <a:ext cx="201168" cy="201168"/>
+          </a:xfrm>
+          <a:prstGeom prst="rect">
+            <a:avLst/>
+          </a:prstGeom>
+        </p:spPr>
+      </p:pic>
+      <p:sp>
+        <p:nvSpPr>
+          <p:cNvPr id="8" name="TextBox 7"/>
+          <p:cNvSpPr txBox="1"/>
+          <p:nvPr/>
+        </p:nvSpPr>
+        <p:spPr>
+          <a:xfrm>
+            <a:off x="3596871" y="1748135"/>
+            <a:ext cx="1813329" cy="461665"/>
+          </a:xfrm>
+          <a:prstGeom prst="rect">
+            <a:avLst/>
+          </a:prstGeom>
+          <a:noFill/>
+        </p:spPr>
+        <p:txBody>
+          <a:bodyPr wrap="square" rtlCol="0">
+            <a:spAutoFit/>
+          </a:bodyPr>
+          <a:lstStyle/>
+          <a:p>
+            <a:r>
+              <a:rPr lang="en-US" sz="1200" dirty="0" smtClean="0">
+                <a:solidFill>
+                  <a:srgbClr val="000000"/>
+                </a:solidFill>
+              </a:rPr>
+              <a:t>Electric cars are good for the environment</a:t>
+            </a:r>
+          </a:p>
+        </p:txBody>
+      </p:sp>
+      <p:sp>
+        <p:nvSpPr>
+          <p:cNvPr id="9" name="TextBox 8"/>
+          <p:cNvSpPr txBox="1"/>
+          <p:nvPr/>
+        </p:nvSpPr>
+        <p:spPr>
+          <a:xfrm>
+            <a:off x="4419600" y="3200400"/>
+            <a:ext cx="1600200" cy="646331"/>
+          </a:xfrm>
+          <a:prstGeom prst="rect">
+            <a:avLst/>
+          </a:prstGeom>
+          <a:noFill/>
+        </p:spPr>
+        <p:txBody>
+          <a:bodyPr wrap="square" rtlCol="0">
+            <a:spAutoFit/>
+          </a:bodyPr>
+          <a:lstStyle/>
+          <a:p>
+            <a:r>
+              <a:rPr lang="en-US" sz="1200" dirty="0" smtClean="0">
+                <a:solidFill>
+                  <a:srgbClr val="000000"/>
+                </a:solidFill>
+              </a:rPr>
+              <a:t>Electric cars emit less carbon </a:t>
+            </a:r>
+            <a:r>
+              <a:rPr lang="en-US" sz="1200" dirty="0" smtClean="0">
+                <a:solidFill>
+                  <a:srgbClr val="000000"/>
+                </a:solidFill>
+              </a:rPr>
+              <a:t>dioxide than</a:t>
+            </a:r>
+            <a:br>
+              <a:rPr lang="en-US" sz="1200" dirty="0" smtClean="0">
+                <a:solidFill>
+                  <a:srgbClr val="000000"/>
+                </a:solidFill>
+              </a:rPr>
+            </a:br>
+            <a:r>
+              <a:rPr lang="en-US" sz="1200" dirty="0" smtClean="0">
+                <a:solidFill>
+                  <a:srgbClr val="000000"/>
+                </a:solidFill>
+              </a:rPr>
+              <a:t>normal cars</a:t>
+            </a:r>
+            <a:endParaRPr lang="en-US" sz="1200" dirty="0" smtClean="0">
+              <a:solidFill>
+                <a:srgbClr val="000000"/>
+              </a:solidFill>
+            </a:endParaRPr>
+          </a:p>
+        </p:txBody>
+      </p:sp>
+      <p:sp>
+        <p:nvSpPr>
+          <p:cNvPr id="10" name="TextBox 9"/>
+          <p:cNvSpPr txBox="1"/>
+          <p:nvPr/>
+        </p:nvSpPr>
+        <p:spPr>
+          <a:xfrm>
+            <a:off x="2537635" y="3272135"/>
+            <a:ext cx="1600200" cy="646331"/>
+          </a:xfrm>
+          <a:prstGeom prst="rect">
+            <a:avLst/>
+          </a:prstGeom>
+          <a:noFill/>
+        </p:spPr>
+        <p:txBody>
+          <a:bodyPr wrap="square" rtlCol="0">
+            <a:spAutoFit/>
+          </a:bodyPr>
+          <a:lstStyle/>
+          <a:p>
+            <a:r>
+              <a:rPr lang="en-US" sz="1200" dirty="0" smtClean="0">
+                <a:solidFill>
+                  <a:srgbClr val="000000"/>
+                </a:solidFill>
+              </a:rPr>
+              <a:t>Electric car batteries cause environmental damage</a:t>
+            </a:r>
+          </a:p>
+        </p:txBody>
+      </p:sp>
+      <p:sp>
+        <p:nvSpPr>
+          <p:cNvPr id="11" name="TextBox 40"/>
+          <p:cNvSpPr txBox="1">
+            <a:spLocks noChangeArrowheads="1"/>
+          </p:cNvSpPr>
+          <p:nvPr/>
+        </p:nvSpPr>
+        <p:spPr bwMode="auto">
+          <a:xfrm>
+            <a:off x="3733800" y="2667000"/>
+            <a:ext cx="721671" cy="276999"/>
+          </a:xfrm>
+          <a:prstGeom prst="rect">
+            <a:avLst/>
+          </a:prstGeom>
+          <a:noFill/>
+          <a:ln w="9525">
+            <a:noFill/>
+            <a:miter lim="800000"/>
+            <a:headEnd/>
+            <a:tailEnd/>
+          </a:ln>
+        </p:spPr>
+        <p:txBody>
+          <a:bodyPr wrap="none">
+            <a:spAutoFit/>
+          </a:bodyPr>
+          <a:lstStyle/>
+          <a:p>
+            <a:pPr algn="ctr" eaLnBrk="0" hangingPunct="0"/>
+            <a:r>
+              <a:rPr lang="en-US" sz="1200" i="1" dirty="0">
+                <a:solidFill>
+                  <a:schemeClr val="tx2">
+                    <a:lumMod val="75000"/>
+                  </a:schemeClr>
+                </a:solidFill>
+              </a:rPr>
+              <a:t>supports</a:t>
+            </a:r>
+          </a:p>
+        </p:txBody>
+      </p:sp>
+      <p:cxnSp>
+        <p:nvCxnSpPr>
+          <p:cNvPr id="14" name="Shape 13"/>
+          <p:cNvCxnSpPr>
+            <a:stCxn id="5" idx="1"/>
+            <a:endCxn id="6" idx="2"/>
+          </p:cNvCxnSpPr>
+          <p:nvPr/>
+        </p:nvCxnSpPr>
+        <p:spPr>
+          <a:xfrm rot="10800000">
+            <a:off x="3530588" y="2146276"/>
+            <a:ext cx="736612" cy="1191073"/>
+          </a:xfrm>
+          <a:prstGeom prst="curvedConnector2">
+            <a:avLst/>
+          </a:prstGeom>
+          <a:ln w="28575">
+            <a:tailEnd type="arrow"/>
+          </a:ln>
+        </p:spPr>
+        <p:style>
+          <a:lnRef idx="1">
+            <a:schemeClr val="accent1"/>
+          </a:lnRef>
+          <a:fillRef idx="0">
+            <a:schemeClr val="accent1"/>
+          </a:fillRef>
+          <a:effectRef idx="0">
+            <a:schemeClr val="accent1"/>
+          </a:effectRef>
+          <a:fontRef idx="minor">
+            <a:schemeClr val="tx1"/>
+          </a:fontRef>
+        </p:style>
+      </p:cxnSp>
+      <p:cxnSp>
+        <p:nvCxnSpPr>
+          <p:cNvPr id="16" name="Shape 15"/>
+          <p:cNvCxnSpPr>
+            <a:stCxn id="7" idx="0"/>
+            <a:endCxn id="6" idx="2"/>
+          </p:cNvCxnSpPr>
+          <p:nvPr/>
+        </p:nvCxnSpPr>
+        <p:spPr>
+          <a:xfrm rot="5400000" flipH="1" flipV="1">
+            <a:off x="2379707" y="2229353"/>
+            <a:ext cx="1233959" cy="1067804"/>
+          </a:xfrm>
+          <a:prstGeom prst="curvedConnector3">
+            <a:avLst>
+              <a:gd name="adj1" fmla="val 50000"/>
+            </a:avLst>
+          </a:prstGeom>
+          <a:ln w="28575">
+            <a:tailEnd type="arrow"/>
+          </a:ln>
+        </p:spPr>
+        <p:style>
+          <a:lnRef idx="1">
+            <a:schemeClr val="accent1"/>
+          </a:lnRef>
+          <a:fillRef idx="0">
+            <a:schemeClr val="accent1"/>
+          </a:fillRef>
+          <a:effectRef idx="0">
+            <a:schemeClr val="accent1"/>
+          </a:effectRef>
+          <a:fontRef idx="minor">
+            <a:schemeClr val="tx1"/>
+          </a:fontRef>
+        </p:style>
+      </p:cxnSp>
+      <p:sp>
+        <p:nvSpPr>
+          <p:cNvPr id="25" name="TextBox 40"/>
+          <p:cNvSpPr txBox="1">
+            <a:spLocks noChangeArrowheads="1"/>
+          </p:cNvSpPr>
+          <p:nvPr/>
+        </p:nvSpPr>
+        <p:spPr bwMode="auto">
+          <a:xfrm>
+            <a:off x="2438400" y="2514600"/>
+            <a:ext cx="691216" cy="276999"/>
+          </a:xfrm>
+          <a:prstGeom prst="rect">
+            <a:avLst/>
+          </a:prstGeom>
+          <a:noFill/>
+          <a:ln w="9525">
+            <a:noFill/>
+            <a:miter lim="800000"/>
+            <a:headEnd/>
+            <a:tailEnd/>
+          </a:ln>
+        </p:spPr>
+        <p:txBody>
+          <a:bodyPr wrap="none">
+            <a:spAutoFit/>
+          </a:bodyPr>
+          <a:lstStyle/>
+          <a:p>
+            <a:pPr algn="ctr" eaLnBrk="0" hangingPunct="0"/>
+            <a:r>
+              <a:rPr lang="en-US" sz="1200" i="1" dirty="0" smtClean="0">
+                <a:solidFill>
+                  <a:schemeClr val="tx2">
+                    <a:lumMod val="75000"/>
+                  </a:schemeClr>
+                </a:solidFill>
+              </a:rPr>
+              <a:t>opposes</a:t>
+            </a:r>
+            <a:endParaRPr lang="en-US" sz="1200" i="1" dirty="0">
+              <a:solidFill>
+                <a:schemeClr val="tx2">
+                  <a:lumMod val="75000"/>
+                </a:schemeClr>
+              </a:solidFill>
+            </a:endParaRPr>
+          </a:p>
+        </p:txBody>
+      </p:sp>
+      <p:pic>
+        <p:nvPicPr>
+          <p:cNvPr id="15" name="Picture 14" descr="snippet_batterytoxic.png"/>
+          <p:cNvPicPr>
+            <a:picLocks noChangeAspect="1"/>
+          </p:cNvPicPr>
+          <p:nvPr/>
+        </p:nvPicPr>
+        <p:blipFill>
+          <a:blip r:embed="rId4"/>
+          <a:stretch>
+            <a:fillRect/>
+          </a:stretch>
+        </p:blipFill>
+        <p:spPr>
+          <a:xfrm>
+            <a:off x="304800" y="4191000"/>
+            <a:ext cx="1946189" cy="533400"/>
+          </a:xfrm>
+          <a:prstGeom prst="rect">
+            <a:avLst/>
+          </a:prstGeom>
+        </p:spPr>
+      </p:pic>
+      <p:cxnSp>
+        <p:nvCxnSpPr>
+          <p:cNvPr id="17" name="Shape 15"/>
+          <p:cNvCxnSpPr>
+            <a:stCxn id="15" idx="0"/>
+            <a:endCxn id="7" idx="1"/>
+          </p:cNvCxnSpPr>
+          <p:nvPr/>
+        </p:nvCxnSpPr>
+        <p:spPr>
+          <a:xfrm rot="5400000" flipH="1" flipV="1">
+            <a:off x="1464956" y="3293757"/>
+            <a:ext cx="710182" cy="1084305"/>
+          </a:xfrm>
+          <a:prstGeom prst="curvedConnector2">
+            <a:avLst/>
+          </a:prstGeom>
+          <a:ln>
+            <a:solidFill>
+              <a:schemeClr val="bg1">
+                <a:lumMod val="65000"/>
+              </a:schemeClr>
+            </a:solidFill>
+            <a:tailEnd type="arrow"/>
+          </a:ln>
+        </p:spPr>
+        <p:style>
+          <a:lnRef idx="1">
+            <a:schemeClr val="accent1"/>
+          </a:lnRef>
+          <a:fillRef idx="0">
+            <a:schemeClr val="accent1"/>
+          </a:fillRef>
+          <a:effectRef idx="0">
+            <a:schemeClr val="accent1"/>
+          </a:effectRef>
+          <a:fontRef idx="minor">
+            <a:schemeClr val="tx1"/>
+          </a:fontRef>
+        </p:style>
+      </p:cxnSp>
+      <p:sp>
+        <p:nvSpPr>
+          <p:cNvPr id="20" name="TextBox 40"/>
+          <p:cNvSpPr txBox="1">
+            <a:spLocks noChangeArrowheads="1"/>
+          </p:cNvSpPr>
+          <p:nvPr/>
+        </p:nvSpPr>
+        <p:spPr bwMode="auto">
+          <a:xfrm>
+            <a:off x="990600" y="3581400"/>
+            <a:ext cx="579006" cy="276999"/>
+          </a:xfrm>
+          <a:prstGeom prst="rect">
+            <a:avLst/>
+          </a:prstGeom>
+          <a:noFill/>
+          <a:ln w="9525">
+            <a:noFill/>
+            <a:miter lim="800000"/>
+            <a:headEnd/>
+            <a:tailEnd/>
+          </a:ln>
+        </p:spPr>
+        <p:txBody>
+          <a:bodyPr wrap="none">
+            <a:spAutoFit/>
+          </a:bodyPr>
+          <a:lstStyle/>
+          <a:p>
+            <a:pPr algn="ctr" eaLnBrk="0" hangingPunct="0"/>
+            <a:r>
+              <a:rPr lang="en-US" sz="1200" i="1" dirty="0" smtClean="0">
+                <a:solidFill>
+                  <a:schemeClr val="tx2">
+                    <a:lumMod val="75000"/>
+                  </a:schemeClr>
+                </a:solidFill>
+              </a:rPr>
+              <a:t>claims</a:t>
+            </a:r>
+            <a:endParaRPr lang="en-US" sz="1200" i="1" dirty="0">
+              <a:solidFill>
+                <a:schemeClr val="tx2">
+                  <a:lumMod val="75000"/>
+                </a:schemeClr>
+              </a:solidFill>
+            </a:endParaRPr>
+          </a:p>
+        </p:txBody>
+      </p:sp>
+      <p:pic>
+        <p:nvPicPr>
+          <p:cNvPr id="21" name="Picture 20" descr="snippet_lesscarbon.png"/>
+          <p:cNvPicPr>
+            <a:picLocks noChangeAspect="1"/>
+          </p:cNvPicPr>
+          <p:nvPr/>
+        </p:nvPicPr>
+        <p:blipFill>
+          <a:blip r:embed="rId5"/>
+          <a:stretch>
+            <a:fillRect/>
+          </a:stretch>
+        </p:blipFill>
+        <p:spPr>
+          <a:xfrm>
+            <a:off x="6324600" y="3810000"/>
+            <a:ext cx="825302" cy="1561471"/>
+          </a:xfrm>
+          <a:prstGeom prst="rect">
+            <a:avLst/>
+          </a:prstGeom>
+        </p:spPr>
+      </p:pic>
+      <p:cxnSp>
+        <p:nvCxnSpPr>
+          <p:cNvPr id="22" name="Shape 15"/>
+          <p:cNvCxnSpPr>
+            <a:stCxn id="21" idx="1"/>
+            <a:endCxn id="5" idx="2"/>
+          </p:cNvCxnSpPr>
+          <p:nvPr/>
+        </p:nvCxnSpPr>
+        <p:spPr>
+          <a:xfrm rot="10800000">
+            <a:off x="4367784" y="3437932"/>
+            <a:ext cx="1956816" cy="1152804"/>
+          </a:xfrm>
+          <a:prstGeom prst="curvedConnector2">
+            <a:avLst/>
+          </a:prstGeom>
+          <a:ln>
+            <a:solidFill>
+              <a:schemeClr val="bg1">
+                <a:lumMod val="65000"/>
+              </a:schemeClr>
+            </a:solidFill>
+            <a:tailEnd type="arrow"/>
+          </a:ln>
+        </p:spPr>
+        <p:style>
+          <a:lnRef idx="1">
+            <a:schemeClr val="accent1"/>
+          </a:lnRef>
+          <a:fillRef idx="0">
+            <a:schemeClr val="accent1"/>
+          </a:fillRef>
+          <a:effectRef idx="0">
+            <a:schemeClr val="accent1"/>
+          </a:effectRef>
+          <a:fontRef idx="minor">
+            <a:schemeClr val="tx1"/>
+          </a:fontRef>
+        </p:style>
+      </p:cxnSp>
+      <p:sp>
+        <p:nvSpPr>
+          <p:cNvPr id="27" name="TextBox 40"/>
+          <p:cNvSpPr txBox="1">
+            <a:spLocks noChangeArrowheads="1"/>
+          </p:cNvSpPr>
+          <p:nvPr/>
+        </p:nvSpPr>
+        <p:spPr bwMode="auto">
+          <a:xfrm>
+            <a:off x="5181600" y="4495800"/>
+            <a:ext cx="579006" cy="276999"/>
+          </a:xfrm>
+          <a:prstGeom prst="rect">
+            <a:avLst/>
+          </a:prstGeom>
+          <a:noFill/>
+          <a:ln w="9525">
+            <a:noFill/>
+            <a:miter lim="800000"/>
+            <a:headEnd/>
+            <a:tailEnd/>
+          </a:ln>
+        </p:spPr>
+        <p:txBody>
+          <a:bodyPr wrap="none">
+            <a:spAutoFit/>
+          </a:bodyPr>
+          <a:lstStyle/>
+          <a:p>
+            <a:pPr algn="ctr" eaLnBrk="0" hangingPunct="0"/>
+            <a:r>
+              <a:rPr lang="en-US" sz="1200" i="1" dirty="0" smtClean="0">
+                <a:solidFill>
+                  <a:schemeClr val="tx2">
+                    <a:lumMod val="75000"/>
+                  </a:schemeClr>
+                </a:solidFill>
+              </a:rPr>
+              <a:t>claims</a:t>
+            </a:r>
+            <a:endParaRPr lang="en-US" sz="1200" i="1" dirty="0">
+              <a:solidFill>
+                <a:schemeClr val="tx2">
+                  <a:lumMod val="75000"/>
+                </a:schemeClr>
+              </a:solidFill>
+            </a:endParaRPr>
+          </a:p>
+        </p:txBody>
+      </p:sp>
+      <p:pic>
+        <p:nvPicPr>
+          <p:cNvPr id="28" name="Picture 27" descr="snippet_lesscarbon2.png"/>
+          <p:cNvPicPr>
+            <a:picLocks noChangeAspect="1"/>
+          </p:cNvPicPr>
+          <p:nvPr/>
+        </p:nvPicPr>
+        <p:blipFill>
+          <a:blip r:embed="rId6"/>
+          <a:stretch>
+            <a:fillRect/>
+          </a:stretch>
+        </p:blipFill>
+        <p:spPr>
+          <a:xfrm>
+            <a:off x="3048000" y="4953000"/>
+            <a:ext cx="1752600" cy="636470"/>
+          </a:xfrm>
+          <a:prstGeom prst="rect">
+            <a:avLst/>
+          </a:prstGeom>
+        </p:spPr>
+      </p:pic>
+      <p:cxnSp>
+        <p:nvCxnSpPr>
+          <p:cNvPr id="29" name="Shape 15"/>
+          <p:cNvCxnSpPr>
+            <a:stCxn id="28" idx="0"/>
+            <a:endCxn id="5" idx="2"/>
+          </p:cNvCxnSpPr>
+          <p:nvPr/>
+        </p:nvCxnSpPr>
+        <p:spPr>
+          <a:xfrm rot="5400000" flipH="1" flipV="1">
+            <a:off x="3388508" y="3973724"/>
+            <a:ext cx="1515068" cy="443484"/>
+          </a:xfrm>
+          <a:prstGeom prst="curvedConnector3">
+            <a:avLst>
+              <a:gd name="adj1" fmla="val 50000"/>
+            </a:avLst>
+          </a:prstGeom>
+          <a:ln>
+            <a:solidFill>
+              <a:schemeClr val="bg1">
+                <a:lumMod val="65000"/>
+              </a:schemeClr>
+            </a:solidFill>
+            <a:tailEnd type="arrow"/>
+          </a:ln>
+        </p:spPr>
+        <p:style>
+          <a:lnRef idx="1">
+            <a:schemeClr val="accent1"/>
+          </a:lnRef>
+          <a:fillRef idx="0">
+            <a:schemeClr val="accent1"/>
+          </a:fillRef>
+          <a:effectRef idx="0">
+            <a:schemeClr val="accent1"/>
+          </a:effectRef>
+          <a:fontRef idx="minor">
+            <a:schemeClr val="tx1"/>
+          </a:fontRef>
+        </p:style>
+      </p:cxnSp>
+      <p:sp>
+        <p:nvSpPr>
+          <p:cNvPr id="32" name="TextBox 40"/>
+          <p:cNvSpPr txBox="1">
+            <a:spLocks noChangeArrowheads="1"/>
+          </p:cNvSpPr>
+          <p:nvPr/>
+        </p:nvSpPr>
+        <p:spPr bwMode="auto">
+          <a:xfrm>
+            <a:off x="3429000" y="4419600"/>
+            <a:ext cx="579006" cy="276999"/>
+          </a:xfrm>
+          <a:prstGeom prst="rect">
+            <a:avLst/>
+          </a:prstGeom>
+          <a:noFill/>
+          <a:ln w="9525">
+            <a:noFill/>
+            <a:miter lim="800000"/>
+            <a:headEnd/>
+            <a:tailEnd/>
+          </a:ln>
+        </p:spPr>
+        <p:txBody>
+          <a:bodyPr wrap="none">
+            <a:spAutoFit/>
+          </a:bodyPr>
+          <a:lstStyle/>
+          <a:p>
+            <a:pPr algn="ctr" eaLnBrk="0" hangingPunct="0"/>
+            <a:r>
+              <a:rPr lang="en-US" sz="1200" i="1" dirty="0" smtClean="0">
+                <a:solidFill>
+                  <a:schemeClr val="tx2">
+                    <a:lumMod val="75000"/>
+                  </a:schemeClr>
+                </a:solidFill>
+              </a:rPr>
+              <a:t>claims</a:t>
+            </a:r>
+            <a:endParaRPr lang="en-US" sz="1200" i="1" dirty="0">
+              <a:solidFill>
+                <a:schemeClr val="tx2">
+                  <a:lumMod val="75000"/>
+                </a:schemeClr>
+              </a:solidFill>
+            </a:endParaRPr>
+          </a:p>
+        </p:txBody>
+      </p:sp>
+      <p:pic>
+        <p:nvPicPr>
+          <p:cNvPr id="39" name="Picture 38" descr="snippet_cargood.png"/>
+          <p:cNvPicPr>
+            <a:picLocks noChangeAspect="1"/>
+          </p:cNvPicPr>
+          <p:nvPr/>
+        </p:nvPicPr>
+        <p:blipFill>
+          <a:blip r:embed="rId7"/>
+          <a:stretch>
+            <a:fillRect/>
+          </a:stretch>
+        </p:blipFill>
+        <p:spPr>
+          <a:xfrm>
+            <a:off x="381000" y="1371600"/>
+            <a:ext cx="1752600" cy="534250"/>
+          </a:xfrm>
+          <a:prstGeom prst="rect">
+            <a:avLst/>
+          </a:prstGeom>
+        </p:spPr>
+      </p:pic>
+      <p:cxnSp>
+        <p:nvCxnSpPr>
+          <p:cNvPr id="40" name="Shape 15"/>
+          <p:cNvCxnSpPr>
+            <a:stCxn id="39" idx="3"/>
+            <a:endCxn id="6" idx="1"/>
+          </p:cNvCxnSpPr>
+          <p:nvPr/>
+        </p:nvCxnSpPr>
+        <p:spPr>
+          <a:xfrm>
+            <a:off x="2133600" y="1638725"/>
+            <a:ext cx="1295400" cy="405963"/>
+          </a:xfrm>
+          <a:prstGeom prst="curvedConnector3">
+            <a:avLst>
+              <a:gd name="adj1" fmla="val 50000"/>
+            </a:avLst>
+          </a:prstGeom>
+          <a:ln>
+            <a:solidFill>
+              <a:schemeClr val="bg1">
+                <a:lumMod val="65000"/>
+              </a:schemeClr>
+            </a:solidFill>
+            <a:tailEnd type="arrow"/>
+          </a:ln>
+        </p:spPr>
+        <p:style>
+          <a:lnRef idx="1">
+            <a:schemeClr val="accent1"/>
+          </a:lnRef>
+          <a:fillRef idx="0">
+            <a:schemeClr val="accent1"/>
+          </a:fillRef>
+          <a:effectRef idx="0">
+            <a:schemeClr val="accent1"/>
+          </a:effectRef>
+          <a:fontRef idx="minor">
+            <a:schemeClr val="tx1"/>
+          </a:fontRef>
+        </p:style>
+      </p:cxnSp>
+      <p:sp>
+        <p:nvSpPr>
+          <p:cNvPr id="46" name="TextBox 40"/>
+          <p:cNvSpPr txBox="1">
+            <a:spLocks noChangeArrowheads="1"/>
+          </p:cNvSpPr>
+          <p:nvPr/>
+        </p:nvSpPr>
+        <p:spPr bwMode="auto">
+          <a:xfrm>
+            <a:off x="2240394" y="1399401"/>
+            <a:ext cx="579006" cy="276999"/>
+          </a:xfrm>
+          <a:prstGeom prst="rect">
+            <a:avLst/>
+          </a:prstGeom>
+          <a:noFill/>
+          <a:ln w="9525">
+            <a:noFill/>
+            <a:miter lim="800000"/>
+            <a:headEnd/>
+            <a:tailEnd/>
+          </a:ln>
+        </p:spPr>
+        <p:txBody>
+          <a:bodyPr wrap="none">
+            <a:spAutoFit/>
+          </a:bodyPr>
+          <a:lstStyle/>
+          <a:p>
+            <a:pPr algn="ctr" eaLnBrk="0" hangingPunct="0"/>
+            <a:r>
+              <a:rPr lang="en-US" sz="1200" i="1" dirty="0" smtClean="0">
+                <a:solidFill>
+                  <a:schemeClr val="tx2">
+                    <a:lumMod val="75000"/>
+                  </a:schemeClr>
+                </a:solidFill>
+              </a:rPr>
+              <a:t>claims</a:t>
+            </a:r>
+            <a:endParaRPr lang="en-US" sz="1200" i="1" dirty="0">
+              <a:solidFill>
+                <a:schemeClr val="tx2">
+                  <a:lumMod val="75000"/>
+                </a:schemeClr>
+              </a:solidFill>
+            </a:endParaRPr>
+          </a:p>
+        </p:txBody>
+      </p:sp>
+      <p:sp>
+        <p:nvSpPr>
+          <p:cNvPr id="47" name="TextBox 40"/>
+          <p:cNvSpPr txBox="1">
+            <a:spLocks noChangeArrowheads="1"/>
+          </p:cNvSpPr>
+          <p:nvPr/>
+        </p:nvSpPr>
+        <p:spPr bwMode="auto">
+          <a:xfrm>
+            <a:off x="4661992" y="1295400"/>
+            <a:ext cx="1357808" cy="369332"/>
+          </a:xfrm>
+          <a:prstGeom prst="rect">
+            <a:avLst/>
+          </a:prstGeom>
+          <a:noFill/>
+          <a:ln w="9525">
+            <a:noFill/>
+            <a:miter lim="800000"/>
+            <a:headEnd/>
+            <a:tailEnd/>
+          </a:ln>
+        </p:spPr>
+        <p:txBody>
+          <a:bodyPr wrap="none">
+            <a:spAutoFit/>
+          </a:bodyPr>
+          <a:lstStyle/>
+          <a:p>
+            <a:pPr algn="ctr" eaLnBrk="0" hangingPunct="0"/>
+            <a:r>
+              <a:rPr lang="en-US" b="1" dirty="0" smtClean="0">
+                <a:solidFill>
+                  <a:schemeClr val="tx2">
+                    <a:lumMod val="75000"/>
+                  </a:schemeClr>
+                </a:solidFill>
+              </a:rPr>
+              <a:t>Claim Graph</a:t>
+            </a:r>
+            <a:endParaRPr lang="en-US" b="1" dirty="0">
+              <a:solidFill>
+                <a:schemeClr val="tx2">
+                  <a:lumMod val="75000"/>
+                </a:schemeClr>
+              </a:solidFill>
+            </a:endParaRPr>
+          </a:p>
+        </p:txBody>
+      </p:sp>
+    </p:spTree>
+  </p:cSld>
+  <p:clrMapOvr>
+    <a:masterClrMapping/>
+  </p:clrMapOvr>
+</p:sld>
+</file>
+
+<file path=ppt/slides/slide14.xml><?xml version="1.0" encoding="utf-8"?>
+<p:sld xmlns:a="http://schemas.openxmlformats.org/drawingml/2006/main" xmlns:r="http://schemas.openxmlformats.org/officeDocument/2006/relationships" xmlns:p="http://schemas.openxmlformats.org/presentationml/2006/main">
+  <p:cSld>
+    <p:spTree>
+      <p:nvGrpSpPr>
+        <p:cNvPr id="1" name=""/>
+        <p:cNvGrpSpPr/>
+        <p:nvPr/>
+      </p:nvGrpSpPr>
+      <p:grpSpPr>
+        <a:xfrm>
+          <a:off x="0" y="0"/>
+          <a:ext cx="0" cy="0"/>
+          <a:chOff x="0" y="0"/>
+          <a:chExt cx="0" cy="0"/>
+        </a:xfrm>
+      </p:grpSpPr>
+      <p:pic>
+        <p:nvPicPr>
+          <p:cNvPr id="4" name="Picture 3" descr="sidebar_crop.png"/>
+          <p:cNvPicPr>
+            <a:picLocks noChangeAspect="1"/>
+          </p:cNvPicPr>
+          <p:nvPr/>
+        </p:nvPicPr>
+        <p:blipFill>
+          <a:blip r:embed="rId2"/>
+          <a:stretch>
+            <a:fillRect/>
+          </a:stretch>
+        </p:blipFill>
+        <p:spPr>
+          <a:xfrm>
+            <a:off x="1905000" y="1728247"/>
+            <a:ext cx="6978111" cy="4449958"/>
+          </a:xfrm>
+          <a:prstGeom prst="rect">
+            <a:avLst/>
+          </a:prstGeom>
+        </p:spPr>
+      </p:pic>
+      <p:sp>
+        <p:nvSpPr>
+          <p:cNvPr id="6" name="Rectangle 5"/>
+          <p:cNvSpPr/>
+          <p:nvPr/>
+        </p:nvSpPr>
+        <p:spPr>
+          <a:xfrm>
+            <a:off x="3810000" y="1676400"/>
+            <a:ext cx="685800" cy="381000"/>
+          </a:xfrm>
+          <a:prstGeom prst="rect">
+            <a:avLst/>
+          </a:prstGeom>
+          <a:noFill/>
+        </p:spPr>
+        <p:style>
+          <a:lnRef idx="2">
+            <a:schemeClr val="accent1">
+              <a:shade val="50000"/>
+            </a:schemeClr>
+          </a:lnRef>
+          <a:fillRef idx="1">
+            <a:schemeClr val="accent1"/>
+          </a:fillRef>
+          <a:effectRef idx="0">
+            <a:schemeClr val="accent1"/>
+          </a:effectRef>
+          <a:fontRef idx="minor">
+            <a:schemeClr val="lt1"/>
+          </a:fontRef>
+        </p:style>
+        <p:txBody>
+          <a:bodyPr rtlCol="0" anchor="ctr"/>
+          <a:lstStyle/>
+          <a:p>
+            <a:pPr algn="ctr"/>
+            <a:endParaRPr lang="en-US"/>
+          </a:p>
+        </p:txBody>
+      </p:sp>
+      <p:pic>
+        <p:nvPicPr>
+          <p:cNvPr id="7" name="Picture 6" descr="sidebar_crop.png"/>
+          <p:cNvPicPr>
+            <a:picLocks noChangeAspect="1"/>
+          </p:cNvPicPr>
+          <p:nvPr/>
+        </p:nvPicPr>
+        <p:blipFill>
+          <a:blip r:embed="rId3"/>
+          <a:srcRect l="27336" r="62872" b="92547"/>
+          <a:stretch>
+            <a:fillRect/>
+          </a:stretch>
+        </p:blipFill>
+        <p:spPr>
+          <a:xfrm>
+            <a:off x="1903819" y="798395"/>
+            <a:ext cx="1412948" cy="685800"/>
+          </a:xfrm>
+          <a:prstGeom prst="rect">
+            <a:avLst/>
+          </a:prstGeom>
+        </p:spPr>
+      </p:pic>
+      <p:sp>
+        <p:nvSpPr>
+          <p:cNvPr id="8" name="Rectangle 7"/>
+          <p:cNvSpPr/>
+          <p:nvPr/>
+        </p:nvSpPr>
+        <p:spPr>
+          <a:xfrm>
+            <a:off x="1905000" y="762000"/>
+            <a:ext cx="1371600" cy="722193"/>
+          </a:xfrm>
+          <a:prstGeom prst="rect">
+            <a:avLst/>
+          </a:prstGeom>
+          <a:noFill/>
+        </p:spPr>
+        <p:style>
+          <a:lnRef idx="2">
+            <a:schemeClr val="accent1">
+              <a:shade val="50000"/>
+            </a:schemeClr>
+          </a:lnRef>
+          <a:fillRef idx="1">
+            <a:schemeClr val="accent1"/>
+          </a:fillRef>
+          <a:effectRef idx="0">
+            <a:schemeClr val="accent1"/>
+          </a:effectRef>
+          <a:fontRef idx="minor">
+            <a:schemeClr val="lt1"/>
+          </a:fontRef>
+        </p:style>
+        <p:txBody>
+          <a:bodyPr rtlCol="0" anchor="ctr"/>
+          <a:lstStyle/>
+          <a:p>
+            <a:pPr algn="ctr"/>
+            <a:endParaRPr lang="en-US"/>
+          </a:p>
+        </p:txBody>
+      </p:sp>
+      <p:cxnSp>
+        <p:nvCxnSpPr>
+          <p:cNvPr id="10" name="Shape 9"/>
+          <p:cNvCxnSpPr>
+            <a:stCxn id="6" idx="0"/>
+            <a:endCxn id="8" idx="3"/>
+          </p:cNvCxnSpPr>
+          <p:nvPr/>
+        </p:nvCxnSpPr>
+        <p:spPr>
+          <a:xfrm rot="16200000" flipV="1">
+            <a:off x="3438099" y="961599"/>
+            <a:ext cx="553303" cy="876300"/>
+          </a:xfrm>
+          <a:prstGeom prst="curvedConnector2">
+            <a:avLst/>
+          </a:prstGeom>
+          <a:ln w="57150">
+            <a:tailEnd type="arrow"/>
+          </a:ln>
+        </p:spPr>
+        <p:style>
+          <a:lnRef idx="1">
+            <a:schemeClr val="accent1"/>
+          </a:lnRef>
+          <a:fillRef idx="0">
+            <a:schemeClr val="accent1"/>
+          </a:fillRef>
+          <a:effectRef idx="0">
+            <a:schemeClr val="accent1"/>
+          </a:effectRef>
+          <a:fontRef idx="minor">
+            <a:schemeClr val="tx1"/>
+          </a:fontRef>
+        </p:style>
+      </p:cxnSp>
     </p:spTree>
   </p:cSld>
   <p:clrMapOvr>
@@ -5028,15 +7475,7 @@
                   <a:srgbClr val="000000"/>
                 </a:solidFill>
               </a:rPr>
-              <a:t>Create new </a:t>
-            </a:r>
-            <a:r>
-              <a:rPr lang="en-US" sz="2000" dirty="0" smtClean="0">
-                <a:solidFill>
-                  <a:srgbClr val="000000"/>
-                </a:solidFill>
-              </a:rPr>
-              <a:t>supporting claim</a:t>
+              <a:t>Create new supporting claim</a:t>
             </a:r>
           </a:p>
         </p:txBody>
@@ -5752,8 +8191,8 @@
         </p:nvSpPr>
         <p:spPr>
           <a:xfrm>
-            <a:off x="1143000" y="2590800"/>
-            <a:ext cx="1432329" cy="584775"/>
+            <a:off x="1143000" y="2667000"/>
+            <a:ext cx="1432329" cy="338554"/>
           </a:xfrm>
           <a:prstGeom prst="rect">
             <a:avLst/>
@@ -5773,7 +8212,15 @@
                   <a:srgbClr val="000000"/>
                 </a:solidFill>
               </a:rPr>
-              <a:t>Enhanced Claim Browser</a:t>
+              <a:t>Claim </a:t>
+            </a:r>
+            <a:r>
+              <a:rPr lang="en-US" sz="1600" dirty="0" smtClean="0">
+                <a:solidFill>
+                  <a:srgbClr val="000000"/>
+                </a:solidFill>
+              </a:rPr>
+              <a:t>Browser</a:t>
             </a:r>
           </a:p>
         </p:txBody>
@@ -5941,7 +8388,7 @@
         </p:nvCxnSpPr>
         <p:spPr bwMode="auto">
           <a:xfrm rot="5400000">
-            <a:off x="1600597" y="2819003"/>
+            <a:off x="2286397" y="2819003"/>
             <a:ext cx="2438400" cy="794"/>
           </a:xfrm>
           <a:prstGeom prst="line">
@@ -5971,7 +8418,191 @@
         <p:spPr bwMode="auto">
           <a:xfrm>
             <a:off x="2590800" y="2895600"/>
-            <a:ext cx="228600" cy="1588"/>
+            <a:ext cx="914400" cy="1588"/>
+          </a:xfrm>
+          <a:prstGeom prst="line">
+            <a:avLst/>
+          </a:prstGeom>
+          <a:solidFill>
+            <a:schemeClr val="accent1"/>
+          </a:solidFill>
+          <a:ln w="50800" cap="flat" cmpd="sng" algn="ctr">
+            <a:solidFill>
+              <a:schemeClr val="tx1"/>
+            </a:solidFill>
+            <a:prstDash val="solid"/>
+            <a:round/>
+            <a:headEnd type="none" w="med" len="med"/>
+            <a:tailEnd type="none" w="med" len="med"/>
+          </a:ln>
+          <a:effectLst/>
+        </p:spPr>
+      </p:cxnSp>
+      <p:cxnSp>
+        <p:nvCxnSpPr>
+          <p:cNvPr id="11" name="Straight Connector 10"/>
+          <p:cNvCxnSpPr/>
+          <p:nvPr/>
+        </p:nvCxnSpPr>
+        <p:spPr bwMode="auto">
+          <a:xfrm rot="10800000">
+            <a:off x="2590800" y="2063003"/>
+            <a:ext cx="304800" cy="1588"/>
+          </a:xfrm>
+          <a:prstGeom prst="line">
+            <a:avLst/>
+          </a:prstGeom>
+          <a:solidFill>
+            <a:schemeClr val="accent1"/>
+          </a:solidFill>
+          <a:ln w="50800" cap="flat" cmpd="sng" algn="ctr">
+            <a:solidFill>
+              <a:schemeClr val="tx1"/>
+            </a:solidFill>
+            <a:prstDash val="solid"/>
+            <a:round/>
+            <a:headEnd type="none" w="med" len="med"/>
+            <a:tailEnd type="none" w="med" len="med"/>
+          </a:ln>
+          <a:effectLst/>
+        </p:spPr>
+      </p:cxnSp>
+      <p:sp>
+        <p:nvSpPr>
+          <p:cNvPr id="12" name="TextBox 11"/>
+          <p:cNvSpPr txBox="1"/>
+          <p:nvPr/>
+        </p:nvSpPr>
+        <p:spPr>
+          <a:xfrm>
+            <a:off x="1143000" y="1905000"/>
+            <a:ext cx="1432329" cy="338554"/>
+          </a:xfrm>
+          <a:prstGeom prst="rect">
+            <a:avLst/>
+          </a:prstGeom>
+          <a:noFill/>
+        </p:spPr>
+        <p:txBody>
+          <a:bodyPr wrap="square" rtlCol="0">
+            <a:spAutoFit/>
+          </a:bodyPr>
+          <a:lstStyle/>
+          <a:p>
+            <a:pPr algn="r"/>
+            <a:r>
+              <a:rPr lang="en-US" sz="1600" dirty="0" smtClean="0">
+                <a:solidFill>
+                  <a:srgbClr val="000000"/>
+                </a:solidFill>
+              </a:rPr>
+              <a:t>Quick Lists</a:t>
+            </a:r>
+          </a:p>
+        </p:txBody>
+      </p:sp>
+      <p:cxnSp>
+        <p:nvCxnSpPr>
+          <p:cNvPr id="14" name="Straight Connector 13"/>
+          <p:cNvCxnSpPr/>
+          <p:nvPr/>
+        </p:nvCxnSpPr>
+        <p:spPr bwMode="auto">
+          <a:xfrm rot="5400000">
+            <a:off x="2515394" y="2057400"/>
+            <a:ext cx="762000" cy="1588"/>
+          </a:xfrm>
+          <a:prstGeom prst="line">
+            <a:avLst/>
+          </a:prstGeom>
+          <a:solidFill>
+            <a:schemeClr val="accent1"/>
+          </a:solidFill>
+          <a:ln w="50800" cap="flat" cmpd="sng" algn="ctr">
+            <a:solidFill>
+              <a:schemeClr val="tx1"/>
+            </a:solidFill>
+            <a:prstDash val="solid"/>
+            <a:round/>
+            <a:headEnd type="none" w="med" len="med"/>
+            <a:tailEnd type="none" w="med" len="med"/>
+          </a:ln>
+          <a:effectLst/>
+        </p:spPr>
+      </p:cxnSp>
+      <p:sp>
+        <p:nvSpPr>
+          <p:cNvPr id="16" name="TextBox 15"/>
+          <p:cNvSpPr txBox="1"/>
+          <p:nvPr/>
+        </p:nvSpPr>
+        <p:spPr>
+          <a:xfrm>
+            <a:off x="6248400" y="634425"/>
+            <a:ext cx="1889529" cy="584775"/>
+          </a:xfrm>
+          <a:prstGeom prst="rect">
+            <a:avLst/>
+          </a:prstGeom>
+          <a:noFill/>
+        </p:spPr>
+        <p:txBody>
+          <a:bodyPr wrap="square" rtlCol="0">
+            <a:spAutoFit/>
+          </a:bodyPr>
+          <a:lstStyle/>
+          <a:p>
+            <a:pPr algn="ctr"/>
+            <a:r>
+              <a:rPr lang="en-US" sz="1600" dirty="0" smtClean="0">
+                <a:solidFill>
+                  <a:srgbClr val="000000"/>
+                </a:solidFill>
+              </a:rPr>
+              <a:t>Rename  or delete the selected claim</a:t>
+            </a:r>
+          </a:p>
+        </p:txBody>
+      </p:sp>
+      <p:cxnSp>
+        <p:nvCxnSpPr>
+          <p:cNvPr id="17" name="Straight Connector 16"/>
+          <p:cNvCxnSpPr/>
+          <p:nvPr/>
+        </p:nvCxnSpPr>
+        <p:spPr bwMode="auto">
+          <a:xfrm rot="5400000">
+            <a:off x="7010400" y="1371600"/>
+            <a:ext cx="304800" cy="1588"/>
+          </a:xfrm>
+          <a:prstGeom prst="line">
+            <a:avLst/>
+          </a:prstGeom>
+          <a:solidFill>
+            <a:schemeClr val="accent1"/>
+          </a:solidFill>
+          <a:ln w="50800" cap="flat" cmpd="sng" algn="ctr">
+            <a:solidFill>
+              <a:schemeClr val="tx1"/>
+            </a:solidFill>
+            <a:prstDash val="solid"/>
+            <a:round/>
+            <a:headEnd type="none" w="med" len="med"/>
+            <a:tailEnd type="none" w="med" len="med"/>
+          </a:ln>
+          <a:effectLst/>
+        </p:spPr>
+      </p:cxnSp>
+      <p:cxnSp>
+        <p:nvCxnSpPr>
+          <p:cNvPr id="18" name="Straight Connector 17"/>
+          <p:cNvCxnSpPr/>
+          <p:nvPr/>
+        </p:nvCxnSpPr>
+        <p:spPr bwMode="auto">
+          <a:xfrm>
+            <a:off x="6553200" y="1524000"/>
+            <a:ext cx="1295400" cy="1588"/>
           </a:xfrm>
           <a:prstGeom prst="line">
             <a:avLst/>
@@ -6016,6 +8647,30 @@
           <a:chExt cx="0" cy="0"/>
         </a:xfrm>
       </p:grpSpPr>
+      <p:pic>
+        <p:nvPicPr>
+          <p:cNvPr id="20" name="Picture 19" descr="newsnippet_browser.png"/>
+          <p:cNvPicPr>
+            <a:picLocks noChangeAspect="1"/>
+          </p:cNvPicPr>
+          <p:nvPr/>
+        </p:nvPicPr>
+        <p:blipFill>
+          <a:blip r:embed="rId2"/>
+          <a:stretch>
+            <a:fillRect/>
+          </a:stretch>
+        </p:blipFill>
+        <p:spPr>
+          <a:xfrm>
+            <a:off x="2971800" y="1295400"/>
+            <a:ext cx="5037263" cy="4266858"/>
+          </a:xfrm>
+          <a:prstGeom prst="rect">
+            <a:avLst/>
+          </a:prstGeom>
+        </p:spPr>
+      </p:pic>
       <p:sp>
         <p:nvSpPr>
           <p:cNvPr id="6" name="TextBox 5"/>
@@ -6024,8 +8679,8 @@
         </p:nvSpPr>
         <p:spPr>
           <a:xfrm>
-            <a:off x="472671" y="2362200"/>
-            <a:ext cx="1432329" cy="954107"/>
+            <a:off x="1143000" y="2590800"/>
+            <a:ext cx="1432329" cy="584775"/>
           </a:xfrm>
           <a:prstGeom prst="rect">
             <a:avLst/>
@@ -6040,12 +8695,12 @@
           <a:p>
             <a:pPr algn="r"/>
             <a:r>
-              <a:rPr lang="en-US" sz="1400" dirty="0" smtClean="0">
+              <a:rPr lang="en-US" sz="1600" dirty="0" smtClean="0">
                 <a:solidFill>
                   <a:srgbClr val="000000"/>
                 </a:solidFill>
               </a:rPr>
-              <a:t>Claims supporting or opposing the selected claim</a:t>
+              <a:t>Enhanced Claim Browser</a:t>
             </a:r>
           </a:p>
         </p:txBody>
@@ -6058,8 +8713,8 @@
         </p:nvSpPr>
         <p:spPr>
           <a:xfrm>
-            <a:off x="472671" y="4191000"/>
-            <a:ext cx="1432329" cy="738664"/>
+            <a:off x="1143000" y="4267200"/>
+            <a:ext cx="1432329" cy="584775"/>
           </a:xfrm>
           <a:prstGeom prst="rect">
             <a:avLst/>
@@ -6074,12 +8729,12 @@
           <a:p>
             <a:pPr algn="r"/>
             <a:r>
-              <a:rPr lang="en-US" sz="1400" dirty="0" smtClean="0">
+              <a:rPr lang="en-US" sz="1600" dirty="0" smtClean="0">
                 <a:solidFill>
                   <a:srgbClr val="000000"/>
                 </a:solidFill>
               </a:rPr>
-              <a:t>Search for claims to connect to the selected claim</a:t>
+              <a:t>Text of new snippet</a:t>
             </a:r>
           </a:p>
         </p:txBody>
@@ -6092,8 +8747,8 @@
         </p:nvSpPr>
         <p:spPr>
           <a:xfrm>
-            <a:off x="472671" y="990600"/>
-            <a:ext cx="1432329" cy="307777"/>
+            <a:off x="4343400" y="5791200"/>
+            <a:ext cx="1432329" cy="338554"/>
           </a:xfrm>
           <a:prstGeom prst="rect">
             <a:avLst/>
@@ -6108,7 +8763,7 @@
           <a:p>
             <a:pPr algn="r"/>
             <a:r>
-              <a:rPr lang="en-US" sz="1400" dirty="0" smtClean="0">
+              <a:rPr lang="en-US" sz="1600" dirty="0" smtClean="0">
                 <a:solidFill>
                   <a:srgbClr val="000000"/>
                 </a:solidFill>
@@ -6126,7 +8781,7 @@
         </p:nvCxnSpPr>
         <p:spPr bwMode="auto">
           <a:xfrm rot="5400000">
-            <a:off x="1829197" y="4571603"/>
+            <a:off x="2514997" y="4571603"/>
             <a:ext cx="609600" cy="794"/>
           </a:xfrm>
           <a:prstGeom prst="line">
@@ -6155,7 +8810,7 @@
         </p:nvCxnSpPr>
         <p:spPr bwMode="auto">
           <a:xfrm>
-            <a:off x="1889529" y="4570412"/>
+            <a:off x="2575329" y="4570412"/>
             <a:ext cx="228600" cy="1588"/>
           </a:xfrm>
           <a:prstGeom prst="line">
@@ -6183,9 +8838,9 @@
           <p:nvPr/>
         </p:nvCxnSpPr>
         <p:spPr bwMode="auto">
-          <a:xfrm>
-            <a:off x="1905000" y="1143000"/>
-            <a:ext cx="229394" cy="1588"/>
+          <a:xfrm rot="5400000" flipH="1" flipV="1">
+            <a:off x="4723606" y="5486400"/>
+            <a:ext cx="610394" cy="794"/>
           </a:xfrm>
           <a:prstGeom prst="line">
             <a:avLst/>
@@ -6213,8 +8868,8 @@
         </p:nvCxnSpPr>
         <p:spPr bwMode="auto">
           <a:xfrm rot="5400000">
-            <a:off x="952897" y="2933303"/>
-            <a:ext cx="2362200" cy="794"/>
+            <a:off x="1600597" y="2819003"/>
+            <a:ext cx="2438400" cy="794"/>
           </a:xfrm>
           <a:prstGeom prst="line">
             <a:avLst/>
@@ -6242,276 +8897,7 @@
         </p:nvCxnSpPr>
         <p:spPr bwMode="auto">
           <a:xfrm>
-            <a:off x="1905000" y="2971800"/>
-            <a:ext cx="228600" cy="1588"/>
-          </a:xfrm>
-          <a:prstGeom prst="line">
-            <a:avLst/>
-          </a:prstGeom>
-          <a:solidFill>
-            <a:schemeClr val="accent1"/>
-          </a:solidFill>
-          <a:ln w="50800" cap="flat" cmpd="sng" algn="ctr">
-            <a:solidFill>
-              <a:schemeClr val="tx1"/>
-            </a:solidFill>
-            <a:prstDash val="solid"/>
-            <a:round/>
-            <a:headEnd type="none" w="med" len="med"/>
-            <a:tailEnd type="none" w="med" len="med"/>
-          </a:ln>
-          <a:effectLst/>
-        </p:spPr>
-      </p:cxnSp>
-      <p:pic>
-        <p:nvPicPr>
-          <p:cNvPr id="11" name="Picture 10" descr="oldpoint_crop.png"/>
-          <p:cNvPicPr>
-            <a:picLocks noChangeAspect="1"/>
-          </p:cNvPicPr>
-          <p:nvPr/>
-        </p:nvPicPr>
-        <p:blipFill>
-          <a:blip r:embed="rId2"/>
-          <a:stretch>
-            <a:fillRect/>
-          </a:stretch>
-        </p:blipFill>
-        <p:spPr>
-          <a:xfrm>
-            <a:off x="2286000" y="1066800"/>
-            <a:ext cx="4974336" cy="3810000"/>
-          </a:xfrm>
-          <a:prstGeom prst="rect">
-            <a:avLst/>
-          </a:prstGeom>
-        </p:spPr>
-      </p:pic>
-      <p:sp>
-        <p:nvSpPr>
-          <p:cNvPr id="16" name="TextBox 15"/>
-          <p:cNvSpPr txBox="1"/>
-          <p:nvPr/>
-        </p:nvSpPr>
-        <p:spPr>
-          <a:xfrm>
-            <a:off x="167871" y="1371600"/>
-            <a:ext cx="1737129" cy="523220"/>
-          </a:xfrm>
-          <a:prstGeom prst="rect">
-            <a:avLst/>
-          </a:prstGeom>
-          <a:noFill/>
-        </p:spPr>
-        <p:txBody>
-          <a:bodyPr wrap="square" rtlCol="0">
-            <a:spAutoFit/>
-          </a:bodyPr>
-          <a:lstStyle/>
-          <a:p>
-            <a:pPr algn="r"/>
-            <a:r>
-              <a:rPr lang="en-US" sz="1400" dirty="0" smtClean="0">
-                <a:solidFill>
-                  <a:srgbClr val="000000"/>
-                </a:solidFill>
-              </a:rPr>
-              <a:t>Claims that this claim supports or opposes</a:t>
-            </a:r>
-          </a:p>
-        </p:txBody>
-      </p:sp>
-      <p:cxnSp>
-        <p:nvCxnSpPr>
-          <p:cNvPr id="17" name="Straight Connector 16"/>
-          <p:cNvCxnSpPr/>
-          <p:nvPr/>
-        </p:nvCxnSpPr>
-        <p:spPr bwMode="auto">
-          <a:xfrm>
-            <a:off x="1905000" y="1524000"/>
-            <a:ext cx="229394" cy="1588"/>
-          </a:xfrm>
-          <a:prstGeom prst="line">
-            <a:avLst/>
-          </a:prstGeom>
-          <a:solidFill>
-            <a:schemeClr val="accent1"/>
-          </a:solidFill>
-          <a:ln w="50800" cap="flat" cmpd="sng" algn="ctr">
-            <a:solidFill>
-              <a:schemeClr val="tx1"/>
-            </a:solidFill>
-            <a:prstDash val="solid"/>
-            <a:round/>
-            <a:headEnd type="none" w="med" len="med"/>
-            <a:tailEnd type="none" w="med" len="med"/>
-          </a:ln>
-          <a:effectLst/>
-        </p:spPr>
-      </p:cxnSp>
-      <p:sp>
-        <p:nvSpPr>
-          <p:cNvPr id="21" name="TextBox 20"/>
-          <p:cNvSpPr txBox="1"/>
-          <p:nvPr/>
-        </p:nvSpPr>
-        <p:spPr>
-          <a:xfrm>
-            <a:off x="7620000" y="2362200"/>
-            <a:ext cx="1432329" cy="523220"/>
-          </a:xfrm>
-          <a:prstGeom prst="rect">
-            <a:avLst/>
-          </a:prstGeom>
-          <a:noFill/>
-        </p:spPr>
-        <p:txBody>
-          <a:bodyPr wrap="square" rtlCol="0">
-            <a:spAutoFit/>
-          </a:bodyPr>
-          <a:lstStyle/>
-          <a:p>
-            <a:r>
-              <a:rPr lang="en-US" sz="1400" dirty="0" smtClean="0">
-                <a:solidFill>
-                  <a:srgbClr val="000000"/>
-                </a:solidFill>
-              </a:rPr>
-              <a:t>Snippets that make this claim</a:t>
-            </a:r>
-          </a:p>
-        </p:txBody>
-      </p:sp>
-      <p:cxnSp>
-        <p:nvCxnSpPr>
-          <p:cNvPr id="22" name="Straight Connector 21"/>
-          <p:cNvCxnSpPr/>
-          <p:nvPr/>
-        </p:nvCxnSpPr>
-        <p:spPr bwMode="auto">
-          <a:xfrm rot="5400000">
-            <a:off x="6629797" y="2819003"/>
-            <a:ext cx="1524000" cy="794"/>
-          </a:xfrm>
-          <a:prstGeom prst="line">
-            <a:avLst/>
-          </a:prstGeom>
-          <a:solidFill>
-            <a:schemeClr val="accent1"/>
-          </a:solidFill>
-          <a:ln w="50800" cap="flat" cmpd="sng" algn="ctr">
-            <a:solidFill>
-              <a:schemeClr val="tx1"/>
-            </a:solidFill>
-            <a:prstDash val="solid"/>
-            <a:round/>
-            <a:headEnd type="none" w="med" len="med"/>
-            <a:tailEnd type="none" w="med" len="med"/>
-          </a:ln>
-          <a:effectLst/>
-        </p:spPr>
-      </p:cxnSp>
-      <p:cxnSp>
-        <p:nvCxnSpPr>
-          <p:cNvPr id="23" name="Straight Connector 22"/>
-          <p:cNvCxnSpPr/>
-          <p:nvPr/>
-        </p:nvCxnSpPr>
-        <p:spPr bwMode="auto">
-          <a:xfrm>
-            <a:off x="7391400" y="2590800"/>
-            <a:ext cx="228600" cy="1588"/>
-          </a:xfrm>
-          <a:prstGeom prst="line">
-            <a:avLst/>
-          </a:prstGeom>
-          <a:solidFill>
-            <a:schemeClr val="accent1"/>
-          </a:solidFill>
-          <a:ln w="50800" cap="flat" cmpd="sng" algn="ctr">
-            <a:solidFill>
-              <a:schemeClr val="tx1"/>
-            </a:solidFill>
-            <a:prstDash val="solid"/>
-            <a:round/>
-            <a:headEnd type="none" w="med" len="med"/>
-            <a:tailEnd type="none" w="med" len="med"/>
-          </a:ln>
-          <a:effectLst/>
-        </p:spPr>
-      </p:cxnSp>
-      <p:cxnSp>
-        <p:nvCxnSpPr>
-          <p:cNvPr id="26" name="Straight Connector 25"/>
-          <p:cNvCxnSpPr/>
-          <p:nvPr/>
-        </p:nvCxnSpPr>
-        <p:spPr bwMode="auto">
-          <a:xfrm rot="5400000">
-            <a:off x="7163197" y="1599803"/>
-            <a:ext cx="457200" cy="794"/>
-          </a:xfrm>
-          <a:prstGeom prst="line">
-            <a:avLst/>
-          </a:prstGeom>
-          <a:solidFill>
-            <a:schemeClr val="accent1"/>
-          </a:solidFill>
-          <a:ln w="50800" cap="flat" cmpd="sng" algn="ctr">
-            <a:solidFill>
-              <a:schemeClr val="tx1"/>
-            </a:solidFill>
-            <a:prstDash val="solid"/>
-            <a:round/>
-            <a:headEnd type="none" w="med" len="med"/>
-            <a:tailEnd type="none" w="med" len="med"/>
-          </a:ln>
-          <a:effectLst/>
-        </p:spPr>
-      </p:cxnSp>
-      <p:sp>
-        <p:nvSpPr>
-          <p:cNvPr id="30" name="TextBox 29"/>
-          <p:cNvSpPr txBox="1"/>
-          <p:nvPr/>
-        </p:nvSpPr>
-        <p:spPr>
-          <a:xfrm>
-            <a:off x="7635471" y="1371600"/>
-            <a:ext cx="1432329" cy="523220"/>
-          </a:xfrm>
-          <a:prstGeom prst="rect">
-            <a:avLst/>
-          </a:prstGeom>
-          <a:noFill/>
-        </p:spPr>
-        <p:txBody>
-          <a:bodyPr wrap="square" rtlCol="0">
-            <a:spAutoFit/>
-          </a:bodyPr>
-          <a:lstStyle/>
-          <a:p>
-            <a:r>
-              <a:rPr lang="en-US" sz="1400" dirty="0" smtClean="0">
-                <a:solidFill>
-                  <a:srgbClr val="000000"/>
-                </a:solidFill>
-              </a:rPr>
-              <a:t>Topics that this claim is about</a:t>
-            </a:r>
-          </a:p>
-        </p:txBody>
-      </p:sp>
-      <p:cxnSp>
-        <p:nvCxnSpPr>
-          <p:cNvPr id="31" name="Straight Connector 30"/>
-          <p:cNvCxnSpPr/>
-          <p:nvPr/>
-        </p:nvCxnSpPr>
-        <p:spPr bwMode="auto">
-          <a:xfrm>
-            <a:off x="7406871" y="1600200"/>
+            <a:off x="2590800" y="2895600"/>
             <a:ext cx="228600" cy="1588"/>
           </a:xfrm>
           <a:prstGeom prst="line">
@@ -6899,7 +9285,7 @@
         </p:nvSpPr>
         <p:spPr>
           <a:xfrm>
-            <a:off x="5257800" y="3962400"/>
+            <a:off x="7620000" y="2362200"/>
             <a:ext cx="1432329" cy="523220"/>
           </a:xfrm>
           <a:prstGeom prst="rect">
@@ -6913,7 +9299,6 @@
           </a:bodyPr>
           <a:lstStyle/>
           <a:p>
-            <a:pPr algn="ctr"/>
             <a:r>
               <a:rPr lang="en-US" sz="1400" dirty="0" smtClean="0">
                 <a:solidFill>
@@ -6932,9 +9317,9 @@
           <p:nvPr/>
         </p:nvCxnSpPr>
         <p:spPr bwMode="auto">
-          <a:xfrm>
-            <a:off x="4801394" y="3733800"/>
-            <a:ext cx="2437606" cy="1588"/>
+          <a:xfrm rot="5400000">
+            <a:off x="6629797" y="2819003"/>
+            <a:ext cx="1524000" cy="794"/>
           </a:xfrm>
           <a:prstGeom prst="line">
             <a:avLst/>
@@ -6961,9 +9346,9 @@
           <p:nvPr/>
         </p:nvCxnSpPr>
         <p:spPr bwMode="auto">
-          <a:xfrm rot="16200000" flipH="1">
-            <a:off x="5829301" y="3848100"/>
-            <a:ext cx="228601" cy="3"/>
+          <a:xfrm>
+            <a:off x="7391400" y="2590800"/>
+            <a:ext cx="228600" cy="1588"/>
           </a:xfrm>
           <a:prstGeom prst="line">
             <a:avLst/>
@@ -6991,8 +9376,8 @@
         </p:nvCxnSpPr>
         <p:spPr bwMode="auto">
           <a:xfrm rot="5400000">
-            <a:off x="5818178" y="1169184"/>
-            <a:ext cx="404038" cy="794"/>
+            <a:off x="7163197" y="1599803"/>
+            <a:ext cx="457200" cy="794"/>
           </a:xfrm>
           <a:prstGeom prst="line">
             <a:avLst/>
@@ -7020,7 +9405,7 @@
         </p:nvSpPr>
         <p:spPr>
           <a:xfrm>
-            <a:off x="5486400" y="457200"/>
+            <a:off x="7635471" y="1371600"/>
             <a:ext cx="1432329" cy="523220"/>
           </a:xfrm>
           <a:prstGeom prst="rect">
@@ -7045,6 +9430,35 @@
           </a:p>
         </p:txBody>
       </p:sp>
+      <p:cxnSp>
+        <p:nvCxnSpPr>
+          <p:cNvPr id="31" name="Straight Connector 30"/>
+          <p:cNvCxnSpPr/>
+          <p:nvPr/>
+        </p:nvCxnSpPr>
+        <p:spPr bwMode="auto">
+          <a:xfrm>
+            <a:off x="7406871" y="1600200"/>
+            <a:ext cx="228600" cy="1588"/>
+          </a:xfrm>
+          <a:prstGeom prst="line">
+            <a:avLst/>
+          </a:prstGeom>
+          <a:solidFill>
+            <a:schemeClr val="accent1"/>
+          </a:solidFill>
+          <a:ln w="50800" cap="flat" cmpd="sng" algn="ctr">
+            <a:solidFill>
+              <a:schemeClr val="tx1"/>
+            </a:solidFill>
+            <a:prstDash val="solid"/>
+            <a:round/>
+            <a:headEnd type="none" w="med" len="med"/>
+            <a:tailEnd type="none" w="med" len="med"/>
+          </a:ln>
+          <a:effectLst/>
+        </p:spPr>
+      </p:cxnSp>
     </p:spTree>
   </p:cSld>
   <p:clrMapOvr>
@@ -7070,41 +9484,16 @@
           <a:chExt cx="0" cy="0"/>
         </a:xfrm>
       </p:grpSpPr>
-      <p:pic>
-        <p:nvPicPr>
-          <p:cNvPr id="20" name="Picture 19" descr="newsnippet_browser.png"/>
-          <p:cNvPicPr>
-            <a:picLocks noChangeAspect="1"/>
-          </p:cNvPicPr>
-          <p:nvPr/>
-        </p:nvPicPr>
-        <p:blipFill>
-          <a:blip r:embed="rId2"/>
-          <a:srcRect l="1456" t="6638" r="1958" b="34328"/>
-          <a:stretch>
-            <a:fillRect/>
-          </a:stretch>
-        </p:blipFill>
-        <p:spPr>
-          <a:xfrm>
-            <a:off x="3045125" y="1578634"/>
-            <a:ext cx="4865298" cy="2518913"/>
-          </a:xfrm>
-          <a:prstGeom prst="rect">
-            <a:avLst/>
-          </a:prstGeom>
-        </p:spPr>
-      </p:pic>
-      <p:sp>
-        <p:nvSpPr>
-          <p:cNvPr id="8" name="TextBox 7"/>
+      <p:sp>
+        <p:nvSpPr>
+          <p:cNvPr id="6" name="TextBox 5"/>
           <p:cNvSpPr txBox="1"/>
           <p:nvPr/>
         </p:nvSpPr>
         <p:spPr>
           <a:xfrm>
-            <a:off x="4876800" y="4385846"/>
-            <a:ext cx="1432329" cy="338554"/>
+            <a:off x="472671" y="2362200"/>
+            <a:ext cx="1432329" cy="954107"/>
           </a:xfrm>
           <a:prstGeom prst="rect">
             <a:avLst/>
@@ -7119,12 +9508,80 @@
           <a:p>
             <a:pPr algn="r"/>
             <a:r>
-              <a:rPr lang="en-US" sz="1600" dirty="0" smtClean="0">
+              <a:rPr lang="en-US" sz="1400" dirty="0" smtClean="0">
                 <a:solidFill>
                   <a:srgbClr val="000000"/>
                 </a:solidFill>
               </a:rPr>
-              <a:t>Claim Browser</a:t>
+              <a:t>Claims supporting or opposing the selected claim</a:t>
+            </a:r>
+          </a:p>
+        </p:txBody>
+      </p:sp>
+      <p:sp>
+        <p:nvSpPr>
+          <p:cNvPr id="7" name="TextBox 6"/>
+          <p:cNvSpPr txBox="1"/>
+          <p:nvPr/>
+        </p:nvSpPr>
+        <p:spPr>
+          <a:xfrm>
+            <a:off x="472671" y="4191000"/>
+            <a:ext cx="1432329" cy="738664"/>
+          </a:xfrm>
+          <a:prstGeom prst="rect">
+            <a:avLst/>
+          </a:prstGeom>
+          <a:noFill/>
+        </p:spPr>
+        <p:txBody>
+          <a:bodyPr wrap="square" rtlCol="0">
+            <a:spAutoFit/>
+          </a:bodyPr>
+          <a:lstStyle/>
+          <a:p>
+            <a:pPr algn="r"/>
+            <a:r>
+              <a:rPr lang="en-US" sz="1400" dirty="0" smtClean="0">
+                <a:solidFill>
+                  <a:srgbClr val="000000"/>
+                </a:solidFill>
+              </a:rPr>
+              <a:t>Search for claims to connect to the selected claim</a:t>
+            </a:r>
+          </a:p>
+        </p:txBody>
+      </p:sp>
+      <p:sp>
+        <p:nvSpPr>
+          <p:cNvPr id="8" name="TextBox 7"/>
+          <p:cNvSpPr txBox="1"/>
+          <p:nvPr/>
+        </p:nvSpPr>
+        <p:spPr>
+          <a:xfrm>
+            <a:off x="472671" y="990600"/>
+            <a:ext cx="1432329" cy="307777"/>
+          </a:xfrm>
+          <a:prstGeom prst="rect">
+            <a:avLst/>
+          </a:prstGeom>
+          <a:noFill/>
+        </p:spPr>
+        <p:txBody>
+          <a:bodyPr wrap="square" rtlCol="0">
+            <a:spAutoFit/>
+          </a:bodyPr>
+          <a:lstStyle/>
+          <a:p>
+            <a:pPr algn="r"/>
+            <a:r>
+              <a:rPr lang="en-US" sz="1400" dirty="0" smtClean="0">
+                <a:solidFill>
+                  <a:srgbClr val="000000"/>
+                </a:solidFill>
+              </a:rPr>
+              <a:t>Selected Claim</a:t>
             </a:r>
           </a:p>
         </p:txBody>
@@ -7136,9 +9593,9 @@
           <p:nvPr/>
         </p:nvCxnSpPr>
         <p:spPr bwMode="auto">
-          <a:xfrm rot="10800000">
-            <a:off x="2590800" y="2063003"/>
-            <a:ext cx="304800" cy="1588"/>
+          <a:xfrm rot="5400000">
+            <a:off x="1829197" y="4571603"/>
+            <a:ext cx="609600" cy="794"/>
           </a:xfrm>
           <a:prstGeom prst="line">
             <a:avLst/>
@@ -7160,14 +9617,14 @@
       </p:cxnSp>
       <p:cxnSp>
         <p:nvCxnSpPr>
-          <p:cNvPr id="25" name="Straight Connector 24"/>
+          <p:cNvPr id="19" name="Straight Connector 18"/>
           <p:cNvCxnSpPr/>
           <p:nvPr/>
         </p:nvCxnSpPr>
         <p:spPr bwMode="auto">
-          <a:xfrm rot="10800000">
-            <a:off x="3658394" y="4114800"/>
-            <a:ext cx="4037806" cy="1588"/>
+          <a:xfrm>
+            <a:off x="1889529" y="4570412"/>
+            <a:ext cx="228600" cy="1588"/>
           </a:xfrm>
           <a:prstGeom prst="line">
             <a:avLst/>
@@ -7187,50 +9644,16 @@
           <a:effectLst/>
         </p:spPr>
       </p:cxnSp>
-      <p:sp>
-        <p:nvSpPr>
-          <p:cNvPr id="15" name="TextBox 14"/>
-          <p:cNvSpPr txBox="1"/>
-          <p:nvPr/>
-        </p:nvSpPr>
-        <p:spPr>
-          <a:xfrm>
-            <a:off x="6248400" y="634425"/>
-            <a:ext cx="1889529" cy="584775"/>
-          </a:xfrm>
-          <a:prstGeom prst="rect">
-            <a:avLst/>
-          </a:prstGeom>
-          <a:noFill/>
-        </p:spPr>
-        <p:txBody>
-          <a:bodyPr wrap="square" rtlCol="0">
-            <a:spAutoFit/>
-          </a:bodyPr>
-          <a:lstStyle/>
-          <a:p>
-            <a:pPr algn="ctr"/>
-            <a:r>
-              <a:rPr lang="en-US" sz="1600" dirty="0" smtClean="0">
-                <a:solidFill>
-                  <a:srgbClr val="000000"/>
-                </a:solidFill>
-              </a:rPr>
-              <a:t>Rename  or delete the selected claim</a:t>
-            </a:r>
-          </a:p>
-        </p:txBody>
-      </p:sp>
       <p:cxnSp>
         <p:nvCxnSpPr>
-          <p:cNvPr id="16" name="Straight Connector 15"/>
+          <p:cNvPr id="25" name="Straight Connector 24"/>
           <p:cNvCxnSpPr/>
           <p:nvPr/>
         </p:nvCxnSpPr>
         <p:spPr bwMode="auto">
-          <a:xfrm rot="5400000">
-            <a:off x="7010400" y="1371600"/>
-            <a:ext cx="304800" cy="1588"/>
+          <a:xfrm>
+            <a:off x="1905000" y="1143000"/>
+            <a:ext cx="229394" cy="1588"/>
           </a:xfrm>
           <a:prstGeom prst="line">
             <a:avLst/>
@@ -7252,14 +9675,14 @@
       </p:cxnSp>
       <p:cxnSp>
         <p:nvCxnSpPr>
-          <p:cNvPr id="17" name="Straight Connector 16"/>
+          <p:cNvPr id="28" name="Straight Connector 27"/>
           <p:cNvCxnSpPr/>
           <p:nvPr/>
         </p:nvCxnSpPr>
         <p:spPr bwMode="auto">
-          <a:xfrm>
-            <a:off x="6553200" y="1524000"/>
-            <a:ext cx="1295400" cy="1588"/>
+          <a:xfrm rot="5400000">
+            <a:off x="952897" y="2933303"/>
+            <a:ext cx="2362200" cy="794"/>
           </a:xfrm>
           <a:prstGeom prst="line">
             <a:avLst/>
@@ -7279,50 +9702,16 @@
           <a:effectLst/>
         </p:spPr>
       </p:cxnSp>
-      <p:sp>
-        <p:nvSpPr>
-          <p:cNvPr id="32" name="TextBox 31"/>
-          <p:cNvSpPr txBox="1"/>
-          <p:nvPr/>
-        </p:nvSpPr>
-        <p:spPr>
-          <a:xfrm>
-            <a:off x="1143000" y="1905000"/>
-            <a:ext cx="1432329" cy="338554"/>
-          </a:xfrm>
-          <a:prstGeom prst="rect">
-            <a:avLst/>
-          </a:prstGeom>
-          <a:noFill/>
-        </p:spPr>
-        <p:txBody>
-          <a:bodyPr wrap="square" rtlCol="0">
-            <a:spAutoFit/>
-          </a:bodyPr>
-          <a:lstStyle/>
-          <a:p>
-            <a:pPr algn="r"/>
-            <a:r>
-              <a:rPr lang="en-US" sz="1600" dirty="0" smtClean="0">
-                <a:solidFill>
-                  <a:srgbClr val="000000"/>
-                </a:solidFill>
-              </a:rPr>
-              <a:t>Quick Lists</a:t>
-            </a:r>
-          </a:p>
-        </p:txBody>
-      </p:sp>
       <p:cxnSp>
         <p:nvCxnSpPr>
-          <p:cNvPr id="34" name="Straight Connector 33"/>
+          <p:cNvPr id="29" name="Straight Connector 28"/>
           <p:cNvCxnSpPr/>
           <p:nvPr/>
         </p:nvCxnSpPr>
         <p:spPr bwMode="auto">
-          <a:xfrm rot="5400000">
-            <a:off x="2515394" y="2057400"/>
-            <a:ext cx="762000" cy="1588"/>
+          <a:xfrm>
+            <a:off x="1905000" y="2971800"/>
+            <a:ext cx="228600" cy="1588"/>
           </a:xfrm>
           <a:prstGeom prst="line">
             <a:avLst/>
@@ -7342,16 +9731,74 @@
           <a:effectLst/>
         </p:spPr>
       </p:cxnSp>
+      <p:pic>
+        <p:nvPicPr>
+          <p:cNvPr id="11" name="Picture 10" descr="oldpoint_crop.png"/>
+          <p:cNvPicPr>
+            <a:picLocks noChangeAspect="1"/>
+          </p:cNvPicPr>
+          <p:nvPr/>
+        </p:nvPicPr>
+        <p:blipFill>
+          <a:blip r:embed="rId2"/>
+          <a:stretch>
+            <a:fillRect/>
+          </a:stretch>
+        </p:blipFill>
+        <p:spPr>
+          <a:xfrm>
+            <a:off x="2286000" y="1066800"/>
+            <a:ext cx="4974336" cy="3810000"/>
+          </a:xfrm>
+          <a:prstGeom prst="rect">
+            <a:avLst/>
+          </a:prstGeom>
+        </p:spPr>
+      </p:pic>
+      <p:sp>
+        <p:nvSpPr>
+          <p:cNvPr id="16" name="TextBox 15"/>
+          <p:cNvSpPr txBox="1"/>
+          <p:nvPr/>
+        </p:nvSpPr>
+        <p:spPr>
+          <a:xfrm>
+            <a:off x="167871" y="1371600"/>
+            <a:ext cx="1737129" cy="523220"/>
+          </a:xfrm>
+          <a:prstGeom prst="rect">
+            <a:avLst/>
+          </a:prstGeom>
+          <a:noFill/>
+        </p:spPr>
+        <p:txBody>
+          <a:bodyPr wrap="square" rtlCol="0">
+            <a:spAutoFit/>
+          </a:bodyPr>
+          <a:lstStyle/>
+          <a:p>
+            <a:pPr algn="r"/>
+            <a:r>
+              <a:rPr lang="en-US" sz="1400" dirty="0" smtClean="0">
+                <a:solidFill>
+                  <a:srgbClr val="000000"/>
+                </a:solidFill>
+              </a:rPr>
+              <a:t>Claims that this claim supports or opposes</a:t>
+            </a:r>
+          </a:p>
+        </p:txBody>
+      </p:sp>
       <p:cxnSp>
         <p:nvCxnSpPr>
-          <p:cNvPr id="38" name="Straight Connector 37"/>
+          <p:cNvPr id="17" name="Straight Connector 16"/>
           <p:cNvCxnSpPr/>
           <p:nvPr/>
         </p:nvCxnSpPr>
         <p:spPr bwMode="auto">
-          <a:xfrm rot="5400000">
-            <a:off x="5410994" y="4266406"/>
-            <a:ext cx="304800" cy="1588"/>
+          <a:xfrm>
+            <a:off x="1905000" y="1524000"/>
+            <a:ext cx="229394" cy="1588"/>
           </a:xfrm>
           <a:prstGeom prst="line">
             <a:avLst/>
@@ -7371,6 +9818,160 @@
           <a:effectLst/>
         </p:spPr>
       </p:cxnSp>
+      <p:sp>
+        <p:nvSpPr>
+          <p:cNvPr id="21" name="TextBox 20"/>
+          <p:cNvSpPr txBox="1"/>
+          <p:nvPr/>
+        </p:nvSpPr>
+        <p:spPr>
+          <a:xfrm>
+            <a:off x="5257800" y="3962400"/>
+            <a:ext cx="1432329" cy="523220"/>
+          </a:xfrm>
+          <a:prstGeom prst="rect">
+            <a:avLst/>
+          </a:prstGeom>
+          <a:noFill/>
+        </p:spPr>
+        <p:txBody>
+          <a:bodyPr wrap="square" rtlCol="0">
+            <a:spAutoFit/>
+          </a:bodyPr>
+          <a:lstStyle/>
+          <a:p>
+            <a:pPr algn="ctr"/>
+            <a:r>
+              <a:rPr lang="en-US" sz="1400" dirty="0" smtClean="0">
+                <a:solidFill>
+                  <a:srgbClr val="000000"/>
+                </a:solidFill>
+              </a:rPr>
+              <a:t>Snippets that make this claim</a:t>
+            </a:r>
+          </a:p>
+        </p:txBody>
+      </p:sp>
+      <p:cxnSp>
+        <p:nvCxnSpPr>
+          <p:cNvPr id="22" name="Straight Connector 21"/>
+          <p:cNvCxnSpPr/>
+          <p:nvPr/>
+        </p:nvCxnSpPr>
+        <p:spPr bwMode="auto">
+          <a:xfrm>
+            <a:off x="4801394" y="3733800"/>
+            <a:ext cx="2437606" cy="1588"/>
+          </a:xfrm>
+          <a:prstGeom prst="line">
+            <a:avLst/>
+          </a:prstGeom>
+          <a:solidFill>
+            <a:schemeClr val="accent1"/>
+          </a:solidFill>
+          <a:ln w="50800" cap="flat" cmpd="sng" algn="ctr">
+            <a:solidFill>
+              <a:schemeClr val="tx1"/>
+            </a:solidFill>
+            <a:prstDash val="solid"/>
+            <a:round/>
+            <a:headEnd type="none" w="med" len="med"/>
+            <a:tailEnd type="none" w="med" len="med"/>
+          </a:ln>
+          <a:effectLst/>
+        </p:spPr>
+      </p:cxnSp>
+      <p:cxnSp>
+        <p:nvCxnSpPr>
+          <p:cNvPr id="23" name="Straight Connector 22"/>
+          <p:cNvCxnSpPr/>
+          <p:nvPr/>
+        </p:nvCxnSpPr>
+        <p:spPr bwMode="auto">
+          <a:xfrm rot="16200000" flipH="1">
+            <a:off x="5829301" y="3848100"/>
+            <a:ext cx="228601" cy="3"/>
+          </a:xfrm>
+          <a:prstGeom prst="line">
+            <a:avLst/>
+          </a:prstGeom>
+          <a:solidFill>
+            <a:schemeClr val="accent1"/>
+          </a:solidFill>
+          <a:ln w="50800" cap="flat" cmpd="sng" algn="ctr">
+            <a:solidFill>
+              <a:schemeClr val="tx1"/>
+            </a:solidFill>
+            <a:prstDash val="solid"/>
+            <a:round/>
+            <a:headEnd type="none" w="med" len="med"/>
+            <a:tailEnd type="none" w="med" len="med"/>
+          </a:ln>
+          <a:effectLst/>
+        </p:spPr>
+      </p:cxnSp>
+      <p:cxnSp>
+        <p:nvCxnSpPr>
+          <p:cNvPr id="26" name="Straight Connector 25"/>
+          <p:cNvCxnSpPr/>
+          <p:nvPr/>
+        </p:nvCxnSpPr>
+        <p:spPr bwMode="auto">
+          <a:xfrm rot="5400000">
+            <a:off x="5818178" y="1169184"/>
+            <a:ext cx="404038" cy="794"/>
+          </a:xfrm>
+          <a:prstGeom prst="line">
+            <a:avLst/>
+          </a:prstGeom>
+          <a:solidFill>
+            <a:schemeClr val="accent1"/>
+          </a:solidFill>
+          <a:ln w="50800" cap="flat" cmpd="sng" algn="ctr">
+            <a:solidFill>
+              <a:schemeClr val="tx1"/>
+            </a:solidFill>
+            <a:prstDash val="solid"/>
+            <a:round/>
+            <a:headEnd type="none" w="med" len="med"/>
+            <a:tailEnd type="none" w="med" len="med"/>
+          </a:ln>
+          <a:effectLst/>
+        </p:spPr>
+      </p:cxnSp>
+      <p:sp>
+        <p:nvSpPr>
+          <p:cNvPr id="30" name="TextBox 29"/>
+          <p:cNvSpPr txBox="1"/>
+          <p:nvPr/>
+        </p:nvSpPr>
+        <p:spPr>
+          <a:xfrm>
+            <a:off x="5486400" y="457200"/>
+            <a:ext cx="1432329" cy="523220"/>
+          </a:xfrm>
+          <a:prstGeom prst="rect">
+            <a:avLst/>
+          </a:prstGeom>
+          <a:noFill/>
+        </p:spPr>
+        <p:txBody>
+          <a:bodyPr wrap="square" rtlCol="0">
+            <a:spAutoFit/>
+          </a:bodyPr>
+          <a:lstStyle/>
+          <a:p>
+            <a:r>
+              <a:rPr lang="en-US" sz="1400" dirty="0" smtClean="0">
+                <a:solidFill>
+                  <a:srgbClr val="000000"/>
+                </a:solidFill>
+              </a:rPr>
+              <a:t>Topics that this claim is about</a:t>
+            </a:r>
+          </a:p>
+        </p:txBody>
+      </p:sp>
     </p:spTree>
   </p:cSld>
   <p:clrMapOvr>
@@ -7406,20 +10007,55 @@
         </p:nvPicPr>
         <p:blipFill>
           <a:blip r:embed="rId2"/>
+          <a:srcRect l="1456" t="6638" r="1958" b="34328"/>
           <a:stretch>
             <a:fillRect/>
           </a:stretch>
         </p:blipFill>
         <p:spPr>
           <a:xfrm>
-            <a:off x="2270529" y="1676400"/>
-            <a:ext cx="4865298" cy="2131984"/>
+            <a:off x="3045125" y="1578634"/>
+            <a:ext cx="4865298" cy="2518913"/>
           </a:xfrm>
           <a:prstGeom prst="rect">
             <a:avLst/>
           </a:prstGeom>
         </p:spPr>
       </p:pic>
+      <p:sp>
+        <p:nvSpPr>
+          <p:cNvPr id="8" name="TextBox 7"/>
+          <p:cNvSpPr txBox="1"/>
+          <p:nvPr/>
+        </p:nvSpPr>
+        <p:spPr>
+          <a:xfrm>
+            <a:off x="4876800" y="4385846"/>
+            <a:ext cx="1432329" cy="338554"/>
+          </a:xfrm>
+          <a:prstGeom prst="rect">
+            <a:avLst/>
+          </a:prstGeom>
+          <a:noFill/>
+        </p:spPr>
+        <p:txBody>
+          <a:bodyPr wrap="square" rtlCol="0">
+            <a:spAutoFit/>
+          </a:bodyPr>
+          <a:lstStyle/>
+          <a:p>
+            <a:pPr algn="r"/>
+            <a:r>
+              <a:rPr lang="en-US" sz="1600" dirty="0" smtClean="0">
+                <a:solidFill>
+                  <a:srgbClr val="000000"/>
+                </a:solidFill>
+              </a:rPr>
+              <a:t>Claim Browser</a:t>
+            </a:r>
+          </a:p>
+        </p:txBody>
+      </p:sp>
       <p:cxnSp>
         <p:nvCxnSpPr>
           <p:cNvPr id="13" name="Straight Connector 12"/>
@@ -7428,7 +10064,7 @@
         </p:nvCxnSpPr>
         <p:spPr bwMode="auto">
           <a:xfrm rot="10800000">
-            <a:off x="1965729" y="2450018"/>
+            <a:off x="2590800" y="2063003"/>
             <a:ext cx="304800" cy="1588"/>
           </a:xfrm>
           <a:prstGeom prst="line">
@@ -7449,70 +10085,16 @@
           <a:effectLst/>
         </p:spPr>
       </p:cxnSp>
-      <p:sp>
-        <p:nvSpPr>
-          <p:cNvPr id="32" name="TextBox 31"/>
-          <p:cNvSpPr txBox="1"/>
-          <p:nvPr/>
-        </p:nvSpPr>
-        <p:spPr>
-          <a:xfrm>
-            <a:off x="533400" y="2158425"/>
-            <a:ext cx="1432329" cy="584775"/>
-          </a:xfrm>
-          <a:prstGeom prst="rect">
-            <a:avLst/>
-          </a:prstGeom>
-          <a:noFill/>
-        </p:spPr>
-        <p:txBody>
-          <a:bodyPr wrap="square" rtlCol="0">
-            <a:spAutoFit/>
-          </a:bodyPr>
-          <a:lstStyle/>
-          <a:p>
-            <a:pPr algn="r"/>
-            <a:r>
-              <a:rPr lang="en-US" sz="1600" dirty="0" smtClean="0">
-                <a:solidFill>
-                  <a:srgbClr val="000000"/>
-                </a:solidFill>
-              </a:rPr>
-              <a:t>Snippet </a:t>
-            </a:r>
-            <a:br>
-              <a:rPr lang="en-US" sz="1600" dirty="0" smtClean="0">
-                <a:solidFill>
-                  <a:srgbClr val="000000"/>
-                </a:solidFill>
-              </a:rPr>
-            </a:br>
-            <a:r>
-              <a:rPr lang="en-US" sz="1600" dirty="0" smtClean="0">
-                <a:solidFill>
-                  <a:srgbClr val="000000"/>
-                </a:solidFill>
-              </a:rPr>
-              <a:t>Text</a:t>
-            </a:r>
-            <a:endParaRPr lang="en-US" sz="1600" dirty="0" smtClean="0">
-              <a:solidFill>
-                <a:srgbClr val="000000"/>
-              </a:solidFill>
-            </a:endParaRPr>
-          </a:p>
-        </p:txBody>
-      </p:sp>
       <p:cxnSp>
         <p:nvCxnSpPr>
-          <p:cNvPr id="34" name="Straight Connector 33"/>
+          <p:cNvPr id="25" name="Straight Connector 24"/>
           <p:cNvCxnSpPr/>
           <p:nvPr/>
         </p:nvCxnSpPr>
         <p:spPr bwMode="auto">
-          <a:xfrm rot="5400000">
-            <a:off x="1987133" y="2450018"/>
-            <a:ext cx="533400" cy="1588"/>
+          <a:xfrm rot="10800000">
+            <a:off x="3658394" y="4114800"/>
+            <a:ext cx="4037806" cy="1588"/>
           </a:xfrm>
           <a:prstGeom prst="line">
             <a:avLst/>
@@ -7534,14 +10116,14 @@
       </p:cxnSp>
       <p:sp>
         <p:nvSpPr>
-          <p:cNvPr id="12" name="TextBox 11"/>
+          <p:cNvPr id="15" name="TextBox 14"/>
           <p:cNvSpPr txBox="1"/>
           <p:nvPr/>
         </p:nvSpPr>
         <p:spPr>
           <a:xfrm>
-            <a:off x="533400" y="3319046"/>
-            <a:ext cx="1432329" cy="338554"/>
+            <a:off x="6248400" y="634425"/>
+            <a:ext cx="1889529" cy="584775"/>
           </a:xfrm>
           <a:prstGeom prst="rect">
             <a:avLst/>
@@ -7554,32 +10136,27 @@
           </a:bodyPr>
           <a:lstStyle/>
           <a:p>
-            <a:pPr algn="r"/>
+            <a:pPr algn="ctr"/>
             <a:r>
               <a:rPr lang="en-US" sz="1600" dirty="0" smtClean="0">
                 <a:solidFill>
                   <a:srgbClr val="000000"/>
                 </a:solidFill>
               </a:rPr>
-              <a:t>Claim</a:t>
-            </a:r>
-            <a:endParaRPr lang="en-US" sz="1600" dirty="0" smtClean="0">
-              <a:solidFill>
-                <a:srgbClr val="000000"/>
-              </a:solidFill>
-            </a:endParaRPr>
+              <a:t>Rename  or delete the selected claim</a:t>
+            </a:r>
           </a:p>
         </p:txBody>
       </p:sp>
       <p:cxnSp>
         <p:nvCxnSpPr>
-          <p:cNvPr id="14" name="Straight Connector 13"/>
+          <p:cNvPr id="16" name="Straight Connector 15"/>
           <p:cNvCxnSpPr/>
           <p:nvPr/>
         </p:nvCxnSpPr>
         <p:spPr bwMode="auto">
-          <a:xfrm rot="10800000">
-            <a:off x="1965729" y="3487529"/>
+          <a:xfrm rot="5400000">
+            <a:off x="7010400" y="1371600"/>
             <a:ext cx="304800" cy="1588"/>
           </a:xfrm>
           <a:prstGeom prst="line">
@@ -7600,55 +10177,16 @@
           <a:effectLst/>
         </p:spPr>
       </p:cxnSp>
-      <p:sp>
-        <p:nvSpPr>
-          <p:cNvPr id="19" name="TextBox 18"/>
-          <p:cNvSpPr txBox="1"/>
-          <p:nvPr/>
-        </p:nvSpPr>
-        <p:spPr>
-          <a:xfrm>
-            <a:off x="533400" y="2889013"/>
-            <a:ext cx="1432329" cy="338554"/>
-          </a:xfrm>
-          <a:prstGeom prst="rect">
-            <a:avLst/>
-          </a:prstGeom>
-          <a:noFill/>
-        </p:spPr>
-        <p:txBody>
-          <a:bodyPr wrap="square" rtlCol="0">
-            <a:spAutoFit/>
-          </a:bodyPr>
-          <a:lstStyle/>
-          <a:p>
-            <a:pPr algn="r"/>
-            <a:r>
-              <a:rPr lang="en-US" sz="1600" dirty="0" smtClean="0">
-                <a:solidFill>
-                  <a:srgbClr val="000000"/>
-                </a:solidFill>
-              </a:rPr>
-              <a:t>Topic</a:t>
-            </a:r>
-            <a:endParaRPr lang="en-US" sz="1600" dirty="0" smtClean="0">
-              <a:solidFill>
-                <a:srgbClr val="000000"/>
-              </a:solidFill>
-            </a:endParaRPr>
-          </a:p>
-        </p:txBody>
-      </p:sp>
       <p:cxnSp>
         <p:nvCxnSpPr>
-          <p:cNvPr id="21" name="Straight Connector 20"/>
+          <p:cNvPr id="17" name="Straight Connector 16"/>
           <p:cNvCxnSpPr/>
           <p:nvPr/>
         </p:nvCxnSpPr>
         <p:spPr bwMode="auto">
-          <a:xfrm rot="10800000">
-            <a:off x="1965729" y="2450811"/>
-            <a:ext cx="304800" cy="1"/>
+          <a:xfrm>
+            <a:off x="6553200" y="1524000"/>
+            <a:ext cx="1295400" cy="1588"/>
           </a:xfrm>
           <a:prstGeom prst="line">
             <a:avLst/>
@@ -7668,16 +10206,50 @@
           <a:effectLst/>
         </p:spPr>
       </p:cxnSp>
+      <p:sp>
+        <p:nvSpPr>
+          <p:cNvPr id="32" name="TextBox 31"/>
+          <p:cNvSpPr txBox="1"/>
+          <p:nvPr/>
+        </p:nvSpPr>
+        <p:spPr>
+          <a:xfrm>
+            <a:off x="1143000" y="1905000"/>
+            <a:ext cx="1432329" cy="338554"/>
+          </a:xfrm>
+          <a:prstGeom prst="rect">
+            <a:avLst/>
+          </a:prstGeom>
+          <a:noFill/>
+        </p:spPr>
+        <p:txBody>
+          <a:bodyPr wrap="square" rtlCol="0">
+            <a:spAutoFit/>
+          </a:bodyPr>
+          <a:lstStyle/>
+          <a:p>
+            <a:pPr algn="r"/>
+            <a:r>
+              <a:rPr lang="en-US" sz="1600" dirty="0" smtClean="0">
+                <a:solidFill>
+                  <a:srgbClr val="000000"/>
+                </a:solidFill>
+              </a:rPr>
+              <a:t>Quick Lists</a:t>
+            </a:r>
+          </a:p>
+        </p:txBody>
+      </p:sp>
       <p:cxnSp>
         <p:nvCxnSpPr>
-          <p:cNvPr id="27" name="Straight Connector 26"/>
+          <p:cNvPr id="34" name="Straight Connector 33"/>
           <p:cNvCxnSpPr/>
           <p:nvPr/>
         </p:nvCxnSpPr>
         <p:spPr bwMode="auto">
-          <a:xfrm rot="10800000">
-            <a:off x="1965729" y="3057496"/>
-            <a:ext cx="304800" cy="1588"/>
+          <a:xfrm rot="5400000">
+            <a:off x="2515394" y="2057400"/>
+            <a:ext cx="762000" cy="1588"/>
           </a:xfrm>
           <a:prstGeom prst="line">
             <a:avLst/>
@@ -7697,54 +10269,16 @@
           <a:effectLst/>
         </p:spPr>
       </p:cxnSp>
-      <p:sp>
-        <p:nvSpPr>
-          <p:cNvPr id="28" name="TextBox 27"/>
-          <p:cNvSpPr txBox="1"/>
-          <p:nvPr/>
-        </p:nvSpPr>
-        <p:spPr>
-          <a:xfrm>
-            <a:off x="7391400" y="2895600"/>
-            <a:ext cx="1432329" cy="584775"/>
-          </a:xfrm>
-          <a:prstGeom prst="rect">
-            <a:avLst/>
-          </a:prstGeom>
-          <a:noFill/>
-        </p:spPr>
-        <p:txBody>
-          <a:bodyPr wrap="square" rtlCol="0">
-            <a:spAutoFit/>
-          </a:bodyPr>
-          <a:lstStyle/>
-          <a:p>
-            <a:r>
-              <a:rPr lang="en-US" sz="1600" dirty="0" smtClean="0">
-                <a:solidFill>
-                  <a:srgbClr val="000000"/>
-                </a:solidFill>
-              </a:rPr>
-              <a:t>Show Suggestions</a:t>
-            </a:r>
-            <a:endParaRPr lang="en-US" sz="1600" dirty="0" smtClean="0">
-              <a:solidFill>
-                <a:srgbClr val="000000"/>
-              </a:solidFill>
-            </a:endParaRPr>
-          </a:p>
-        </p:txBody>
-      </p:sp>
       <p:cxnSp>
         <p:nvCxnSpPr>
-          <p:cNvPr id="29" name="Straight Connector 28"/>
+          <p:cNvPr id="38" name="Straight Connector 37"/>
           <p:cNvCxnSpPr/>
           <p:nvPr/>
         </p:nvCxnSpPr>
         <p:spPr bwMode="auto">
-          <a:xfrm rot="10800000">
-            <a:off x="7086600" y="2971800"/>
-            <a:ext cx="152400" cy="1588"/>
+          <a:xfrm rot="5400000">
+            <a:off x="5410994" y="4266406"/>
+            <a:ext cx="304800" cy="1588"/>
           </a:xfrm>
           <a:prstGeom prst="line">
             <a:avLst/>
@@ -7752,94 +10286,7 @@
           <a:solidFill>
             <a:schemeClr val="accent1"/>
           </a:solidFill>
-          <a:ln w="50800" cap="rnd" cmpd="sng" algn="ctr">
-            <a:solidFill>
-              <a:schemeClr val="tx1"/>
-            </a:solidFill>
-            <a:prstDash val="solid"/>
-            <a:round/>
-            <a:headEnd type="none" w="med" len="med"/>
-            <a:tailEnd type="none" w="med" len="med"/>
-          </a:ln>
-          <a:effectLst/>
-        </p:spPr>
-      </p:cxnSp>
-      <p:cxnSp>
-        <p:nvCxnSpPr>
-          <p:cNvPr id="30" name="Straight Connector 29"/>
-          <p:cNvCxnSpPr/>
-          <p:nvPr/>
-        </p:nvCxnSpPr>
-        <p:spPr bwMode="auto">
-          <a:xfrm rot="10800000">
-            <a:off x="7086600" y="3429000"/>
-            <a:ext cx="152400" cy="1588"/>
-          </a:xfrm>
-          <a:prstGeom prst="line">
-            <a:avLst/>
-          </a:prstGeom>
-          <a:solidFill>
-            <a:schemeClr val="accent1"/>
-          </a:solidFill>
-          <a:ln w="50800" cap="rnd" cmpd="sng" algn="ctr">
-            <a:solidFill>
-              <a:schemeClr val="tx1"/>
-            </a:solidFill>
-            <a:prstDash val="solid"/>
-            <a:round/>
-            <a:headEnd type="none" w="med" len="med"/>
-            <a:tailEnd type="none" w="med" len="med"/>
-          </a:ln>
-          <a:effectLst/>
-        </p:spPr>
-      </p:cxnSp>
-      <p:cxnSp>
-        <p:nvCxnSpPr>
-          <p:cNvPr id="31" name="Straight Connector 30"/>
-          <p:cNvCxnSpPr/>
-          <p:nvPr/>
-        </p:nvCxnSpPr>
-        <p:spPr bwMode="auto">
-          <a:xfrm rot="10800000">
-            <a:off x="7239000" y="3200400"/>
-            <a:ext cx="152400" cy="1588"/>
-          </a:xfrm>
-          <a:prstGeom prst="line">
-            <a:avLst/>
-          </a:prstGeom>
-          <a:solidFill>
-            <a:schemeClr val="accent1"/>
-          </a:solidFill>
-          <a:ln w="50800" cap="rnd" cmpd="sng" algn="ctr">
-            <a:solidFill>
-              <a:schemeClr val="tx1"/>
-            </a:solidFill>
-            <a:prstDash val="solid"/>
-            <a:round/>
-            <a:headEnd type="none" w="med" len="med"/>
-            <a:tailEnd type="none" w="med" len="med"/>
-          </a:ln>
-          <a:effectLst/>
-        </p:spPr>
-      </p:cxnSp>
-      <p:cxnSp>
-        <p:nvCxnSpPr>
-          <p:cNvPr id="33" name="Straight Connector 32"/>
-          <p:cNvCxnSpPr/>
-          <p:nvPr/>
-        </p:nvCxnSpPr>
-        <p:spPr bwMode="auto">
-          <a:xfrm rot="5400000" flipH="1" flipV="1">
-            <a:off x="7010400" y="3200400"/>
-            <a:ext cx="457200" cy="1588"/>
-          </a:xfrm>
-          <a:prstGeom prst="line">
-            <a:avLst/>
-          </a:prstGeom>
-          <a:solidFill>
-            <a:schemeClr val="accent1"/>
-          </a:solidFill>
-          <a:ln w="50800" cap="rnd" cmpd="sng" algn="ctr">
+          <a:ln w="50800" cap="flat" cmpd="sng" algn="ctr">
             <a:solidFill>
               <a:schemeClr val="tx1"/>
             </a:solidFill>

</xml_diff>

<commit_message>
State before Beth changes. Largely just reference fixing.
</commit_message>
<xml_diff>
--- a/papers/diagrams.pptx
+++ b/papers/diagrams.pptx
@@ -302,7 +302,7 @@
             <a:fld id="{4D48661F-B396-4702-B33E-1E9FB6086F60}" type="datetimeFigureOut">
               <a:rPr lang="en-US" smtClean="0"/>
               <a:pPr/>
-              <a:t>9/18/2008</a:t>
+              <a:t>9/19/2008</a:t>
             </a:fld>
             <a:endParaRPr lang="en-US"/>
           </a:p>
@@ -469,7 +469,7 @@
             <a:fld id="{4D48661F-B396-4702-B33E-1E9FB6086F60}" type="datetimeFigureOut">
               <a:rPr lang="en-US" smtClean="0"/>
               <a:pPr/>
-              <a:t>9/18/2008</a:t>
+              <a:t>9/19/2008</a:t>
             </a:fld>
             <a:endParaRPr lang="en-US"/>
           </a:p>
@@ -646,7 +646,7 @@
             <a:fld id="{4D48661F-B396-4702-B33E-1E9FB6086F60}" type="datetimeFigureOut">
               <a:rPr lang="en-US" smtClean="0"/>
               <a:pPr/>
-              <a:t>9/18/2008</a:t>
+              <a:t>9/19/2008</a:t>
             </a:fld>
             <a:endParaRPr lang="en-US"/>
           </a:p>
@@ -813,7 +813,7 @@
             <a:fld id="{4D48661F-B396-4702-B33E-1E9FB6086F60}" type="datetimeFigureOut">
               <a:rPr lang="en-US" smtClean="0"/>
               <a:pPr/>
-              <a:t>9/18/2008</a:t>
+              <a:t>9/19/2008</a:t>
             </a:fld>
             <a:endParaRPr lang="en-US"/>
           </a:p>
@@ -1056,7 +1056,7 @@
             <a:fld id="{4D48661F-B396-4702-B33E-1E9FB6086F60}" type="datetimeFigureOut">
               <a:rPr lang="en-US" smtClean="0"/>
               <a:pPr/>
-              <a:t>9/18/2008</a:t>
+              <a:t>9/19/2008</a:t>
             </a:fld>
             <a:endParaRPr lang="en-US"/>
           </a:p>
@@ -1341,7 +1341,7 @@
             <a:fld id="{4D48661F-B396-4702-B33E-1E9FB6086F60}" type="datetimeFigureOut">
               <a:rPr lang="en-US" smtClean="0"/>
               <a:pPr/>
-              <a:t>9/18/2008</a:t>
+              <a:t>9/19/2008</a:t>
             </a:fld>
             <a:endParaRPr lang="en-US"/>
           </a:p>
@@ -1760,7 +1760,7 @@
             <a:fld id="{4D48661F-B396-4702-B33E-1E9FB6086F60}" type="datetimeFigureOut">
               <a:rPr lang="en-US" smtClean="0"/>
               <a:pPr/>
-              <a:t>9/18/2008</a:t>
+              <a:t>9/19/2008</a:t>
             </a:fld>
             <a:endParaRPr lang="en-US"/>
           </a:p>
@@ -1875,7 +1875,7 @@
             <a:fld id="{4D48661F-B396-4702-B33E-1E9FB6086F60}" type="datetimeFigureOut">
               <a:rPr lang="en-US" smtClean="0"/>
               <a:pPr/>
-              <a:t>9/18/2008</a:t>
+              <a:t>9/19/2008</a:t>
             </a:fld>
             <a:endParaRPr lang="en-US"/>
           </a:p>
@@ -1967,7 +1967,7 @@
             <a:fld id="{4D48661F-B396-4702-B33E-1E9FB6086F60}" type="datetimeFigureOut">
               <a:rPr lang="en-US" smtClean="0"/>
               <a:pPr/>
-              <a:t>9/18/2008</a:t>
+              <a:t>9/19/2008</a:t>
             </a:fld>
             <a:endParaRPr lang="en-US"/>
           </a:p>
@@ -2241,7 +2241,7 @@
             <a:fld id="{4D48661F-B396-4702-B33E-1E9FB6086F60}" type="datetimeFigureOut">
               <a:rPr lang="en-US" smtClean="0"/>
               <a:pPr/>
-              <a:t>9/18/2008</a:t>
+              <a:t>9/19/2008</a:t>
             </a:fld>
             <a:endParaRPr lang="en-US"/>
           </a:p>
@@ -2491,7 +2491,7 @@
             <a:fld id="{4D48661F-B396-4702-B33E-1E9FB6086F60}" type="datetimeFigureOut">
               <a:rPr lang="en-US" smtClean="0"/>
               <a:pPr/>
-              <a:t>9/18/2008</a:t>
+              <a:t>9/19/2008</a:t>
             </a:fld>
             <a:endParaRPr lang="en-US"/>
           </a:p>
@@ -2701,7 +2701,7 @@
             <a:fld id="{4D48661F-B396-4702-B33E-1E9FB6086F60}" type="datetimeFigureOut">
               <a:rPr lang="en-US" smtClean="0"/>
               <a:pPr/>
-              <a:t>9/18/2008</a:t>
+              <a:t>9/19/2008</a:t>
             </a:fld>
             <a:endParaRPr lang="en-US"/>
           </a:p>
@@ -5196,11 +5196,6 @@
               </a:rPr>
               <a:t>Voted for</a:t>
             </a:r>
-            <a:endParaRPr lang="en-US" sz="1200" dirty="0" smtClean="0">
-              <a:solidFill>
-                <a:srgbClr val="000000"/>
-              </a:solidFill>
-            </a:endParaRPr>
           </a:p>
         </p:txBody>
       </p:sp>
@@ -5603,11 +5598,6 @@
               </a:rPr>
               <a:t>Voted for</a:t>
             </a:r>
-            <a:endParaRPr lang="en-US" sz="1200" dirty="0" smtClean="0">
-              <a:solidFill>
-                <a:srgbClr val="000000"/>
-              </a:solidFill>
-            </a:endParaRPr>
           </a:p>
         </p:txBody>
       </p:sp>
@@ -5842,15 +5832,7 @@
                   <a:srgbClr val="000000"/>
                 </a:solidFill>
               </a:rPr>
-              <a:t>Electric cars emit less carbon </a:t>
-            </a:r>
-            <a:r>
-              <a:rPr lang="en-US" sz="1200" dirty="0" smtClean="0">
-                <a:solidFill>
-                  <a:srgbClr val="000000"/>
-                </a:solidFill>
-              </a:rPr>
-              <a:t>dioxide than</a:t>
+              <a:t>Electric cars emit less carbon dioxide than</a:t>
             </a:r>
             <a:br>
               <a:rPr lang="en-US" sz="1200" dirty="0" smtClean="0">
@@ -5867,11 +5849,6 @@
               </a:rPr>
               <a:t>normal cars</a:t>
             </a:r>
-            <a:endParaRPr lang="en-US" sz="1200" dirty="0" smtClean="0">
-              <a:solidFill>
-                <a:srgbClr val="000000"/>
-              </a:solidFill>
-            </a:endParaRPr>
           </a:p>
         </p:txBody>
       </p:sp>
@@ -8006,7 +7983,7 @@
         </p:nvSpPr>
         <p:spPr>
           <a:xfrm>
-            <a:off x="304800" y="3086100"/>
+            <a:off x="152400" y="2999601"/>
             <a:ext cx="1600200" cy="276999"/>
           </a:xfrm>
           <a:prstGeom prst="rect">
@@ -8040,8 +8017,8 @@
         </p:nvSpPr>
         <p:spPr>
           <a:xfrm>
-            <a:off x="2057400" y="3086100"/>
-            <a:ext cx="2209800" cy="461665"/>
+            <a:off x="1828800" y="2999601"/>
+            <a:ext cx="2743200" cy="276999"/>
           </a:xfrm>
           <a:prstGeom prst="rect">
             <a:avLst/>
@@ -8061,7 +8038,23 @@
                   <a:srgbClr val="000000"/>
                 </a:solidFill>
               </a:rPr>
-              <a:t>2.) Click button or  context menu</a:t>
+              <a:t>2.) Click </a:t>
+            </a:r>
+            <a:r>
+              <a:rPr lang="en-US" sz="1200" dirty="0" smtClean="0">
+                <a:solidFill>
+                  <a:srgbClr val="000000"/>
+                </a:solidFill>
+              </a:rPr>
+              <a:t>toolbar button </a:t>
+            </a:r>
+            <a:r>
+              <a:rPr lang="en-US" sz="1200" dirty="0" smtClean="0">
+                <a:solidFill>
+                  <a:srgbClr val="000000"/>
+                </a:solidFill>
+              </a:rPr>
+              <a:t>or  context menu</a:t>
             </a:r>
           </a:p>
         </p:txBody>
@@ -8074,7 +8067,7 @@
         </p:nvSpPr>
         <p:spPr>
           <a:xfrm>
-            <a:off x="4267200" y="3086100"/>
+            <a:off x="4267200" y="2999601"/>
             <a:ext cx="2209800" cy="276999"/>
           </a:xfrm>
           <a:prstGeom prst="rect">
@@ -8108,7 +8101,7 @@
         </p:nvSpPr>
         <p:spPr>
           <a:xfrm>
-            <a:off x="6477000" y="3086100"/>
+            <a:off x="6477000" y="2999601"/>
             <a:ext cx="2209800" cy="276999"/>
           </a:xfrm>
           <a:prstGeom prst="rect">
@@ -8212,15 +8205,7 @@
                   <a:srgbClr val="000000"/>
                 </a:solidFill>
               </a:rPr>
-              <a:t>Claim </a:t>
-            </a:r>
-            <a:r>
-              <a:rPr lang="en-US" sz="1600" dirty="0" smtClean="0">
-                <a:solidFill>
-                  <a:srgbClr val="000000"/>
-                </a:solidFill>
-              </a:rPr>
-              <a:t>Browser</a:t>
+              <a:t>Claim Browser</a:t>
             </a:r>
           </a:p>
         </p:txBody>

</xml_diff>

<commit_message>
Submitted version. Minor changes
</commit_message>
<xml_diff>
--- a/papers/diagrams.pptx
+++ b/papers/diagrams.pptx
@@ -5794,7 +5794,7 @@
           <a:lstStyle/>
           <a:p>
             <a:r>
-              <a:rPr lang="en-US" sz="1200" dirty="0" smtClean="0">
+              <a:rPr lang="en-US" sz="1200" b="1" dirty="0" smtClean="0">
                 <a:solidFill>
                   <a:srgbClr val="000000"/>
                 </a:solidFill>
@@ -5827,7 +5827,7 @@
           <a:lstStyle/>
           <a:p>
             <a:r>
-              <a:rPr lang="en-US" sz="1200" dirty="0" smtClean="0">
+              <a:rPr lang="en-US" sz="1200" b="1" dirty="0" smtClean="0">
                 <a:solidFill>
                   <a:srgbClr val="000000"/>
                 </a:solidFill>
@@ -5835,14 +5835,14 @@
               <a:t>Electric cars emit less carbon dioxide than</a:t>
             </a:r>
             <a:br>
-              <a:rPr lang="en-US" sz="1200" dirty="0" smtClean="0">
+              <a:rPr lang="en-US" sz="1200" b="1" dirty="0" smtClean="0">
                 <a:solidFill>
                   <a:srgbClr val="000000"/>
                 </a:solidFill>
               </a:rPr>
             </a:br>
             <a:r>
-              <a:rPr lang="en-US" sz="1200" dirty="0" smtClean="0">
+              <a:rPr lang="en-US" sz="1200" b="1" dirty="0" smtClean="0">
                 <a:solidFill>
                   <a:srgbClr val="000000"/>
                 </a:solidFill>
@@ -5875,7 +5875,7 @@
           <a:lstStyle/>
           <a:p>
             <a:r>
-              <a:rPr lang="en-US" sz="1200" dirty="0" smtClean="0">
+              <a:rPr lang="en-US" sz="1200" b="1" dirty="0" smtClean="0">
                 <a:solidFill>
                   <a:srgbClr val="000000"/>
                 </a:solidFill>
@@ -5917,13 +5917,7 @@
           <a:p>
             <a:pPr algn="ctr" eaLnBrk="0" hangingPunct="0"/>
             <a:r>
-              <a:rPr lang="en-US" sz="1200" i="1" dirty="0">
-                <a:solidFill>
-                  <a:schemeClr val="tx2">
-                    <a:lumMod val="75000"/>
-                  </a:schemeClr>
-                </a:solidFill>
-              </a:rPr>
+              <a:rPr lang="en-US" sz="1200" i="1" dirty="0"/>
               <a:t>supports</a:t>
             </a:r>
           </a:p>
@@ -6035,22 +6029,10 @@
           <a:p>
             <a:pPr algn="ctr" eaLnBrk="0" hangingPunct="0"/>
             <a:r>
-              <a:rPr lang="en-US" sz="1200" i="1" dirty="0" smtClean="0">
-                <a:solidFill>
-                  <a:schemeClr val="tx2">
-                    <a:lumMod val="75000"/>
-                  </a:schemeClr>
-                </a:solidFill>
-              </a:rPr>
+              <a:rPr lang="en-US" sz="1200" i="1" dirty="0" smtClean="0"/>
               <a:t>opposes</a:t>
             </a:r>
-            <a:endParaRPr lang="en-US" sz="1200" i="1" dirty="0">
-              <a:solidFill>
-                <a:schemeClr val="tx2">
-                  <a:lumMod val="75000"/>
-                </a:schemeClr>
-              </a:solidFill>
-            </a:endParaRPr>
+            <a:endParaRPr lang="en-US" sz="1200" i="1" dirty="0"/>
           </a:p>
         </p:txBody>
       </p:sp>
@@ -6070,7 +6052,7 @@
         </p:blipFill>
         <p:spPr>
           <a:xfrm>
-            <a:off x="304800" y="4191000"/>
+            <a:off x="762000" y="4419600"/>
             <a:ext cx="1946189" cy="533400"/>
           </a:xfrm>
           <a:prstGeom prst="rect">
@@ -6089,16 +6071,17 @@
         </p:nvCxnSpPr>
         <p:spPr>
           <a:xfrm rot="5400000" flipH="1" flipV="1">
-            <a:off x="1464956" y="3293757"/>
-            <a:ext cx="710182" cy="1084305"/>
+            <a:off x="1579256" y="3636657"/>
+            <a:ext cx="938782" cy="627105"/>
           </a:xfrm>
           <a:prstGeom prst="curvedConnector2">
             <a:avLst/>
           </a:prstGeom>
-          <a:ln>
+          <a:ln w="19050">
             <a:solidFill>
-              <a:schemeClr val="bg1">
-                <a:lumMod val="65000"/>
+              <a:schemeClr val="tx1">
+                <a:lumMod val="50000"/>
+                <a:lumOff val="50000"/>
               </a:schemeClr>
             </a:solidFill>
             <a:tailEnd type="arrow"/>
@@ -6129,7 +6112,7 @@
         </p:nvSpPr>
         <p:spPr bwMode="auto">
           <a:xfrm>
-            <a:off x="990600" y="3581400"/>
+            <a:off x="1295400" y="3733800"/>
             <a:ext cx="579006" cy="276999"/>
           </a:xfrm>
           <a:prstGeom prst="rect">
@@ -6151,22 +6134,10 @@
           <a:p>
             <a:pPr algn="ctr" eaLnBrk="0" hangingPunct="0"/>
             <a:r>
-              <a:rPr lang="en-US" sz="1200" i="1" dirty="0" smtClean="0">
-                <a:solidFill>
-                  <a:schemeClr val="tx2">
-                    <a:lumMod val="75000"/>
-                  </a:schemeClr>
-                </a:solidFill>
-              </a:rPr>
+              <a:rPr lang="en-US" sz="1200" i="1" dirty="0" smtClean="0"/>
               <a:t>claims</a:t>
             </a:r>
-            <a:endParaRPr lang="en-US" sz="1200" i="1" dirty="0">
-              <a:solidFill>
-                <a:schemeClr val="tx2">
-                  <a:lumMod val="75000"/>
-                </a:schemeClr>
-              </a:solidFill>
-            </a:endParaRPr>
+            <a:endParaRPr lang="en-US" sz="1200" i="1" dirty="0"/>
           </a:p>
         </p:txBody>
       </p:sp>
@@ -6186,7 +6157,7 @@
         </p:blipFill>
         <p:spPr>
           <a:xfrm>
-            <a:off x="6324600" y="3810000"/>
+            <a:off x="5943600" y="3886200"/>
             <a:ext cx="825302" cy="1561471"/>
           </a:xfrm>
           <a:prstGeom prst="rect">
@@ -6206,15 +6177,16 @@
         <p:spPr>
           <a:xfrm rot="10800000">
             <a:off x="4367784" y="3437932"/>
-            <a:ext cx="1956816" cy="1152804"/>
+            <a:ext cx="1575816" cy="1229004"/>
           </a:xfrm>
           <a:prstGeom prst="curvedConnector2">
             <a:avLst/>
           </a:prstGeom>
-          <a:ln>
+          <a:ln w="19050">
             <a:solidFill>
-              <a:schemeClr val="bg1">
-                <a:lumMod val="65000"/>
+              <a:schemeClr val="tx1">
+                <a:lumMod val="50000"/>
+                <a:lumOff val="50000"/>
               </a:schemeClr>
             </a:solidFill>
             <a:tailEnd type="arrow"/>
@@ -6245,7 +6217,7 @@
         </p:nvSpPr>
         <p:spPr bwMode="auto">
           <a:xfrm>
-            <a:off x="5181600" y="4495800"/>
+            <a:off x="4724400" y="4447401"/>
             <a:ext cx="579006" cy="276999"/>
           </a:xfrm>
           <a:prstGeom prst="rect">
@@ -6267,22 +6239,10 @@
           <a:p>
             <a:pPr algn="ctr" eaLnBrk="0" hangingPunct="0"/>
             <a:r>
-              <a:rPr lang="en-US" sz="1200" i="1" dirty="0" smtClean="0">
-                <a:solidFill>
-                  <a:schemeClr val="tx2">
-                    <a:lumMod val="75000"/>
-                  </a:schemeClr>
-                </a:solidFill>
-              </a:rPr>
+              <a:rPr lang="en-US" sz="1200" i="1" dirty="0" smtClean="0"/>
               <a:t>claims</a:t>
             </a:r>
-            <a:endParaRPr lang="en-US" sz="1200" i="1" dirty="0">
-              <a:solidFill>
-                <a:schemeClr val="tx2">
-                  <a:lumMod val="75000"/>
-                </a:schemeClr>
-              </a:solidFill>
-            </a:endParaRPr>
+            <a:endParaRPr lang="en-US" sz="1200" i="1" dirty="0"/>
           </a:p>
         </p:txBody>
       </p:sp>
@@ -6329,10 +6289,11 @@
               <a:gd name="adj1" fmla="val 50000"/>
             </a:avLst>
           </a:prstGeom>
-          <a:ln>
+          <a:ln w="19050">
             <a:solidFill>
-              <a:schemeClr val="bg1">
-                <a:lumMod val="65000"/>
+              <a:schemeClr val="tx1">
+                <a:lumMod val="50000"/>
+                <a:lumOff val="50000"/>
               </a:schemeClr>
             </a:solidFill>
             <a:tailEnd type="arrow"/>
@@ -6385,22 +6346,10 @@
           <a:p>
             <a:pPr algn="ctr" eaLnBrk="0" hangingPunct="0"/>
             <a:r>
-              <a:rPr lang="en-US" sz="1200" i="1" dirty="0" smtClean="0">
-                <a:solidFill>
-                  <a:schemeClr val="tx2">
-                    <a:lumMod val="75000"/>
-                  </a:schemeClr>
-                </a:solidFill>
-              </a:rPr>
+              <a:rPr lang="en-US" sz="1200" i="1" dirty="0" smtClean="0"/>
               <a:t>claims</a:t>
             </a:r>
-            <a:endParaRPr lang="en-US" sz="1200" i="1" dirty="0">
-              <a:solidFill>
-                <a:schemeClr val="tx2">
-                  <a:lumMod val="75000"/>
-                </a:schemeClr>
-              </a:solidFill>
-            </a:endParaRPr>
+            <a:endParaRPr lang="en-US" sz="1200" i="1" dirty="0"/>
           </a:p>
         </p:txBody>
       </p:sp>
@@ -6420,8 +6369,8 @@
         </p:blipFill>
         <p:spPr>
           <a:xfrm>
-            <a:off x="381000" y="1371600"/>
-            <a:ext cx="1752600" cy="534250"/>
+            <a:off x="821654" y="1295400"/>
+            <a:ext cx="1692946" cy="516065"/>
           </a:xfrm>
           <a:prstGeom prst="rect">
             <a:avLst/>
@@ -6439,18 +6388,19 @@
         </p:nvCxnSpPr>
         <p:spPr>
           <a:xfrm>
-            <a:off x="2133600" y="1638725"/>
-            <a:ext cx="1295400" cy="405963"/>
+            <a:off x="2514600" y="1553433"/>
+            <a:ext cx="914400" cy="491255"/>
           </a:xfrm>
           <a:prstGeom prst="curvedConnector3">
             <a:avLst>
               <a:gd name="adj1" fmla="val 50000"/>
             </a:avLst>
           </a:prstGeom>
-          <a:ln>
+          <a:ln w="19050">
             <a:solidFill>
-              <a:schemeClr val="bg1">
-                <a:lumMod val="65000"/>
+              <a:schemeClr val="tx1">
+                <a:lumMod val="50000"/>
+                <a:lumOff val="50000"/>
               </a:schemeClr>
             </a:solidFill>
             <a:tailEnd type="arrow"/>
@@ -6481,7 +6431,7 @@
         </p:nvSpPr>
         <p:spPr bwMode="auto">
           <a:xfrm>
-            <a:off x="2240394" y="1399401"/>
+            <a:off x="2590800" y="1295400"/>
             <a:ext cx="579006" cy="276999"/>
           </a:xfrm>
           <a:prstGeom prst="rect">
@@ -6503,22 +6453,10 @@
           <a:p>
             <a:pPr algn="ctr" eaLnBrk="0" hangingPunct="0"/>
             <a:r>
-              <a:rPr lang="en-US" sz="1200" i="1" dirty="0" smtClean="0">
-                <a:solidFill>
-                  <a:schemeClr val="tx2">
-                    <a:lumMod val="75000"/>
-                  </a:schemeClr>
-                </a:solidFill>
-              </a:rPr>
+              <a:rPr lang="en-US" sz="1200" i="1" dirty="0" smtClean="0"/>
               <a:t>claims</a:t>
             </a:r>
-            <a:endParaRPr lang="en-US" sz="1200" i="1" dirty="0">
-              <a:solidFill>
-                <a:schemeClr val="tx2">
-                  <a:lumMod val="75000"/>
-                </a:schemeClr>
-              </a:solidFill>
-            </a:endParaRPr>
+            <a:endParaRPr lang="en-US" sz="1200" i="1" dirty="0"/>
           </a:p>
         </p:txBody>
       </p:sp>
@@ -8038,23 +7976,7 @@
                   <a:srgbClr val="000000"/>
                 </a:solidFill>
               </a:rPr>
-              <a:t>2.) Click </a:t>
-            </a:r>
-            <a:r>
-              <a:rPr lang="en-US" sz="1200" dirty="0" smtClean="0">
-                <a:solidFill>
-                  <a:srgbClr val="000000"/>
-                </a:solidFill>
-              </a:rPr>
-              <a:t>toolbar button </a:t>
-            </a:r>
-            <a:r>
-              <a:rPr lang="en-US" sz="1200" dirty="0" smtClean="0">
-                <a:solidFill>
-                  <a:srgbClr val="000000"/>
-                </a:solidFill>
-              </a:rPr>
-              <a:t>or  context menu</a:t>
+              <a:t>2.) Click toolbar button or  context menu</a:t>
             </a:r>
           </a:p>
         </p:txBody>

</xml_diff>

<commit_message>
New paper for CSCW workshop
</commit_message>
<xml_diff>
--- a/papers/diagrams.pptx
+++ b/papers/diagrams.pptx
@@ -19,6 +19,9 @@
     <p:sldId id="268" r:id="rId13"/>
     <p:sldId id="266" r:id="rId14"/>
     <p:sldId id="267" r:id="rId15"/>
+    <p:sldId id="270" r:id="rId16"/>
+    <p:sldId id="271" r:id="rId17"/>
+    <p:sldId id="272" r:id="rId18"/>
   </p:sldIdLst>
   <p:sldSz cx="9144000" cy="6858000" type="screen4x3"/>
   <p:notesSz cx="6858000" cy="9144000"/>
@@ -6711,6 +6714,1718 @@
 </p:sld>
 </file>
 
+<file path=ppt/slides/slide15.xml><?xml version="1.0" encoding="utf-8"?>
+<p:sld xmlns:a="http://schemas.openxmlformats.org/drawingml/2006/main" xmlns:r="http://schemas.openxmlformats.org/officeDocument/2006/relationships" xmlns:p="http://schemas.openxmlformats.org/presentationml/2006/main">
+  <p:cSld>
+    <p:spTree>
+      <p:nvGrpSpPr>
+        <p:cNvPr id="1" name=""/>
+        <p:cNvGrpSpPr/>
+        <p:nvPr/>
+      </p:nvGrpSpPr>
+      <p:grpSpPr>
+        <a:xfrm>
+          <a:off x="0" y="0"/>
+          <a:ext cx="0" cy="0"/>
+          <a:chOff x="0" y="0"/>
+          <a:chExt cx="0" cy="0"/>
+        </a:xfrm>
+      </p:grpSpPr>
+    </p:spTree>
+  </p:cSld>
+  <p:clrMapOvr>
+    <a:masterClrMapping/>
+  </p:clrMapOvr>
+</p:sld>
+</file>
+
+<file path=ppt/slides/slide16.xml><?xml version="1.0" encoding="utf-8"?>
+<p:sld xmlns:a="http://schemas.openxmlformats.org/drawingml/2006/main" xmlns:r="http://schemas.openxmlformats.org/officeDocument/2006/relationships" xmlns:p="http://schemas.openxmlformats.org/presentationml/2006/main">
+  <p:cSld>
+    <p:spTree>
+      <p:nvGrpSpPr>
+        <p:cNvPr id="1" name=""/>
+        <p:cNvGrpSpPr/>
+        <p:nvPr/>
+      </p:nvGrpSpPr>
+      <p:grpSpPr>
+        <a:xfrm>
+          <a:off x="0" y="0"/>
+          <a:ext cx="0" cy="0"/>
+          <a:chOff x="0" y="0"/>
+          <a:chExt cx="0" cy="0"/>
+        </a:xfrm>
+      </p:grpSpPr>
+      <p:pic>
+        <p:nvPicPr>
+          <p:cNvPr id="10244" name="Picture 5" descr="cnn_map2.png"/>
+          <p:cNvPicPr>
+            <a:picLocks noChangeAspect="1"/>
+          </p:cNvPicPr>
+          <p:nvPr/>
+        </p:nvPicPr>
+        <p:blipFill>
+          <a:blip r:embed="rId2"/>
+          <a:srcRect/>
+          <a:stretch>
+            <a:fillRect/>
+          </a:stretch>
+        </p:blipFill>
+        <p:spPr bwMode="auto">
+          <a:xfrm>
+            <a:off x="2971800" y="1295400"/>
+            <a:ext cx="4029075" cy="3467100"/>
+          </a:xfrm>
+          <a:prstGeom prst="rect">
+            <a:avLst/>
+          </a:prstGeom>
+          <a:noFill/>
+          <a:ln w="9525">
+            <a:noFill/>
+            <a:miter lim="800000"/>
+            <a:headEnd/>
+            <a:tailEnd/>
+          </a:ln>
+        </p:spPr>
+      </p:pic>
+      <p:sp>
+        <p:nvSpPr>
+          <p:cNvPr id="10246" name="TextBox 9"/>
+          <p:cNvSpPr txBox="1">
+            <a:spLocks noChangeArrowheads="1"/>
+          </p:cNvSpPr>
+          <p:nvPr/>
+        </p:nvSpPr>
+        <p:spPr bwMode="auto">
+          <a:xfrm>
+            <a:off x="3303588" y="4933950"/>
+            <a:ext cx="2960687" cy="338137"/>
+          </a:xfrm>
+          <a:prstGeom prst="rect">
+            <a:avLst/>
+          </a:prstGeom>
+          <a:noFill/>
+          <a:ln w="9525">
+            <a:noFill/>
+            <a:miter lim="800000"/>
+            <a:headEnd/>
+            <a:tailEnd/>
+          </a:ln>
+        </p:spPr>
+        <p:txBody>
+          <a:bodyPr wrap="none">
+            <a:spAutoFit/>
+          </a:bodyPr>
+          <a:lstStyle/>
+          <a:p>
+            <a:pPr eaLnBrk="0" hangingPunct="0"/>
+            <a:r>
+              <a:rPr lang="en-US" sz="1600"/>
+              <a:t>Additional content inserted</a:t>
+            </a:r>
+            <a:endParaRPr lang="en-US" sz="1600">
+              <a:solidFill>
+                <a:srgbClr val="4D4D4D"/>
+              </a:solidFill>
+            </a:endParaRPr>
+          </a:p>
+        </p:txBody>
+      </p:sp>
+      <p:cxnSp>
+        <p:nvCxnSpPr>
+          <p:cNvPr id="10247" name="Straight Connector 13"/>
+          <p:cNvCxnSpPr>
+            <a:cxnSpLocks noChangeShapeType="1"/>
+          </p:cNvCxnSpPr>
+          <p:nvPr/>
+        </p:nvCxnSpPr>
+        <p:spPr bwMode="auto">
+          <a:xfrm rot="5400000">
+            <a:off x="3880645" y="4455318"/>
+            <a:ext cx="1116012" cy="3175"/>
+          </a:xfrm>
+          <a:prstGeom prst="line">
+            <a:avLst/>
+          </a:prstGeom>
+          <a:noFill/>
+          <a:ln w="50800" algn="ctr">
+            <a:solidFill>
+              <a:schemeClr val="tx1"/>
+            </a:solidFill>
+            <a:round/>
+            <a:headEnd/>
+            <a:tailEnd/>
+          </a:ln>
+        </p:spPr>
+      </p:cxnSp>
+      <p:cxnSp>
+        <p:nvCxnSpPr>
+          <p:cNvPr id="10248" name="Straight Connector 20"/>
+          <p:cNvCxnSpPr>
+            <a:cxnSpLocks noChangeShapeType="1"/>
+          </p:cNvCxnSpPr>
+          <p:nvPr/>
+        </p:nvCxnSpPr>
+        <p:spPr bwMode="auto">
+          <a:xfrm rot="5400000">
+            <a:off x="3799681" y="1408906"/>
+            <a:ext cx="512763" cy="3175"/>
+          </a:xfrm>
+          <a:prstGeom prst="line">
+            <a:avLst/>
+          </a:prstGeom>
+          <a:noFill/>
+          <a:ln w="50800" algn="ctr">
+            <a:solidFill>
+              <a:schemeClr val="tx1"/>
+            </a:solidFill>
+            <a:round/>
+            <a:headEnd/>
+            <a:tailEnd/>
+          </a:ln>
+        </p:spPr>
+      </p:cxnSp>
+      <p:sp>
+        <p:nvSpPr>
+          <p:cNvPr id="10249" name="TextBox 22"/>
+          <p:cNvSpPr txBox="1">
+            <a:spLocks noChangeArrowheads="1"/>
+          </p:cNvSpPr>
+          <p:nvPr/>
+        </p:nvSpPr>
+        <p:spPr bwMode="auto">
+          <a:xfrm>
+            <a:off x="3124200" y="846137"/>
+            <a:ext cx="2034403" cy="338554"/>
+          </a:xfrm>
+          <a:prstGeom prst="rect">
+            <a:avLst/>
+          </a:prstGeom>
+          <a:noFill/>
+          <a:ln w="9525">
+            <a:noFill/>
+            <a:miter lim="800000"/>
+            <a:headEnd/>
+            <a:tailEnd/>
+          </a:ln>
+        </p:spPr>
+        <p:txBody>
+          <a:bodyPr wrap="none">
+            <a:spAutoFit/>
+          </a:bodyPr>
+          <a:lstStyle/>
+          <a:p>
+            <a:pPr eaLnBrk="0" hangingPunct="0"/>
+            <a:r>
+              <a:rPr lang="en-US" sz="1600" smtClean="0"/>
+              <a:t>Improvement Enabled</a:t>
+            </a:r>
+            <a:endParaRPr lang="en-US" sz="1600" dirty="0">
+              <a:solidFill>
+                <a:srgbClr val="4D4D4D"/>
+              </a:solidFill>
+            </a:endParaRPr>
+          </a:p>
+        </p:txBody>
+      </p:sp>
+    </p:spTree>
+  </p:cSld>
+  <p:clrMapOvr>
+    <a:masterClrMapping/>
+  </p:clrMapOvr>
+</p:sld>
+</file>
+
+<file path=ppt/slides/slide17.xml><?xml version="1.0" encoding="utf-8"?>
+<p:sld xmlns:a="http://schemas.openxmlformats.org/drawingml/2006/main" xmlns:r="http://schemas.openxmlformats.org/officeDocument/2006/relationships" xmlns:p="http://schemas.openxmlformats.org/presentationml/2006/main">
+  <p:cSld>
+    <p:spTree>
+      <p:nvGrpSpPr>
+        <p:cNvPr id="1" name=""/>
+        <p:cNvGrpSpPr/>
+        <p:nvPr/>
+      </p:nvGrpSpPr>
+      <p:grpSpPr>
+        <a:xfrm>
+          <a:off x="0" y="0"/>
+          <a:ext cx="0" cy="0"/>
+          <a:chOff x="0" y="0"/>
+          <a:chExt cx="0" cy="0"/>
+        </a:xfrm>
+      </p:grpSpPr>
+      <p:grpSp>
+        <p:nvGrpSpPr>
+          <p:cNvPr id="2" name="Group 107"/>
+          <p:cNvGrpSpPr>
+            <a:grpSpLocks/>
+          </p:cNvGrpSpPr>
+          <p:nvPr/>
+        </p:nvGrpSpPr>
+        <p:grpSpPr bwMode="auto">
+          <a:xfrm>
+            <a:off x="1606550" y="3065463"/>
+            <a:ext cx="1068388" cy="369887"/>
+            <a:chOff x="1611598" y="1952025"/>
+            <a:chExt cx="1068388" cy="369800"/>
+          </a:xfrm>
+        </p:grpSpPr>
+        <p:cxnSp>
+          <p:nvCxnSpPr>
+            <p:cNvPr id="23589" name="Straight Connector 108"/>
+            <p:cNvCxnSpPr>
+              <a:cxnSpLocks noChangeShapeType="1"/>
+            </p:cNvCxnSpPr>
+            <p:nvPr/>
+          </p:nvCxnSpPr>
+          <p:spPr bwMode="auto">
+            <a:xfrm rot="5400000">
+              <a:off x="1427889" y="2136528"/>
+              <a:ext cx="369006" cy="1588"/>
+            </a:xfrm>
+            <a:prstGeom prst="line">
+              <a:avLst/>
+            </a:prstGeom>
+            <a:noFill/>
+            <a:ln w="50800" algn="ctr">
+              <a:solidFill>
+                <a:schemeClr val="tx1"/>
+              </a:solidFill>
+              <a:round/>
+              <a:headEnd/>
+              <a:tailEnd/>
+            </a:ln>
+          </p:spPr>
+        </p:cxnSp>
+        <p:cxnSp>
+          <p:nvCxnSpPr>
+            <p:cNvPr id="23590" name="Straight Connector 109"/>
+            <p:cNvCxnSpPr>
+              <a:cxnSpLocks noChangeShapeType="1"/>
+            </p:cNvCxnSpPr>
+            <p:nvPr/>
+          </p:nvCxnSpPr>
+          <p:spPr bwMode="auto">
+            <a:xfrm rot="16200000" flipH="1">
+              <a:off x="1694589" y="1869828"/>
+              <a:ext cx="369006" cy="533400"/>
+            </a:xfrm>
+            <a:prstGeom prst="line">
+              <a:avLst/>
+            </a:prstGeom>
+            <a:noFill/>
+            <a:ln w="50800" algn="ctr">
+              <a:solidFill>
+                <a:schemeClr val="tx1"/>
+              </a:solidFill>
+              <a:round/>
+              <a:headEnd/>
+              <a:tailEnd/>
+            </a:ln>
+          </p:spPr>
+        </p:cxnSp>
+        <p:cxnSp>
+          <p:nvCxnSpPr>
+            <p:cNvPr id="23591" name="Straight Connector 110"/>
+            <p:cNvCxnSpPr>
+              <a:cxnSpLocks noChangeShapeType="1"/>
+            </p:cNvCxnSpPr>
+            <p:nvPr/>
+          </p:nvCxnSpPr>
+          <p:spPr bwMode="auto">
+            <a:xfrm rot="16200000" flipH="1">
+              <a:off x="1961289" y="1603128"/>
+              <a:ext cx="369006" cy="1066800"/>
+            </a:xfrm>
+            <a:prstGeom prst="line">
+              <a:avLst/>
+            </a:prstGeom>
+            <a:noFill/>
+            <a:ln w="50800" algn="ctr">
+              <a:solidFill>
+                <a:schemeClr val="tx1"/>
+              </a:solidFill>
+              <a:round/>
+              <a:headEnd/>
+              <a:tailEnd/>
+            </a:ln>
+          </p:spPr>
+        </p:cxnSp>
+        <p:cxnSp>
+          <p:nvCxnSpPr>
+            <p:cNvPr id="23592" name="Straight Connector 111"/>
+            <p:cNvCxnSpPr>
+              <a:cxnSpLocks noChangeShapeType="1"/>
+            </p:cNvCxnSpPr>
+            <p:nvPr/>
+          </p:nvCxnSpPr>
+          <p:spPr bwMode="auto">
+            <a:xfrm rot="5400000" flipH="1" flipV="1">
+              <a:off x="2227989" y="1869828"/>
+              <a:ext cx="369006" cy="533400"/>
+            </a:xfrm>
+            <a:prstGeom prst="line">
+              <a:avLst/>
+            </a:prstGeom>
+            <a:noFill/>
+            <a:ln w="50800" algn="ctr">
+              <a:solidFill>
+                <a:schemeClr val="tx1"/>
+              </a:solidFill>
+              <a:round/>
+              <a:headEnd/>
+              <a:tailEnd/>
+            </a:ln>
+          </p:spPr>
+        </p:cxnSp>
+        <p:cxnSp>
+          <p:nvCxnSpPr>
+            <p:cNvPr id="23593" name="Straight Connector 112"/>
+            <p:cNvCxnSpPr>
+              <a:cxnSpLocks noChangeShapeType="1"/>
+            </p:cNvCxnSpPr>
+            <p:nvPr/>
+          </p:nvCxnSpPr>
+          <p:spPr bwMode="auto">
+            <a:xfrm rot="16200000" flipH="1">
+              <a:off x="2227989" y="1869828"/>
+              <a:ext cx="369006" cy="533400"/>
+            </a:xfrm>
+            <a:prstGeom prst="line">
+              <a:avLst/>
+            </a:prstGeom>
+            <a:noFill/>
+            <a:ln w="50800" algn="ctr">
+              <a:solidFill>
+                <a:schemeClr val="tx1"/>
+              </a:solidFill>
+              <a:round/>
+              <a:headEnd/>
+              <a:tailEnd/>
+            </a:ln>
+          </p:spPr>
+        </p:cxnSp>
+        <p:cxnSp>
+          <p:nvCxnSpPr>
+            <p:cNvPr id="23594" name="Straight Connector 113"/>
+            <p:cNvCxnSpPr>
+              <a:cxnSpLocks noChangeShapeType="1"/>
+            </p:cNvCxnSpPr>
+            <p:nvPr/>
+          </p:nvCxnSpPr>
+          <p:spPr bwMode="auto">
+            <a:xfrm rot="5400000">
+              <a:off x="1694589" y="1869828"/>
+              <a:ext cx="369006" cy="533400"/>
+            </a:xfrm>
+            <a:prstGeom prst="line">
+              <a:avLst/>
+            </a:prstGeom>
+            <a:noFill/>
+            <a:ln w="50800" algn="ctr">
+              <a:solidFill>
+                <a:schemeClr val="tx1"/>
+              </a:solidFill>
+              <a:round/>
+              <a:headEnd/>
+              <a:tailEnd/>
+            </a:ln>
+          </p:spPr>
+        </p:cxnSp>
+        <p:cxnSp>
+          <p:nvCxnSpPr>
+            <p:cNvPr id="23595" name="Straight Connector 114"/>
+            <p:cNvCxnSpPr>
+              <a:cxnSpLocks noChangeShapeType="1"/>
+            </p:cNvCxnSpPr>
+            <p:nvPr/>
+          </p:nvCxnSpPr>
+          <p:spPr bwMode="auto">
+            <a:xfrm rot="5400000">
+              <a:off x="1961289" y="2136528"/>
+              <a:ext cx="369006" cy="1588"/>
+            </a:xfrm>
+            <a:prstGeom prst="line">
+              <a:avLst/>
+            </a:prstGeom>
+            <a:noFill/>
+            <a:ln w="50800" algn="ctr">
+              <a:solidFill>
+                <a:schemeClr val="tx1"/>
+              </a:solidFill>
+              <a:round/>
+              <a:headEnd/>
+              <a:tailEnd/>
+            </a:ln>
+          </p:spPr>
+        </p:cxnSp>
+        <p:cxnSp>
+          <p:nvCxnSpPr>
+            <p:cNvPr id="23596" name="Straight Connector 115"/>
+            <p:cNvCxnSpPr>
+              <a:cxnSpLocks noChangeShapeType="1"/>
+            </p:cNvCxnSpPr>
+            <p:nvPr/>
+          </p:nvCxnSpPr>
+          <p:spPr bwMode="auto">
+            <a:xfrm rot="5400000" flipH="1" flipV="1">
+              <a:off x="1961289" y="1603128"/>
+              <a:ext cx="369006" cy="1066800"/>
+            </a:xfrm>
+            <a:prstGeom prst="line">
+              <a:avLst/>
+            </a:prstGeom>
+            <a:noFill/>
+            <a:ln w="50800" algn="ctr">
+              <a:solidFill>
+                <a:schemeClr val="tx1"/>
+              </a:solidFill>
+              <a:round/>
+              <a:headEnd/>
+              <a:tailEnd/>
+            </a:ln>
+          </p:spPr>
+        </p:cxnSp>
+        <p:cxnSp>
+          <p:nvCxnSpPr>
+            <p:cNvPr id="23597" name="Straight Connector 116"/>
+            <p:cNvCxnSpPr>
+              <a:cxnSpLocks noChangeShapeType="1"/>
+            </p:cNvCxnSpPr>
+            <p:nvPr/>
+          </p:nvCxnSpPr>
+          <p:spPr bwMode="auto">
+            <a:xfrm rot="5400000">
+              <a:off x="2494689" y="2136528"/>
+              <a:ext cx="369006" cy="1588"/>
+            </a:xfrm>
+            <a:prstGeom prst="line">
+              <a:avLst/>
+            </a:prstGeom>
+            <a:noFill/>
+            <a:ln w="50800" algn="ctr">
+              <a:solidFill>
+                <a:schemeClr val="tx1"/>
+              </a:solidFill>
+              <a:round/>
+              <a:headEnd/>
+              <a:tailEnd/>
+            </a:ln>
+          </p:spPr>
+        </p:cxnSp>
+      </p:grpSp>
+      <p:sp>
+        <p:nvSpPr>
+          <p:cNvPr id="23556" name="TextBox 21"/>
+          <p:cNvSpPr txBox="1">
+            <a:spLocks noChangeArrowheads="1"/>
+          </p:cNvSpPr>
+          <p:nvPr/>
+        </p:nvSpPr>
+        <p:spPr bwMode="auto">
+          <a:xfrm>
+            <a:off x="3074988" y="3505200"/>
+            <a:ext cx="4368632" cy="615553"/>
+          </a:xfrm>
+          <a:prstGeom prst="rect">
+            <a:avLst/>
+          </a:prstGeom>
+          <a:noFill/>
+          <a:ln w="9525">
+            <a:noFill/>
+            <a:miter lim="800000"/>
+            <a:headEnd/>
+            <a:tailEnd/>
+          </a:ln>
+        </p:spPr>
+        <p:txBody>
+          <a:bodyPr wrap="none">
+            <a:spAutoFit/>
+          </a:bodyPr>
+          <a:lstStyle/>
+          <a:p>
+            <a:pPr eaLnBrk="0" hangingPunct="0"/>
+            <a:r>
+              <a:rPr lang="en-US" b="1" dirty="0"/>
+              <a:t>Extractors</a:t>
+            </a:r>
+          </a:p>
+          <a:p>
+            <a:pPr eaLnBrk="0" hangingPunct="0"/>
+            <a:r>
+              <a:rPr lang="en-US" sz="1600" dirty="0"/>
+              <a:t>Extract meaning from web sites for use by widgets</a:t>
+            </a:r>
+          </a:p>
+        </p:txBody>
+      </p:sp>
+      <p:sp>
+        <p:nvSpPr>
+          <p:cNvPr id="23557" name="TextBox 22"/>
+          <p:cNvSpPr txBox="1">
+            <a:spLocks noChangeArrowheads="1"/>
+          </p:cNvSpPr>
+          <p:nvPr/>
+        </p:nvSpPr>
+        <p:spPr bwMode="auto">
+          <a:xfrm>
+            <a:off x="3074988" y="2403475"/>
+            <a:ext cx="4623317" cy="615553"/>
+          </a:xfrm>
+          <a:prstGeom prst="rect">
+            <a:avLst/>
+          </a:prstGeom>
+          <a:noFill/>
+          <a:ln w="9525">
+            <a:noFill/>
+            <a:miter lim="800000"/>
+            <a:headEnd/>
+            <a:tailEnd/>
+          </a:ln>
+        </p:spPr>
+        <p:txBody>
+          <a:bodyPr wrap="none">
+            <a:spAutoFit/>
+          </a:bodyPr>
+          <a:lstStyle/>
+          <a:p>
+            <a:pPr eaLnBrk="0" hangingPunct="0"/>
+            <a:r>
+              <a:rPr lang="en-US" b="1" dirty="0"/>
+              <a:t>Widgets</a:t>
+            </a:r>
+            <a:br>
+              <a:rPr lang="en-US" b="1" dirty="0"/>
+            </a:br>
+            <a:r>
+              <a:rPr lang="en-US" sz="1600" dirty="0"/>
+              <a:t>Mini-apps that manipulate, import, and visualize data</a:t>
+            </a:r>
+          </a:p>
+        </p:txBody>
+      </p:sp>
+      <p:sp>
+        <p:nvSpPr>
+          <p:cNvPr id="23558" name="TextBox 36"/>
+          <p:cNvSpPr txBox="1">
+            <a:spLocks noChangeArrowheads="1"/>
+          </p:cNvSpPr>
+          <p:nvPr/>
+        </p:nvSpPr>
+        <p:spPr bwMode="auto">
+          <a:xfrm>
+            <a:off x="3074988" y="1301750"/>
+            <a:ext cx="2405210" cy="615553"/>
+          </a:xfrm>
+          <a:prstGeom prst="rect">
+            <a:avLst/>
+          </a:prstGeom>
+          <a:noFill/>
+          <a:ln w="9525">
+            <a:noFill/>
+            <a:miter lim="800000"/>
+            <a:headEnd/>
+            <a:tailEnd/>
+          </a:ln>
+        </p:spPr>
+        <p:txBody>
+          <a:bodyPr wrap="none">
+            <a:spAutoFit/>
+          </a:bodyPr>
+          <a:lstStyle/>
+          <a:p>
+            <a:pPr eaLnBrk="0" hangingPunct="0"/>
+            <a:r>
+              <a:rPr lang="en-US" b="1" dirty="0"/>
+              <a:t>Mashups</a:t>
+            </a:r>
+            <a:r>
+              <a:rPr lang="en-US" dirty="0"/>
+              <a:t/>
+            </a:r>
+            <a:br>
+              <a:rPr lang="en-US" dirty="0"/>
+            </a:br>
+            <a:r>
+              <a:rPr lang="en-US" sz="1600" dirty="0"/>
+              <a:t>Combine Multiple Widgets</a:t>
+            </a:r>
+          </a:p>
+        </p:txBody>
+      </p:sp>
+      <p:sp>
+        <p:nvSpPr>
+          <p:cNvPr id="23559" name="TextBox 50"/>
+          <p:cNvSpPr txBox="1">
+            <a:spLocks noChangeArrowheads="1"/>
+          </p:cNvSpPr>
+          <p:nvPr/>
+        </p:nvSpPr>
+        <p:spPr bwMode="auto">
+          <a:xfrm>
+            <a:off x="3081338" y="4654550"/>
+            <a:ext cx="2921634" cy="615553"/>
+          </a:xfrm>
+          <a:prstGeom prst="rect">
+            <a:avLst/>
+          </a:prstGeom>
+          <a:noFill/>
+          <a:ln w="9525">
+            <a:noFill/>
+            <a:miter lim="800000"/>
+            <a:headEnd/>
+            <a:tailEnd/>
+          </a:ln>
+        </p:spPr>
+        <p:txBody>
+          <a:bodyPr wrap="none">
+            <a:spAutoFit/>
+          </a:bodyPr>
+          <a:lstStyle/>
+          <a:p>
+            <a:pPr eaLnBrk="0" hangingPunct="0"/>
+            <a:r>
+              <a:rPr lang="en-US" b="1" dirty="0"/>
+              <a:t>Web Sites</a:t>
+            </a:r>
+          </a:p>
+          <a:p>
+            <a:pPr eaLnBrk="0" hangingPunct="0"/>
+            <a:r>
+              <a:rPr lang="en-US" sz="1600" dirty="0"/>
+              <a:t>Provide information for mashups</a:t>
+            </a:r>
+          </a:p>
+        </p:txBody>
+      </p:sp>
+      <p:grpSp>
+        <p:nvGrpSpPr>
+          <p:cNvPr id="3" name="Group 56"/>
+          <p:cNvGrpSpPr>
+            <a:grpSpLocks/>
+          </p:cNvGrpSpPr>
+          <p:nvPr/>
+        </p:nvGrpSpPr>
+        <p:grpSpPr bwMode="auto">
+          <a:xfrm>
+            <a:off x="1425575" y="2320925"/>
+            <a:ext cx="1439863" cy="742950"/>
+            <a:chOff x="2408529" y="2627586"/>
+            <a:chExt cx="1440024" cy="743339"/>
+          </a:xfrm>
+        </p:grpSpPr>
+        <p:sp>
+          <p:nvSpPr>
+            <p:cNvPr id="35" name="Rectangle 34"/>
+            <p:cNvSpPr/>
+            <p:nvPr/>
+          </p:nvSpPr>
+          <p:spPr bwMode="auto">
+            <a:xfrm>
+              <a:off x="2408529" y="2627586"/>
+              <a:ext cx="373105" cy="743339"/>
+            </a:xfrm>
+            <a:prstGeom prst="rect">
+              <a:avLst/>
+            </a:prstGeom>
+            <a:solidFill>
+              <a:schemeClr val="bg1">
+                <a:lumMod val="85000"/>
+              </a:schemeClr>
+            </a:solidFill>
+            <a:ln w="50800" cap="flat" cmpd="sng" algn="ctr">
+              <a:solidFill>
+                <a:srgbClr val="4D4D4D"/>
+              </a:solidFill>
+              <a:prstDash val="solid"/>
+              <a:round/>
+              <a:headEnd type="none" w="med" len="med"/>
+              <a:tailEnd type="none" w="med" len="med"/>
+            </a:ln>
+            <a:effectLst>
+              <a:outerShdw blurRad="50800" dist="38100" dir="2700000" algn="tl" rotWithShape="0">
+                <a:prstClr val="black">
+                  <a:alpha val="40000"/>
+                </a:prstClr>
+              </a:outerShdw>
+            </a:effectLst>
+          </p:spPr>
+          <p:txBody>
+            <a:bodyPr wrap="none" anchor="ctr"/>
+            <a:lstStyle/>
+            <a:p>
+              <a:pPr algn="ctr" eaLnBrk="0" hangingPunct="0">
+                <a:defRPr/>
+              </a:pPr>
+              <a:endParaRPr lang="en-US">
+                <a:cs typeface="+mn-cs"/>
+              </a:endParaRPr>
+            </a:p>
+          </p:txBody>
+        </p:sp>
+        <p:sp>
+          <p:nvSpPr>
+            <p:cNvPr id="36" name="Rectangle 35"/>
+            <p:cNvSpPr/>
+            <p:nvPr/>
+          </p:nvSpPr>
+          <p:spPr bwMode="auto">
+            <a:xfrm>
+              <a:off x="2941989" y="2627586"/>
+              <a:ext cx="373105" cy="743339"/>
+            </a:xfrm>
+            <a:prstGeom prst="rect">
+              <a:avLst/>
+            </a:prstGeom>
+            <a:solidFill>
+              <a:schemeClr val="bg1">
+                <a:lumMod val="85000"/>
+              </a:schemeClr>
+            </a:solidFill>
+            <a:ln w="50800" cap="flat" cmpd="sng" algn="ctr">
+              <a:solidFill>
+                <a:srgbClr val="4D4D4D"/>
+              </a:solidFill>
+              <a:prstDash val="solid"/>
+              <a:round/>
+              <a:headEnd type="none" w="med" len="med"/>
+              <a:tailEnd type="none" w="med" len="med"/>
+            </a:ln>
+            <a:effectLst>
+              <a:outerShdw blurRad="50800" dist="38100" dir="2700000" algn="tl" rotWithShape="0">
+                <a:prstClr val="black">
+                  <a:alpha val="40000"/>
+                </a:prstClr>
+              </a:outerShdw>
+            </a:effectLst>
+          </p:spPr>
+          <p:txBody>
+            <a:bodyPr wrap="none" anchor="ctr"/>
+            <a:lstStyle/>
+            <a:p>
+              <a:pPr algn="ctr" eaLnBrk="0" hangingPunct="0">
+                <a:defRPr/>
+              </a:pPr>
+              <a:endParaRPr lang="en-US">
+                <a:cs typeface="+mn-cs"/>
+              </a:endParaRPr>
+            </a:p>
+          </p:txBody>
+        </p:sp>
+        <p:sp>
+          <p:nvSpPr>
+            <p:cNvPr id="53" name="Rectangle 52"/>
+            <p:cNvSpPr/>
+            <p:nvPr/>
+          </p:nvSpPr>
+          <p:spPr bwMode="auto">
+            <a:xfrm>
+              <a:off x="3475448" y="2627586"/>
+              <a:ext cx="373105" cy="743339"/>
+            </a:xfrm>
+            <a:prstGeom prst="rect">
+              <a:avLst/>
+            </a:prstGeom>
+            <a:solidFill>
+              <a:schemeClr val="bg1">
+                <a:lumMod val="85000"/>
+              </a:schemeClr>
+            </a:solidFill>
+            <a:ln w="50800" cap="flat" cmpd="sng" algn="ctr">
+              <a:solidFill>
+                <a:srgbClr val="4D4D4D"/>
+              </a:solidFill>
+              <a:prstDash val="solid"/>
+              <a:round/>
+              <a:headEnd type="none" w="med" len="med"/>
+              <a:tailEnd type="none" w="med" len="med"/>
+            </a:ln>
+            <a:effectLst>
+              <a:outerShdw blurRad="50800" dist="38100" dir="2700000" algn="tl" rotWithShape="0">
+                <a:prstClr val="black">
+                  <a:alpha val="40000"/>
+                </a:prstClr>
+              </a:outerShdw>
+            </a:effectLst>
+          </p:spPr>
+          <p:txBody>
+            <a:bodyPr wrap="none" anchor="ctr"/>
+            <a:lstStyle/>
+            <a:p>
+              <a:pPr algn="ctr" eaLnBrk="0" hangingPunct="0">
+                <a:defRPr/>
+              </a:pPr>
+              <a:endParaRPr lang="en-US">
+                <a:cs typeface="+mn-cs"/>
+              </a:endParaRPr>
+            </a:p>
+          </p:txBody>
+        </p:sp>
+      </p:grpSp>
+      <p:grpSp>
+        <p:nvGrpSpPr>
+          <p:cNvPr id="4" name="Group 57"/>
+          <p:cNvGrpSpPr>
+            <a:grpSpLocks/>
+          </p:cNvGrpSpPr>
+          <p:nvPr/>
+        </p:nvGrpSpPr>
+        <p:grpSpPr bwMode="auto">
+          <a:xfrm>
+            <a:off x="1425575" y="4545013"/>
+            <a:ext cx="1439863" cy="744537"/>
+            <a:chOff x="2408529" y="2627586"/>
+            <a:chExt cx="1440024" cy="743339"/>
+          </a:xfrm>
+        </p:grpSpPr>
+        <p:sp>
+          <p:nvSpPr>
+            <p:cNvPr id="59" name="Rectangle 58"/>
+            <p:cNvSpPr/>
+            <p:nvPr/>
+          </p:nvSpPr>
+          <p:spPr bwMode="auto">
+            <a:xfrm>
+              <a:off x="2408529" y="2627586"/>
+              <a:ext cx="373105" cy="743339"/>
+            </a:xfrm>
+            <a:prstGeom prst="rect">
+              <a:avLst/>
+            </a:prstGeom>
+            <a:solidFill>
+              <a:schemeClr val="bg1">
+                <a:lumMod val="85000"/>
+              </a:schemeClr>
+            </a:solidFill>
+            <a:ln w="50800" cap="flat" cmpd="sng" algn="ctr">
+              <a:solidFill>
+                <a:srgbClr val="4D4D4D"/>
+              </a:solidFill>
+              <a:prstDash val="solid"/>
+              <a:round/>
+              <a:headEnd type="none" w="med" len="med"/>
+              <a:tailEnd type="none" w="med" len="med"/>
+            </a:ln>
+            <a:effectLst>
+              <a:outerShdw blurRad="50800" dist="38100" dir="2700000" algn="tl" rotWithShape="0">
+                <a:prstClr val="black">
+                  <a:alpha val="40000"/>
+                </a:prstClr>
+              </a:outerShdw>
+            </a:effectLst>
+          </p:spPr>
+          <p:txBody>
+            <a:bodyPr wrap="none" anchor="ctr"/>
+            <a:lstStyle/>
+            <a:p>
+              <a:pPr algn="ctr" eaLnBrk="0" hangingPunct="0">
+                <a:defRPr/>
+              </a:pPr>
+              <a:endParaRPr lang="en-US">
+                <a:cs typeface="+mn-cs"/>
+              </a:endParaRPr>
+            </a:p>
+          </p:txBody>
+        </p:sp>
+        <p:sp>
+          <p:nvSpPr>
+            <p:cNvPr id="60" name="Rectangle 59"/>
+            <p:cNvSpPr/>
+            <p:nvPr/>
+          </p:nvSpPr>
+          <p:spPr bwMode="auto">
+            <a:xfrm>
+              <a:off x="2941989" y="2627586"/>
+              <a:ext cx="373105" cy="743339"/>
+            </a:xfrm>
+            <a:prstGeom prst="rect">
+              <a:avLst/>
+            </a:prstGeom>
+            <a:solidFill>
+              <a:schemeClr val="bg1">
+                <a:lumMod val="85000"/>
+              </a:schemeClr>
+            </a:solidFill>
+            <a:ln w="50800" cap="flat" cmpd="sng" algn="ctr">
+              <a:solidFill>
+                <a:srgbClr val="4D4D4D"/>
+              </a:solidFill>
+              <a:prstDash val="solid"/>
+              <a:round/>
+              <a:headEnd type="none" w="med" len="med"/>
+              <a:tailEnd type="none" w="med" len="med"/>
+            </a:ln>
+            <a:effectLst>
+              <a:outerShdw blurRad="50800" dist="38100" dir="2700000" algn="tl" rotWithShape="0">
+                <a:prstClr val="black">
+                  <a:alpha val="40000"/>
+                </a:prstClr>
+              </a:outerShdw>
+            </a:effectLst>
+          </p:spPr>
+          <p:txBody>
+            <a:bodyPr wrap="none" anchor="ctr"/>
+            <a:lstStyle/>
+            <a:p>
+              <a:pPr algn="ctr" eaLnBrk="0" hangingPunct="0">
+                <a:defRPr/>
+              </a:pPr>
+              <a:endParaRPr lang="en-US">
+                <a:cs typeface="+mn-cs"/>
+              </a:endParaRPr>
+            </a:p>
+          </p:txBody>
+        </p:sp>
+        <p:sp>
+          <p:nvSpPr>
+            <p:cNvPr id="61" name="Rectangle 60"/>
+            <p:cNvSpPr/>
+            <p:nvPr/>
+          </p:nvSpPr>
+          <p:spPr bwMode="auto">
+            <a:xfrm>
+              <a:off x="3475448" y="2627586"/>
+              <a:ext cx="373105" cy="743339"/>
+            </a:xfrm>
+            <a:prstGeom prst="rect">
+              <a:avLst/>
+            </a:prstGeom>
+            <a:solidFill>
+              <a:schemeClr val="bg1">
+                <a:lumMod val="85000"/>
+              </a:schemeClr>
+            </a:solidFill>
+            <a:ln w="50800" cap="flat" cmpd="sng" algn="ctr">
+              <a:solidFill>
+                <a:srgbClr val="4D4D4D"/>
+              </a:solidFill>
+              <a:prstDash val="solid"/>
+              <a:round/>
+              <a:headEnd type="none" w="med" len="med"/>
+              <a:tailEnd type="none" w="med" len="med"/>
+            </a:ln>
+            <a:effectLst>
+              <a:outerShdw blurRad="50800" dist="38100" dir="2700000" algn="tl" rotWithShape="0">
+                <a:prstClr val="black">
+                  <a:alpha val="40000"/>
+                </a:prstClr>
+              </a:outerShdw>
+            </a:effectLst>
+          </p:spPr>
+          <p:txBody>
+            <a:bodyPr wrap="none" anchor="ctr"/>
+            <a:lstStyle/>
+            <a:p>
+              <a:pPr algn="ctr" eaLnBrk="0" hangingPunct="0">
+                <a:defRPr/>
+              </a:pPr>
+              <a:endParaRPr lang="en-US">
+                <a:cs typeface="+mn-cs"/>
+              </a:endParaRPr>
+            </a:p>
+          </p:txBody>
+        </p:sp>
+      </p:grpSp>
+      <p:grpSp>
+        <p:nvGrpSpPr>
+          <p:cNvPr id="5" name="Group 61"/>
+          <p:cNvGrpSpPr>
+            <a:grpSpLocks/>
+          </p:cNvGrpSpPr>
+          <p:nvPr/>
+        </p:nvGrpSpPr>
+        <p:grpSpPr bwMode="auto">
+          <a:xfrm>
+            <a:off x="1425575" y="3433763"/>
+            <a:ext cx="1439863" cy="742950"/>
+            <a:chOff x="2408529" y="2627586"/>
+            <a:chExt cx="1440024" cy="743339"/>
+          </a:xfrm>
+        </p:grpSpPr>
+        <p:sp>
+          <p:nvSpPr>
+            <p:cNvPr id="63" name="Rectangle 62"/>
+            <p:cNvSpPr/>
+            <p:nvPr/>
+          </p:nvSpPr>
+          <p:spPr bwMode="auto">
+            <a:xfrm>
+              <a:off x="2408529" y="2627586"/>
+              <a:ext cx="373105" cy="743339"/>
+            </a:xfrm>
+            <a:prstGeom prst="rect">
+              <a:avLst/>
+            </a:prstGeom>
+            <a:solidFill>
+              <a:schemeClr val="bg1">
+                <a:lumMod val="85000"/>
+              </a:schemeClr>
+            </a:solidFill>
+            <a:ln w="50800" cap="flat" cmpd="sng" algn="ctr">
+              <a:solidFill>
+                <a:srgbClr val="4D4D4D"/>
+              </a:solidFill>
+              <a:prstDash val="solid"/>
+              <a:round/>
+              <a:headEnd type="none" w="med" len="med"/>
+              <a:tailEnd type="none" w="med" len="med"/>
+            </a:ln>
+            <a:effectLst>
+              <a:outerShdw blurRad="50800" dist="38100" dir="2700000" algn="tl" rotWithShape="0">
+                <a:prstClr val="black">
+                  <a:alpha val="40000"/>
+                </a:prstClr>
+              </a:outerShdw>
+            </a:effectLst>
+          </p:spPr>
+          <p:txBody>
+            <a:bodyPr wrap="none" anchor="ctr"/>
+            <a:lstStyle/>
+            <a:p>
+              <a:pPr algn="ctr" eaLnBrk="0" hangingPunct="0">
+                <a:defRPr/>
+              </a:pPr>
+              <a:endParaRPr lang="en-US">
+                <a:cs typeface="+mn-cs"/>
+              </a:endParaRPr>
+            </a:p>
+          </p:txBody>
+        </p:sp>
+        <p:sp>
+          <p:nvSpPr>
+            <p:cNvPr id="64" name="Rectangle 63"/>
+            <p:cNvSpPr/>
+            <p:nvPr/>
+          </p:nvSpPr>
+          <p:spPr bwMode="auto">
+            <a:xfrm>
+              <a:off x="2941989" y="2627586"/>
+              <a:ext cx="373105" cy="743339"/>
+            </a:xfrm>
+            <a:prstGeom prst="rect">
+              <a:avLst/>
+            </a:prstGeom>
+            <a:solidFill>
+              <a:schemeClr val="bg1">
+                <a:lumMod val="85000"/>
+              </a:schemeClr>
+            </a:solidFill>
+            <a:ln w="50800" cap="flat" cmpd="sng" algn="ctr">
+              <a:solidFill>
+                <a:srgbClr val="4D4D4D"/>
+              </a:solidFill>
+              <a:prstDash val="solid"/>
+              <a:round/>
+              <a:headEnd type="none" w="med" len="med"/>
+              <a:tailEnd type="none" w="med" len="med"/>
+            </a:ln>
+            <a:effectLst>
+              <a:outerShdw blurRad="50800" dist="38100" dir="2700000" algn="tl" rotWithShape="0">
+                <a:prstClr val="black">
+                  <a:alpha val="40000"/>
+                </a:prstClr>
+              </a:outerShdw>
+            </a:effectLst>
+          </p:spPr>
+          <p:txBody>
+            <a:bodyPr wrap="none" anchor="ctr"/>
+            <a:lstStyle/>
+            <a:p>
+              <a:pPr algn="ctr" eaLnBrk="0" hangingPunct="0">
+                <a:defRPr/>
+              </a:pPr>
+              <a:endParaRPr lang="en-US">
+                <a:cs typeface="+mn-cs"/>
+              </a:endParaRPr>
+            </a:p>
+          </p:txBody>
+        </p:sp>
+        <p:sp>
+          <p:nvSpPr>
+            <p:cNvPr id="65" name="Rectangle 64"/>
+            <p:cNvSpPr/>
+            <p:nvPr/>
+          </p:nvSpPr>
+          <p:spPr bwMode="auto">
+            <a:xfrm>
+              <a:off x="3475448" y="2627586"/>
+              <a:ext cx="373105" cy="743339"/>
+            </a:xfrm>
+            <a:prstGeom prst="rect">
+              <a:avLst/>
+            </a:prstGeom>
+            <a:solidFill>
+              <a:schemeClr val="bg1">
+                <a:lumMod val="85000"/>
+              </a:schemeClr>
+            </a:solidFill>
+            <a:ln w="50800" cap="flat" cmpd="sng" algn="ctr">
+              <a:solidFill>
+                <a:srgbClr val="4D4D4D"/>
+              </a:solidFill>
+              <a:prstDash val="solid"/>
+              <a:round/>
+              <a:headEnd type="none" w="med" len="med"/>
+              <a:tailEnd type="none" w="med" len="med"/>
+            </a:ln>
+            <a:effectLst>
+              <a:outerShdw blurRad="50800" dist="38100" dir="2700000" algn="tl" rotWithShape="0">
+                <a:prstClr val="black">
+                  <a:alpha val="40000"/>
+                </a:prstClr>
+              </a:outerShdw>
+            </a:effectLst>
+          </p:spPr>
+          <p:txBody>
+            <a:bodyPr wrap="none" anchor="ctr"/>
+            <a:lstStyle/>
+            <a:p>
+              <a:pPr algn="ctr" eaLnBrk="0" hangingPunct="0">
+                <a:defRPr/>
+              </a:pPr>
+              <a:endParaRPr lang="en-US">
+                <a:cs typeface="+mn-cs"/>
+              </a:endParaRPr>
+            </a:p>
+          </p:txBody>
+        </p:sp>
+      </p:grpSp>
+      <p:grpSp>
+        <p:nvGrpSpPr>
+          <p:cNvPr id="7" name="Group 106"/>
+          <p:cNvGrpSpPr>
+            <a:grpSpLocks/>
+          </p:cNvGrpSpPr>
+          <p:nvPr/>
+        </p:nvGrpSpPr>
+        <p:grpSpPr bwMode="auto">
+          <a:xfrm>
+            <a:off x="1611313" y="1952625"/>
+            <a:ext cx="1068387" cy="369888"/>
+            <a:chOff x="1611598" y="1952025"/>
+            <a:chExt cx="1068388" cy="369800"/>
+          </a:xfrm>
+        </p:grpSpPr>
+        <p:cxnSp>
+          <p:nvCxnSpPr>
+            <p:cNvPr id="23568" name="Straight Connector 70"/>
+            <p:cNvCxnSpPr>
+              <a:cxnSpLocks noChangeShapeType="1"/>
+              <a:stCxn id="67" idx="2"/>
+              <a:endCxn id="35" idx="0"/>
+            </p:cNvCxnSpPr>
+            <p:nvPr/>
+          </p:nvCxnSpPr>
+          <p:spPr bwMode="auto">
+            <a:xfrm rot="5400000">
+              <a:off x="1427889" y="2136528"/>
+              <a:ext cx="369006" cy="1588"/>
+            </a:xfrm>
+            <a:prstGeom prst="line">
+              <a:avLst/>
+            </a:prstGeom>
+            <a:noFill/>
+            <a:ln w="50800" algn="ctr">
+              <a:solidFill>
+                <a:schemeClr val="tx1"/>
+              </a:solidFill>
+              <a:round/>
+              <a:headEnd/>
+              <a:tailEnd/>
+            </a:ln>
+          </p:spPr>
+        </p:cxnSp>
+        <p:cxnSp>
+          <p:nvCxnSpPr>
+            <p:cNvPr id="23569" name="Straight Connector 71"/>
+            <p:cNvCxnSpPr>
+              <a:cxnSpLocks noChangeShapeType="1"/>
+              <a:stCxn id="67" idx="2"/>
+              <a:endCxn id="36" idx="0"/>
+            </p:cNvCxnSpPr>
+            <p:nvPr/>
+          </p:nvCxnSpPr>
+          <p:spPr bwMode="auto">
+            <a:xfrm rot="16200000" flipH="1">
+              <a:off x="1694589" y="1869828"/>
+              <a:ext cx="369006" cy="533400"/>
+            </a:xfrm>
+            <a:prstGeom prst="line">
+              <a:avLst/>
+            </a:prstGeom>
+            <a:noFill/>
+            <a:ln w="50800" algn="ctr">
+              <a:solidFill>
+                <a:schemeClr val="tx1"/>
+              </a:solidFill>
+              <a:round/>
+              <a:headEnd/>
+              <a:tailEnd/>
+            </a:ln>
+          </p:spPr>
+        </p:cxnSp>
+        <p:cxnSp>
+          <p:nvCxnSpPr>
+            <p:cNvPr id="23570" name="Straight Connector 74"/>
+            <p:cNvCxnSpPr>
+              <a:cxnSpLocks noChangeShapeType="1"/>
+              <a:stCxn id="67" idx="2"/>
+              <a:endCxn id="53" idx="0"/>
+            </p:cNvCxnSpPr>
+            <p:nvPr/>
+          </p:nvCxnSpPr>
+          <p:spPr bwMode="auto">
+            <a:xfrm rot="16200000" flipH="1">
+              <a:off x="1961289" y="1603128"/>
+              <a:ext cx="369006" cy="1066800"/>
+            </a:xfrm>
+            <a:prstGeom prst="line">
+              <a:avLst/>
+            </a:prstGeom>
+            <a:noFill/>
+            <a:ln w="50800" algn="ctr">
+              <a:solidFill>
+                <a:schemeClr val="tx1"/>
+              </a:solidFill>
+              <a:round/>
+              <a:headEnd/>
+              <a:tailEnd/>
+            </a:ln>
+          </p:spPr>
+        </p:cxnSp>
+        <p:cxnSp>
+          <p:nvCxnSpPr>
+            <p:cNvPr id="23571" name="Straight Connector 77"/>
+            <p:cNvCxnSpPr>
+              <a:cxnSpLocks noChangeShapeType="1"/>
+              <a:stCxn id="36" idx="0"/>
+              <a:endCxn id="69" idx="2"/>
+            </p:cNvCxnSpPr>
+            <p:nvPr/>
+          </p:nvCxnSpPr>
+          <p:spPr bwMode="auto">
+            <a:xfrm rot="5400000" flipH="1" flipV="1">
+              <a:off x="2227989" y="1869828"/>
+              <a:ext cx="369006" cy="533400"/>
+            </a:xfrm>
+            <a:prstGeom prst="line">
+              <a:avLst/>
+            </a:prstGeom>
+            <a:noFill/>
+            <a:ln w="50800" algn="ctr">
+              <a:solidFill>
+                <a:schemeClr val="tx1"/>
+              </a:solidFill>
+              <a:round/>
+              <a:headEnd/>
+              <a:tailEnd/>
+            </a:ln>
+          </p:spPr>
+        </p:cxnSp>
+        <p:cxnSp>
+          <p:nvCxnSpPr>
+            <p:cNvPr id="23572" name="Straight Connector 80"/>
+            <p:cNvCxnSpPr>
+              <a:cxnSpLocks noChangeShapeType="1"/>
+              <a:stCxn id="68" idx="2"/>
+              <a:endCxn id="53" idx="0"/>
+            </p:cNvCxnSpPr>
+            <p:nvPr/>
+          </p:nvCxnSpPr>
+          <p:spPr bwMode="auto">
+            <a:xfrm rot="16200000" flipH="1">
+              <a:off x="2227989" y="1869828"/>
+              <a:ext cx="369006" cy="533400"/>
+            </a:xfrm>
+            <a:prstGeom prst="line">
+              <a:avLst/>
+            </a:prstGeom>
+            <a:noFill/>
+            <a:ln w="50800" algn="ctr">
+              <a:solidFill>
+                <a:schemeClr val="tx1"/>
+              </a:solidFill>
+              <a:round/>
+              <a:headEnd/>
+              <a:tailEnd/>
+            </a:ln>
+          </p:spPr>
+        </p:cxnSp>
+        <p:cxnSp>
+          <p:nvCxnSpPr>
+            <p:cNvPr id="23573" name="Straight Connector 84"/>
+            <p:cNvCxnSpPr>
+              <a:cxnSpLocks noChangeShapeType="1"/>
+              <a:stCxn id="68" idx="2"/>
+              <a:endCxn id="35" idx="0"/>
+            </p:cNvCxnSpPr>
+            <p:nvPr/>
+          </p:nvCxnSpPr>
+          <p:spPr bwMode="auto">
+            <a:xfrm rot="5400000">
+              <a:off x="1694589" y="1869828"/>
+              <a:ext cx="369006" cy="533400"/>
+            </a:xfrm>
+            <a:prstGeom prst="line">
+              <a:avLst/>
+            </a:prstGeom>
+            <a:noFill/>
+            <a:ln w="50800" algn="ctr">
+              <a:solidFill>
+                <a:schemeClr val="tx1"/>
+              </a:solidFill>
+              <a:round/>
+              <a:headEnd/>
+              <a:tailEnd/>
+            </a:ln>
+          </p:spPr>
+        </p:cxnSp>
+        <p:cxnSp>
+          <p:nvCxnSpPr>
+            <p:cNvPr id="23574" name="Straight Connector 87"/>
+            <p:cNvCxnSpPr>
+              <a:cxnSpLocks noChangeShapeType="1"/>
+              <a:stCxn id="68" idx="2"/>
+              <a:endCxn id="36" idx="0"/>
+            </p:cNvCxnSpPr>
+            <p:nvPr/>
+          </p:nvCxnSpPr>
+          <p:spPr bwMode="auto">
+            <a:xfrm rot="5400000">
+              <a:off x="1961289" y="2136528"/>
+              <a:ext cx="369006" cy="1588"/>
+            </a:xfrm>
+            <a:prstGeom prst="line">
+              <a:avLst/>
+            </a:prstGeom>
+            <a:noFill/>
+            <a:ln w="50800" algn="ctr">
+              <a:solidFill>
+                <a:schemeClr val="tx1"/>
+              </a:solidFill>
+              <a:round/>
+              <a:headEnd/>
+              <a:tailEnd/>
+            </a:ln>
+          </p:spPr>
+        </p:cxnSp>
+        <p:cxnSp>
+          <p:nvCxnSpPr>
+            <p:cNvPr id="23575" name="Straight Connector 91"/>
+            <p:cNvCxnSpPr>
+              <a:cxnSpLocks noChangeShapeType="1"/>
+              <a:stCxn id="35" idx="0"/>
+              <a:endCxn id="69" idx="2"/>
+            </p:cNvCxnSpPr>
+            <p:nvPr/>
+          </p:nvCxnSpPr>
+          <p:spPr bwMode="auto">
+            <a:xfrm rot="5400000" flipH="1" flipV="1">
+              <a:off x="1961289" y="1603128"/>
+              <a:ext cx="369006" cy="1066800"/>
+            </a:xfrm>
+            <a:prstGeom prst="line">
+              <a:avLst/>
+            </a:prstGeom>
+            <a:noFill/>
+            <a:ln w="50800" algn="ctr">
+              <a:solidFill>
+                <a:schemeClr val="tx1"/>
+              </a:solidFill>
+              <a:round/>
+              <a:headEnd/>
+              <a:tailEnd/>
+            </a:ln>
+          </p:spPr>
+        </p:cxnSp>
+        <p:cxnSp>
+          <p:nvCxnSpPr>
+            <p:cNvPr id="23576" name="Straight Connector 94"/>
+            <p:cNvCxnSpPr>
+              <a:cxnSpLocks noChangeShapeType="1"/>
+              <a:stCxn id="69" idx="2"/>
+              <a:endCxn id="53" idx="0"/>
+            </p:cNvCxnSpPr>
+            <p:nvPr/>
+          </p:nvCxnSpPr>
+          <p:spPr bwMode="auto">
+            <a:xfrm rot="5400000">
+              <a:off x="2494689" y="2136528"/>
+              <a:ext cx="369006" cy="1588"/>
+            </a:xfrm>
+            <a:prstGeom prst="line">
+              <a:avLst/>
+            </a:prstGeom>
+            <a:noFill/>
+            <a:ln w="50800" algn="ctr">
+              <a:solidFill>
+                <a:schemeClr val="tx1"/>
+              </a:solidFill>
+              <a:round/>
+              <a:headEnd/>
+              <a:tailEnd/>
+            </a:ln>
+          </p:spPr>
+        </p:cxnSp>
+      </p:grpSp>
+      <p:cxnSp>
+        <p:nvCxnSpPr>
+          <p:cNvPr id="23565" name="Straight Connector 128"/>
+          <p:cNvCxnSpPr>
+            <a:cxnSpLocks noChangeShapeType="1"/>
+            <a:stCxn id="61" idx="0"/>
+            <a:endCxn id="65" idx="2"/>
+          </p:cNvCxnSpPr>
+          <p:nvPr/>
+        </p:nvCxnSpPr>
+        <p:spPr bwMode="auto">
+          <a:xfrm rot="5400000" flipH="1" flipV="1">
+            <a:off x="2494757" y="4361656"/>
+            <a:ext cx="368300" cy="1587"/>
+          </a:xfrm>
+          <a:prstGeom prst="line">
+            <a:avLst/>
+          </a:prstGeom>
+          <a:noFill/>
+          <a:ln w="50800" algn="ctr">
+            <a:solidFill>
+              <a:schemeClr val="tx1"/>
+            </a:solidFill>
+            <a:round/>
+            <a:headEnd/>
+            <a:tailEnd/>
+          </a:ln>
+        </p:spPr>
+      </p:cxnSp>
+      <p:cxnSp>
+        <p:nvCxnSpPr>
+          <p:cNvPr id="23566" name="Straight Connector 129"/>
+          <p:cNvCxnSpPr>
+            <a:cxnSpLocks noChangeShapeType="1"/>
+            <a:stCxn id="60" idx="0"/>
+            <a:endCxn id="64" idx="2"/>
+          </p:cNvCxnSpPr>
+          <p:nvPr/>
+        </p:nvCxnSpPr>
+        <p:spPr bwMode="auto">
+          <a:xfrm rot="5400000" flipH="1" flipV="1">
+            <a:off x="1961357" y="4361656"/>
+            <a:ext cx="368300" cy="1587"/>
+          </a:xfrm>
+          <a:prstGeom prst="line">
+            <a:avLst/>
+          </a:prstGeom>
+          <a:noFill/>
+          <a:ln w="50800" algn="ctr">
+            <a:solidFill>
+              <a:schemeClr val="tx1"/>
+            </a:solidFill>
+            <a:round/>
+            <a:headEnd/>
+            <a:tailEnd/>
+          </a:ln>
+        </p:spPr>
+      </p:cxnSp>
+      <p:cxnSp>
+        <p:nvCxnSpPr>
+          <p:cNvPr id="23567" name="Straight Connector 132"/>
+          <p:cNvCxnSpPr>
+            <a:cxnSpLocks noChangeShapeType="1"/>
+            <a:stCxn id="59" idx="0"/>
+            <a:endCxn id="63" idx="2"/>
+          </p:cNvCxnSpPr>
+          <p:nvPr/>
+        </p:nvCxnSpPr>
+        <p:spPr bwMode="auto">
+          <a:xfrm rot="5400000" flipH="1" flipV="1">
+            <a:off x="1427957" y="4361656"/>
+            <a:ext cx="368300" cy="1587"/>
+          </a:xfrm>
+          <a:prstGeom prst="line">
+            <a:avLst/>
+          </a:prstGeom>
+          <a:noFill/>
+          <a:ln w="50800" algn="ctr">
+            <a:solidFill>
+              <a:schemeClr val="tx1"/>
+            </a:solidFill>
+            <a:round/>
+            <a:headEnd/>
+            <a:tailEnd/>
+          </a:ln>
+        </p:spPr>
+      </p:cxnSp>
+      <p:grpSp>
+        <p:nvGrpSpPr>
+          <p:cNvPr id="6" name="Group 65"/>
+          <p:cNvGrpSpPr>
+            <a:grpSpLocks/>
+          </p:cNvGrpSpPr>
+          <p:nvPr/>
+        </p:nvGrpSpPr>
+        <p:grpSpPr bwMode="auto">
+          <a:xfrm>
+            <a:off x="1425575" y="1208088"/>
+            <a:ext cx="1439863" cy="744537"/>
+            <a:chOff x="2408529" y="2627586"/>
+            <a:chExt cx="1440024" cy="743339"/>
+          </a:xfrm>
+        </p:grpSpPr>
+        <p:sp>
+          <p:nvSpPr>
+            <p:cNvPr id="67" name="Rectangle 66"/>
+            <p:cNvSpPr/>
+            <p:nvPr/>
+          </p:nvSpPr>
+          <p:spPr bwMode="auto">
+            <a:xfrm>
+              <a:off x="2408529" y="2627586"/>
+              <a:ext cx="373105" cy="743339"/>
+            </a:xfrm>
+            <a:prstGeom prst="rect">
+              <a:avLst/>
+            </a:prstGeom>
+            <a:solidFill>
+              <a:schemeClr val="bg1">
+                <a:lumMod val="85000"/>
+              </a:schemeClr>
+            </a:solidFill>
+            <a:ln w="50800" cap="flat" cmpd="sng" algn="ctr">
+              <a:solidFill>
+                <a:srgbClr val="4D4D4D"/>
+              </a:solidFill>
+              <a:prstDash val="solid"/>
+              <a:round/>
+              <a:headEnd type="none" w="med" len="med"/>
+              <a:tailEnd type="none" w="med" len="med"/>
+            </a:ln>
+            <a:effectLst>
+              <a:outerShdw blurRad="50800" dist="38100" dir="2700000" algn="tl" rotWithShape="0">
+                <a:prstClr val="black">
+                  <a:alpha val="40000"/>
+                </a:prstClr>
+              </a:outerShdw>
+            </a:effectLst>
+          </p:spPr>
+          <p:txBody>
+            <a:bodyPr wrap="none" anchor="ctr"/>
+            <a:lstStyle/>
+            <a:p>
+              <a:pPr algn="ctr" eaLnBrk="0" hangingPunct="0">
+                <a:defRPr/>
+              </a:pPr>
+              <a:endParaRPr lang="en-US">
+                <a:cs typeface="+mn-cs"/>
+              </a:endParaRPr>
+            </a:p>
+          </p:txBody>
+        </p:sp>
+        <p:sp>
+          <p:nvSpPr>
+            <p:cNvPr id="68" name="Rectangle 67"/>
+            <p:cNvSpPr/>
+            <p:nvPr/>
+          </p:nvSpPr>
+          <p:spPr bwMode="auto">
+            <a:xfrm>
+              <a:off x="2941989" y="2627586"/>
+              <a:ext cx="373105" cy="743339"/>
+            </a:xfrm>
+            <a:prstGeom prst="rect">
+              <a:avLst/>
+            </a:prstGeom>
+            <a:solidFill>
+              <a:schemeClr val="bg1">
+                <a:lumMod val="85000"/>
+              </a:schemeClr>
+            </a:solidFill>
+            <a:ln w="50800" cap="flat" cmpd="sng" algn="ctr">
+              <a:solidFill>
+                <a:srgbClr val="4D4D4D"/>
+              </a:solidFill>
+              <a:prstDash val="solid"/>
+              <a:round/>
+              <a:headEnd type="none" w="med" len="med"/>
+              <a:tailEnd type="none" w="med" len="med"/>
+            </a:ln>
+            <a:effectLst>
+              <a:outerShdw blurRad="50800" dist="38100" dir="2700000" algn="tl" rotWithShape="0">
+                <a:prstClr val="black">
+                  <a:alpha val="40000"/>
+                </a:prstClr>
+              </a:outerShdw>
+            </a:effectLst>
+          </p:spPr>
+          <p:txBody>
+            <a:bodyPr wrap="none" anchor="ctr"/>
+            <a:lstStyle/>
+            <a:p>
+              <a:pPr algn="ctr" eaLnBrk="0" hangingPunct="0">
+                <a:defRPr/>
+              </a:pPr>
+              <a:endParaRPr lang="en-US">
+                <a:cs typeface="+mn-cs"/>
+              </a:endParaRPr>
+            </a:p>
+          </p:txBody>
+        </p:sp>
+        <p:sp>
+          <p:nvSpPr>
+            <p:cNvPr id="69" name="Rectangle 68"/>
+            <p:cNvSpPr/>
+            <p:nvPr/>
+          </p:nvSpPr>
+          <p:spPr bwMode="auto">
+            <a:xfrm>
+              <a:off x="3475448" y="2627586"/>
+              <a:ext cx="373105" cy="743339"/>
+            </a:xfrm>
+            <a:prstGeom prst="rect">
+              <a:avLst/>
+            </a:prstGeom>
+            <a:solidFill>
+              <a:schemeClr val="bg1">
+                <a:lumMod val="85000"/>
+              </a:schemeClr>
+            </a:solidFill>
+            <a:ln w="50800" cap="flat" cmpd="sng" algn="ctr">
+              <a:solidFill>
+                <a:srgbClr val="4D4D4D"/>
+              </a:solidFill>
+              <a:prstDash val="solid"/>
+              <a:round/>
+              <a:headEnd type="none" w="med" len="med"/>
+              <a:tailEnd type="none" w="med" len="med"/>
+            </a:ln>
+            <a:effectLst>
+              <a:outerShdw blurRad="50800" dist="38100" dir="2700000" algn="tl" rotWithShape="0">
+                <a:prstClr val="black">
+                  <a:alpha val="40000"/>
+                </a:prstClr>
+              </a:outerShdw>
+            </a:effectLst>
+          </p:spPr>
+          <p:txBody>
+            <a:bodyPr wrap="none" anchor="ctr"/>
+            <a:lstStyle/>
+            <a:p>
+              <a:pPr algn="ctr" eaLnBrk="0" hangingPunct="0">
+                <a:defRPr/>
+              </a:pPr>
+              <a:endParaRPr lang="en-US">
+                <a:cs typeface="+mn-cs"/>
+              </a:endParaRPr>
+            </a:p>
+          </p:txBody>
+        </p:sp>
+      </p:grpSp>
+    </p:spTree>
+  </p:cSld>
+  <p:clrMapOvr>
+    <a:masterClrMapping/>
+  </p:clrMapOvr>
+</p:sld>
+</file>
+
 <file path=ppt/slides/slide2.xml><?xml version="1.0" encoding="utf-8"?>
 <p:sld xmlns:a="http://schemas.openxmlformats.org/drawingml/2006/main" xmlns:r="http://schemas.openxmlformats.org/officeDocument/2006/relationships" xmlns:p="http://schemas.openxmlformats.org/presentationml/2006/main">
   <p:cSld>

</xml_diff>